<commit_message>
Multiple lights and basic controls
</commit_message>
<xml_diff>
--- a/6019_Phys_1/D2D/W02/Collision_Detection (2024).pptx
+++ b/6019_Phys_1/D2D/W02/Collision_Detection (2024).pptx
@@ -11,12 +11,15 @@
     <p:sldId id="264" r:id="rId5"/>
     <p:sldId id="267" r:id="rId6"/>
     <p:sldId id="266" r:id="rId7"/>
-    <p:sldId id="265" r:id="rId8"/>
+    <p:sldId id="271" r:id="rId8"/>
     <p:sldId id="256" r:id="rId9"/>
     <p:sldId id="258" r:id="rId10"/>
     <p:sldId id="259" r:id="rId11"/>
     <p:sldId id="260" r:id="rId12"/>
     <p:sldId id="261" r:id="rId13"/>
+    <p:sldId id="268" r:id="rId14"/>
+    <p:sldId id="269" r:id="rId15"/>
+    <p:sldId id="270" r:id="rId16"/>
   </p:sldIdLst>
   <p:sldSz cx="12192000" cy="6858000"/>
   <p:notesSz cx="6858000" cy="9144000"/>
@@ -272,7 +275,7 @@
           <a:p>
             <a:fld id="{17096AE8-8B40-4419-992A-057BFACC0AD3}" type="datetimeFigureOut">
               <a:rPr lang="en-CA" smtClean="0"/>
-              <a:t>2024-09-19</a:t>
+              <a:t>2024-10-01</a:t>
             </a:fld>
             <a:endParaRPr lang="en-CA"/>
           </a:p>
@@ -472,7 +475,7 @@
           <a:p>
             <a:fld id="{17096AE8-8B40-4419-992A-057BFACC0AD3}" type="datetimeFigureOut">
               <a:rPr lang="en-CA" smtClean="0"/>
-              <a:t>2024-09-19</a:t>
+              <a:t>2024-10-01</a:t>
             </a:fld>
             <a:endParaRPr lang="en-CA"/>
           </a:p>
@@ -682,7 +685,7 @@
           <a:p>
             <a:fld id="{17096AE8-8B40-4419-992A-057BFACC0AD3}" type="datetimeFigureOut">
               <a:rPr lang="en-CA" smtClean="0"/>
-              <a:t>2024-09-19</a:t>
+              <a:t>2024-10-01</a:t>
             </a:fld>
             <a:endParaRPr lang="en-CA"/>
           </a:p>
@@ -882,7 +885,7 @@
           <a:p>
             <a:fld id="{17096AE8-8B40-4419-992A-057BFACC0AD3}" type="datetimeFigureOut">
               <a:rPr lang="en-CA" smtClean="0"/>
-              <a:t>2024-09-19</a:t>
+              <a:t>2024-10-01</a:t>
             </a:fld>
             <a:endParaRPr lang="en-CA"/>
           </a:p>
@@ -1158,7 +1161,7 @@
           <a:p>
             <a:fld id="{17096AE8-8B40-4419-992A-057BFACC0AD3}" type="datetimeFigureOut">
               <a:rPr lang="en-CA" smtClean="0"/>
-              <a:t>2024-09-19</a:t>
+              <a:t>2024-10-01</a:t>
             </a:fld>
             <a:endParaRPr lang="en-CA"/>
           </a:p>
@@ -1426,7 +1429,7 @@
           <a:p>
             <a:fld id="{17096AE8-8B40-4419-992A-057BFACC0AD3}" type="datetimeFigureOut">
               <a:rPr lang="en-CA" smtClean="0"/>
-              <a:t>2024-09-19</a:t>
+              <a:t>2024-10-01</a:t>
             </a:fld>
             <a:endParaRPr lang="en-CA"/>
           </a:p>
@@ -1841,7 +1844,7 @@
           <a:p>
             <a:fld id="{17096AE8-8B40-4419-992A-057BFACC0AD3}" type="datetimeFigureOut">
               <a:rPr lang="en-CA" smtClean="0"/>
-              <a:t>2024-09-19</a:t>
+              <a:t>2024-10-01</a:t>
             </a:fld>
             <a:endParaRPr lang="en-CA"/>
           </a:p>
@@ -1983,7 +1986,7 @@
           <a:p>
             <a:fld id="{17096AE8-8B40-4419-992A-057BFACC0AD3}" type="datetimeFigureOut">
               <a:rPr lang="en-CA" smtClean="0"/>
-              <a:t>2024-09-19</a:t>
+              <a:t>2024-10-01</a:t>
             </a:fld>
             <a:endParaRPr lang="en-CA"/>
           </a:p>
@@ -2096,7 +2099,7 @@
           <a:p>
             <a:fld id="{17096AE8-8B40-4419-992A-057BFACC0AD3}" type="datetimeFigureOut">
               <a:rPr lang="en-CA" smtClean="0"/>
-              <a:t>2024-09-19</a:t>
+              <a:t>2024-10-01</a:t>
             </a:fld>
             <a:endParaRPr lang="en-CA"/>
           </a:p>
@@ -2409,7 +2412,7 @@
           <a:p>
             <a:fld id="{17096AE8-8B40-4419-992A-057BFACC0AD3}" type="datetimeFigureOut">
               <a:rPr lang="en-CA" smtClean="0"/>
-              <a:t>2024-09-19</a:t>
+              <a:t>2024-10-01</a:t>
             </a:fld>
             <a:endParaRPr lang="en-CA"/>
           </a:p>
@@ -2698,7 +2701,7 @@
           <a:p>
             <a:fld id="{17096AE8-8B40-4419-992A-057BFACC0AD3}" type="datetimeFigureOut">
               <a:rPr lang="en-CA" smtClean="0"/>
-              <a:t>2024-09-19</a:t>
+              <a:t>2024-10-01</a:t>
             </a:fld>
             <a:endParaRPr lang="en-CA"/>
           </a:p>
@@ -2941,7 +2944,7 @@
           <a:p>
             <a:fld id="{17096AE8-8B40-4419-992A-057BFACC0AD3}" type="datetimeFigureOut">
               <a:rPr lang="en-CA" smtClean="0"/>
-              <a:t>2024-09-19</a:t>
+              <a:t>2024-10-01</a:t>
             </a:fld>
             <a:endParaRPr lang="en-CA"/>
           </a:p>
@@ -5373,6 +5376,1754 @@
 </p:sld>
 </file>
 
+<file path=ppt/slides/slide13.xml><?xml version="1.0" encoding="utf-8"?>
+<p:sld xmlns:a="http://schemas.openxmlformats.org/drawingml/2006/main" xmlns:r="http://schemas.openxmlformats.org/officeDocument/2006/relationships" xmlns:p="http://schemas.openxmlformats.org/presentationml/2006/main">
+  <p:cSld>
+    <p:spTree>
+      <p:nvGrpSpPr>
+        <p:cNvPr id="1" name=""/>
+        <p:cNvGrpSpPr/>
+        <p:nvPr/>
+      </p:nvGrpSpPr>
+      <p:grpSpPr>
+        <a:xfrm>
+          <a:off x="0" y="0"/>
+          <a:ext cx="0" cy="0"/>
+          <a:chOff x="0" y="0"/>
+          <a:chExt cx="0" cy="0"/>
+        </a:xfrm>
+      </p:grpSpPr>
+      <p:sp>
+        <p:nvSpPr>
+          <p:cNvPr id="2" name="Title 1">
+            <a:extLst>
+              <a:ext uri="{FF2B5EF4-FFF2-40B4-BE49-F238E27FC236}">
+                <a16:creationId xmlns:a16="http://schemas.microsoft.com/office/drawing/2014/main" id="{120D8150-7779-A467-EB25-BC6EFB257CD3}"/>
+              </a:ext>
+            </a:extLst>
+          </p:cNvPr>
+          <p:cNvSpPr>
+            <a:spLocks noGrp="1"/>
+          </p:cNvSpPr>
+          <p:nvPr>
+            <p:ph type="title"/>
+          </p:nvPr>
+        </p:nvSpPr>
+        <p:spPr/>
+        <p:txBody>
+          <a:bodyPr/>
+          <a:lstStyle/>
+          <a:p>
+            <a:r>
+              <a:rPr lang="en-CA" dirty="0"/>
+              <a:t>Separate “lists” of items:</a:t>
+            </a:r>
+          </a:p>
+        </p:txBody>
+      </p:sp>
+      <p:sp>
+        <p:nvSpPr>
+          <p:cNvPr id="3" name="Content Placeholder 2">
+            <a:extLst>
+              <a:ext uri="{FF2B5EF4-FFF2-40B4-BE49-F238E27FC236}">
+                <a16:creationId xmlns:a16="http://schemas.microsoft.com/office/drawing/2014/main" id="{42D77928-0BD2-DBFE-B51A-943167753A3A}"/>
+              </a:ext>
+            </a:extLst>
+          </p:cNvPr>
+          <p:cNvSpPr>
+            <a:spLocks noGrp="1"/>
+          </p:cNvSpPr>
+          <p:nvPr>
+            <p:ph idx="1"/>
+          </p:nvPr>
+        </p:nvSpPr>
+        <p:spPr>
+          <a:xfrm>
+            <a:off x="838200" y="1690688"/>
+            <a:ext cx="10515600" cy="4351338"/>
+          </a:xfrm>
+        </p:spPr>
+        <p:txBody>
+          <a:bodyPr/>
+          <a:lstStyle/>
+          <a:p>
+            <a:r>
+              <a:rPr lang="en-CA" dirty="0"/>
+              <a:t>Did this with rendering/graphics:</a:t>
+            </a:r>
+          </a:p>
+          <a:p>
+            <a:pPr lvl="1"/>
+            <a:r>
+              <a:rPr lang="en-CA" dirty="0"/>
+              <a:t>3D Models loaded and stored in the VAO (mesh manager)</a:t>
+            </a:r>
+          </a:p>
+          <a:p>
+            <a:pPr lvl="1"/>
+            <a:r>
+              <a:rPr lang="en-CA" dirty="0" err="1"/>
+              <a:t>cMeshObject</a:t>
+            </a:r>
+            <a:r>
+              <a:rPr lang="en-CA" dirty="0"/>
+              <a:t> -&gt; Really point locations with rotation, etc.</a:t>
+            </a:r>
+            <a:br>
+              <a:rPr lang="en-CA" dirty="0"/>
+            </a:br>
+            <a:r>
+              <a:rPr lang="en-CA" dirty="0"/>
+              <a:t>But they have what model to draw at that location:</a:t>
+            </a:r>
+          </a:p>
+          <a:p>
+            <a:pPr lvl="2"/>
+            <a:r>
+              <a:rPr lang="en-CA" dirty="0"/>
+              <a:t>XYZ </a:t>
+            </a:r>
+            <a:r>
+              <a:rPr lang="en-CA" dirty="0">
+                <a:sym typeface="Wingdings" panose="05000000000000000000" pitchFamily="2" charset="2"/>
+              </a:rPr>
+              <a:t> Draw a bunny here</a:t>
+            </a:r>
+          </a:p>
+          <a:p>
+            <a:pPr lvl="2"/>
+            <a:r>
+              <a:rPr lang="en-CA" dirty="0">
+                <a:sym typeface="Wingdings" panose="05000000000000000000" pitchFamily="2" charset="2"/>
+              </a:rPr>
+              <a:t>XYZ  Draw a terrain here</a:t>
+            </a:r>
+            <a:endParaRPr lang="en-CA" dirty="0"/>
+          </a:p>
+        </p:txBody>
+      </p:sp>
+      <p:sp>
+        <p:nvSpPr>
+          <p:cNvPr id="4" name="Rectangle 3">
+            <a:extLst>
+              <a:ext uri="{FF2B5EF4-FFF2-40B4-BE49-F238E27FC236}">
+                <a16:creationId xmlns:a16="http://schemas.microsoft.com/office/drawing/2014/main" id="{5BA56225-1CC7-0869-CDFF-37DA275EAAE4}"/>
+              </a:ext>
+            </a:extLst>
+          </p:cNvPr>
+          <p:cNvSpPr/>
+          <p:nvPr/>
+        </p:nvSpPr>
+        <p:spPr>
+          <a:xfrm>
+            <a:off x="5999584" y="3844212"/>
+            <a:ext cx="1194318" cy="2743200"/>
+          </a:xfrm>
+          <a:prstGeom prst="rect">
+            <a:avLst/>
+          </a:prstGeom>
+        </p:spPr>
+        <p:style>
+          <a:lnRef idx="2">
+            <a:schemeClr val="accent1">
+              <a:shade val="15000"/>
+            </a:schemeClr>
+          </a:lnRef>
+          <a:fillRef idx="1">
+            <a:schemeClr val="accent1"/>
+          </a:fillRef>
+          <a:effectRef idx="0">
+            <a:schemeClr val="accent1"/>
+          </a:effectRef>
+          <a:fontRef idx="minor">
+            <a:schemeClr val="lt1"/>
+          </a:fontRef>
+        </p:style>
+        <p:txBody>
+          <a:bodyPr rtlCol="0" anchor="ctr"/>
+          <a:lstStyle/>
+          <a:p>
+            <a:pPr algn="ctr"/>
+            <a:r>
+              <a:rPr lang="en-CA" dirty="0"/>
+              <a:t>List of Meshes we could draw</a:t>
+            </a:r>
+          </a:p>
+        </p:txBody>
+      </p:sp>
+      <p:sp>
+        <p:nvSpPr>
+          <p:cNvPr id="5" name="Rectangle 4">
+            <a:extLst>
+              <a:ext uri="{FF2B5EF4-FFF2-40B4-BE49-F238E27FC236}">
+                <a16:creationId xmlns:a16="http://schemas.microsoft.com/office/drawing/2014/main" id="{4A764929-13B7-891D-710F-86BEC183F02C}"/>
+              </a:ext>
+            </a:extLst>
+          </p:cNvPr>
+          <p:cNvSpPr/>
+          <p:nvPr/>
+        </p:nvSpPr>
+        <p:spPr>
+          <a:xfrm>
+            <a:off x="8676691" y="3844212"/>
+            <a:ext cx="1362269" cy="2743200"/>
+          </a:xfrm>
+          <a:prstGeom prst="rect">
+            <a:avLst/>
+          </a:prstGeom>
+        </p:spPr>
+        <p:style>
+          <a:lnRef idx="2">
+            <a:schemeClr val="accent1">
+              <a:shade val="15000"/>
+            </a:schemeClr>
+          </a:lnRef>
+          <a:fillRef idx="1">
+            <a:schemeClr val="accent1"/>
+          </a:fillRef>
+          <a:effectRef idx="0">
+            <a:schemeClr val="accent1"/>
+          </a:effectRef>
+          <a:fontRef idx="minor">
+            <a:schemeClr val="lt1"/>
+          </a:fontRef>
+        </p:style>
+        <p:txBody>
+          <a:bodyPr rtlCol="0" anchor="ctr"/>
+          <a:lstStyle/>
+          <a:p>
+            <a:pPr algn="ctr"/>
+            <a:r>
+              <a:rPr lang="en-CA" dirty="0"/>
+              <a:t>List of points, orientation + mesh names</a:t>
+            </a:r>
+          </a:p>
+        </p:txBody>
+      </p:sp>
+      <p:sp>
+        <p:nvSpPr>
+          <p:cNvPr id="6" name="Arrow: Left 5">
+            <a:extLst>
+              <a:ext uri="{FF2B5EF4-FFF2-40B4-BE49-F238E27FC236}">
+                <a16:creationId xmlns:a16="http://schemas.microsoft.com/office/drawing/2014/main" id="{1A18A918-96A4-7996-27F3-772E6FC68008}"/>
+              </a:ext>
+            </a:extLst>
+          </p:cNvPr>
+          <p:cNvSpPr/>
+          <p:nvPr/>
+        </p:nvSpPr>
+        <p:spPr>
+          <a:xfrm>
+            <a:off x="7338137" y="4422710"/>
+            <a:ext cx="1194318" cy="559837"/>
+          </a:xfrm>
+          <a:prstGeom prst="leftArrow">
+            <a:avLst/>
+          </a:prstGeom>
+        </p:spPr>
+        <p:style>
+          <a:lnRef idx="2">
+            <a:schemeClr val="accent1">
+              <a:shade val="15000"/>
+            </a:schemeClr>
+          </a:lnRef>
+          <a:fillRef idx="1">
+            <a:schemeClr val="accent1"/>
+          </a:fillRef>
+          <a:effectRef idx="0">
+            <a:schemeClr val="accent1"/>
+          </a:effectRef>
+          <a:fontRef idx="minor">
+            <a:schemeClr val="lt1"/>
+          </a:fontRef>
+        </p:style>
+        <p:txBody>
+          <a:bodyPr rtlCol="0" anchor="ctr"/>
+          <a:lstStyle/>
+          <a:p>
+            <a:pPr algn="ctr"/>
+            <a:r>
+              <a:rPr lang="en-CA" dirty="0"/>
+              <a:t>Lookup</a:t>
+            </a:r>
+          </a:p>
+        </p:txBody>
+      </p:sp>
+    </p:spTree>
+    <p:extLst>
+      <p:ext uri="{BB962C8B-B14F-4D97-AF65-F5344CB8AC3E}">
+        <p14:creationId xmlns:p14="http://schemas.microsoft.com/office/powerpoint/2010/main" val="3940982722"/>
+      </p:ext>
+    </p:extLst>
+  </p:cSld>
+  <p:clrMapOvr>
+    <a:masterClrMapping/>
+  </p:clrMapOvr>
+</p:sld>
+</file>
+
+<file path=ppt/slides/slide14.xml><?xml version="1.0" encoding="utf-8"?>
+<p:sld xmlns:a="http://schemas.openxmlformats.org/drawingml/2006/main" xmlns:r="http://schemas.openxmlformats.org/officeDocument/2006/relationships" xmlns:p="http://schemas.openxmlformats.org/presentationml/2006/main">
+  <p:cSld>
+    <p:spTree>
+      <p:nvGrpSpPr>
+        <p:cNvPr id="1" name=""/>
+        <p:cNvGrpSpPr/>
+        <p:nvPr/>
+      </p:nvGrpSpPr>
+      <p:grpSpPr>
+        <a:xfrm>
+          <a:off x="0" y="0"/>
+          <a:ext cx="0" cy="0"/>
+          <a:chOff x="0" y="0"/>
+          <a:chExt cx="0" cy="0"/>
+        </a:xfrm>
+      </p:grpSpPr>
+      <p:sp>
+        <p:nvSpPr>
+          <p:cNvPr id="2" name="Title 1">
+            <a:extLst>
+              <a:ext uri="{FF2B5EF4-FFF2-40B4-BE49-F238E27FC236}">
+                <a16:creationId xmlns:a16="http://schemas.microsoft.com/office/drawing/2014/main" id="{120D8150-7779-A467-EB25-BC6EFB257CD3}"/>
+              </a:ext>
+            </a:extLst>
+          </p:cNvPr>
+          <p:cNvSpPr>
+            <a:spLocks noGrp="1"/>
+          </p:cNvSpPr>
+          <p:nvPr>
+            <p:ph type="title"/>
+          </p:nvPr>
+        </p:nvSpPr>
+        <p:spPr>
+          <a:xfrm>
+            <a:off x="838200" y="365126"/>
+            <a:ext cx="10515600" cy="894508"/>
+          </a:xfrm>
+        </p:spPr>
+        <p:txBody>
+          <a:bodyPr>
+            <a:noAutofit/>
+          </a:bodyPr>
+          <a:lstStyle/>
+          <a:p>
+            <a:r>
+              <a:rPr lang="en-CA" sz="3600" dirty="0"/>
+              <a:t>3</a:t>
+            </a:r>
+            <a:r>
+              <a:rPr lang="en-CA" sz="3600" baseline="30000" dirty="0"/>
+              <a:t>rd</a:t>
+            </a:r>
+            <a:r>
+              <a:rPr lang="en-CA" sz="3600" dirty="0"/>
+              <a:t> list of things: the simplified physics representation</a:t>
+            </a:r>
+          </a:p>
+        </p:txBody>
+      </p:sp>
+      <p:sp>
+        <p:nvSpPr>
+          <p:cNvPr id="3" name="Content Placeholder 2">
+            <a:extLst>
+              <a:ext uri="{FF2B5EF4-FFF2-40B4-BE49-F238E27FC236}">
+                <a16:creationId xmlns:a16="http://schemas.microsoft.com/office/drawing/2014/main" id="{42D77928-0BD2-DBFE-B51A-943167753A3A}"/>
+              </a:ext>
+            </a:extLst>
+          </p:cNvPr>
+          <p:cNvSpPr>
+            <a:spLocks noGrp="1"/>
+          </p:cNvSpPr>
+          <p:nvPr>
+            <p:ph idx="1"/>
+          </p:nvPr>
+        </p:nvSpPr>
+        <p:spPr>
+          <a:xfrm>
+            <a:off x="838200" y="1253331"/>
+            <a:ext cx="10515600" cy="4351338"/>
+          </a:xfrm>
+        </p:spPr>
+        <p:txBody>
+          <a:bodyPr/>
+          <a:lstStyle/>
+          <a:p>
+            <a:r>
+              <a:rPr lang="en-CA" dirty="0"/>
+              <a:t>List of </a:t>
+            </a:r>
+          </a:p>
+        </p:txBody>
+      </p:sp>
+      <p:sp>
+        <p:nvSpPr>
+          <p:cNvPr id="4" name="Rectangle 3">
+            <a:extLst>
+              <a:ext uri="{FF2B5EF4-FFF2-40B4-BE49-F238E27FC236}">
+                <a16:creationId xmlns:a16="http://schemas.microsoft.com/office/drawing/2014/main" id="{5BA56225-1CC7-0869-CDFF-37DA275EAAE4}"/>
+              </a:ext>
+            </a:extLst>
+          </p:cNvPr>
+          <p:cNvSpPr/>
+          <p:nvPr/>
+        </p:nvSpPr>
+        <p:spPr>
+          <a:xfrm>
+            <a:off x="2737758" y="3844212"/>
+            <a:ext cx="1194318" cy="2743200"/>
+          </a:xfrm>
+          <a:prstGeom prst="rect">
+            <a:avLst/>
+          </a:prstGeom>
+        </p:spPr>
+        <p:style>
+          <a:lnRef idx="2">
+            <a:schemeClr val="accent1">
+              <a:shade val="15000"/>
+            </a:schemeClr>
+          </a:lnRef>
+          <a:fillRef idx="1">
+            <a:schemeClr val="accent1"/>
+          </a:fillRef>
+          <a:effectRef idx="0">
+            <a:schemeClr val="accent1"/>
+          </a:effectRef>
+          <a:fontRef idx="minor">
+            <a:schemeClr val="lt1"/>
+          </a:fontRef>
+        </p:style>
+        <p:txBody>
+          <a:bodyPr rtlCol="0" anchor="ctr"/>
+          <a:lstStyle/>
+          <a:p>
+            <a:pPr algn="ctr"/>
+            <a:r>
+              <a:rPr lang="en-CA" dirty="0"/>
+              <a:t>List of Meshes we could draw</a:t>
+            </a:r>
+          </a:p>
+        </p:txBody>
+      </p:sp>
+      <p:sp>
+        <p:nvSpPr>
+          <p:cNvPr id="5" name="Rectangle 4">
+            <a:extLst>
+              <a:ext uri="{FF2B5EF4-FFF2-40B4-BE49-F238E27FC236}">
+                <a16:creationId xmlns:a16="http://schemas.microsoft.com/office/drawing/2014/main" id="{4A764929-13B7-891D-710F-86BEC183F02C}"/>
+              </a:ext>
+            </a:extLst>
+          </p:cNvPr>
+          <p:cNvSpPr/>
+          <p:nvPr/>
+        </p:nvSpPr>
+        <p:spPr>
+          <a:xfrm>
+            <a:off x="5414865" y="3004457"/>
+            <a:ext cx="1362269" cy="3582955"/>
+          </a:xfrm>
+          <a:prstGeom prst="rect">
+            <a:avLst/>
+          </a:prstGeom>
+        </p:spPr>
+        <p:style>
+          <a:lnRef idx="2">
+            <a:schemeClr val="accent1">
+              <a:shade val="15000"/>
+            </a:schemeClr>
+          </a:lnRef>
+          <a:fillRef idx="1">
+            <a:schemeClr val="accent1"/>
+          </a:fillRef>
+          <a:effectRef idx="0">
+            <a:schemeClr val="accent1"/>
+          </a:effectRef>
+          <a:fontRef idx="minor">
+            <a:schemeClr val="lt1"/>
+          </a:fontRef>
+        </p:style>
+        <p:txBody>
+          <a:bodyPr rtlCol="0" anchor="ctr"/>
+          <a:lstStyle/>
+          <a:p>
+            <a:pPr algn="ctr"/>
+            <a:r>
+              <a:rPr lang="en-CA" dirty="0"/>
+              <a:t>Rendering:</a:t>
+            </a:r>
+          </a:p>
+          <a:p>
+            <a:pPr algn="ctr"/>
+            <a:endParaRPr lang="en-CA" dirty="0"/>
+          </a:p>
+          <a:p>
+            <a:pPr algn="ctr"/>
+            <a:r>
+              <a:rPr lang="en-CA" dirty="0"/>
+              <a:t>List of points, orientation + mesh names</a:t>
+            </a:r>
+          </a:p>
+        </p:txBody>
+      </p:sp>
+      <p:sp>
+        <p:nvSpPr>
+          <p:cNvPr id="6" name="Arrow: Left 5">
+            <a:extLst>
+              <a:ext uri="{FF2B5EF4-FFF2-40B4-BE49-F238E27FC236}">
+                <a16:creationId xmlns:a16="http://schemas.microsoft.com/office/drawing/2014/main" id="{1A18A918-96A4-7996-27F3-772E6FC68008}"/>
+              </a:ext>
+            </a:extLst>
+          </p:cNvPr>
+          <p:cNvSpPr/>
+          <p:nvPr/>
+        </p:nvSpPr>
+        <p:spPr>
+          <a:xfrm>
+            <a:off x="4069703" y="4730620"/>
+            <a:ext cx="1194318" cy="559837"/>
+          </a:xfrm>
+          <a:prstGeom prst="leftArrow">
+            <a:avLst/>
+          </a:prstGeom>
+        </p:spPr>
+        <p:style>
+          <a:lnRef idx="2">
+            <a:schemeClr val="accent1">
+              <a:shade val="15000"/>
+            </a:schemeClr>
+          </a:lnRef>
+          <a:fillRef idx="1">
+            <a:schemeClr val="accent1"/>
+          </a:fillRef>
+          <a:effectRef idx="0">
+            <a:schemeClr val="accent1"/>
+          </a:effectRef>
+          <a:fontRef idx="minor">
+            <a:schemeClr val="lt1"/>
+          </a:fontRef>
+        </p:style>
+        <p:txBody>
+          <a:bodyPr rtlCol="0" anchor="ctr"/>
+          <a:lstStyle/>
+          <a:p>
+            <a:pPr algn="ctr"/>
+            <a:r>
+              <a:rPr lang="en-CA" dirty="0"/>
+              <a:t>Lookup</a:t>
+            </a:r>
+          </a:p>
+        </p:txBody>
+      </p:sp>
+      <p:sp>
+        <p:nvSpPr>
+          <p:cNvPr id="7" name="Rectangle 6">
+            <a:extLst>
+              <a:ext uri="{FF2B5EF4-FFF2-40B4-BE49-F238E27FC236}">
+                <a16:creationId xmlns:a16="http://schemas.microsoft.com/office/drawing/2014/main" id="{66AED853-FE0D-B9B9-292F-04C896E5BF3C}"/>
+              </a:ext>
+            </a:extLst>
+          </p:cNvPr>
+          <p:cNvSpPr/>
+          <p:nvPr/>
+        </p:nvSpPr>
+        <p:spPr>
+          <a:xfrm>
+            <a:off x="8521959" y="3844212"/>
+            <a:ext cx="1946988" cy="2743200"/>
+          </a:xfrm>
+          <a:prstGeom prst="rect">
+            <a:avLst/>
+          </a:prstGeom>
+        </p:spPr>
+        <p:style>
+          <a:lnRef idx="2">
+            <a:schemeClr val="accent1">
+              <a:shade val="15000"/>
+            </a:schemeClr>
+          </a:lnRef>
+          <a:fillRef idx="1">
+            <a:schemeClr val="accent1"/>
+          </a:fillRef>
+          <a:effectRef idx="0">
+            <a:schemeClr val="accent1"/>
+          </a:effectRef>
+          <a:fontRef idx="minor">
+            <a:schemeClr val="lt1"/>
+          </a:fontRef>
+        </p:style>
+        <p:txBody>
+          <a:bodyPr rtlCol="0" anchor="ctr"/>
+          <a:lstStyle/>
+          <a:p>
+            <a:pPr algn="ctr"/>
+            <a:r>
+              <a:rPr lang="en-CA" dirty="0"/>
+              <a:t>List of Physics “shapes”</a:t>
+            </a:r>
+          </a:p>
+          <a:p>
+            <a:pPr marL="285750" indent="-285750" algn="ctr">
+              <a:buFont typeface="Arial" panose="020B0604020202020204" pitchFamily="34" charset="0"/>
+              <a:buChar char="•"/>
+            </a:pPr>
+            <a:r>
+              <a:rPr lang="en-CA" dirty="0"/>
+              <a:t>Spheres</a:t>
+            </a:r>
+          </a:p>
+          <a:p>
+            <a:pPr marL="285750" indent="-285750" algn="ctr">
+              <a:buFont typeface="Arial" panose="020B0604020202020204" pitchFamily="34" charset="0"/>
+              <a:buChar char="•"/>
+            </a:pPr>
+            <a:r>
+              <a:rPr lang="en-CA" dirty="0"/>
+              <a:t>AABBs</a:t>
+            </a:r>
+          </a:p>
+          <a:p>
+            <a:pPr marL="285750" indent="-285750" algn="ctr">
+              <a:buFont typeface="Arial" panose="020B0604020202020204" pitchFamily="34" charset="0"/>
+              <a:buChar char="•"/>
+            </a:pPr>
+            <a:r>
+              <a:rPr lang="en-CA" dirty="0"/>
+              <a:t>Mesh of Triangles</a:t>
+            </a:r>
+          </a:p>
+        </p:txBody>
+      </p:sp>
+      <p:sp>
+        <p:nvSpPr>
+          <p:cNvPr id="8" name="Arrow: Left 7">
+            <a:extLst>
+              <a:ext uri="{FF2B5EF4-FFF2-40B4-BE49-F238E27FC236}">
+                <a16:creationId xmlns:a16="http://schemas.microsoft.com/office/drawing/2014/main" id="{EAAFA84E-8D7F-4B79-983B-EB089EE9F00D}"/>
+              </a:ext>
+            </a:extLst>
+          </p:cNvPr>
+          <p:cNvSpPr/>
+          <p:nvPr/>
+        </p:nvSpPr>
+        <p:spPr>
+          <a:xfrm>
+            <a:off x="6947029" y="4730619"/>
+            <a:ext cx="1380154" cy="559837"/>
+          </a:xfrm>
+          <a:prstGeom prst="leftArrow">
+            <a:avLst/>
+          </a:prstGeom>
+        </p:spPr>
+        <p:style>
+          <a:lnRef idx="2">
+            <a:schemeClr val="accent1">
+              <a:shade val="15000"/>
+            </a:schemeClr>
+          </a:lnRef>
+          <a:fillRef idx="1">
+            <a:schemeClr val="accent1"/>
+          </a:fillRef>
+          <a:effectRef idx="0">
+            <a:schemeClr val="accent1"/>
+          </a:effectRef>
+          <a:fontRef idx="minor">
+            <a:schemeClr val="lt1"/>
+          </a:fontRef>
+        </p:style>
+        <p:txBody>
+          <a:bodyPr rtlCol="0" anchor="ctr"/>
+          <a:lstStyle/>
+          <a:p>
+            <a:pPr algn="ctr"/>
+            <a:r>
+              <a:rPr lang="en-CA" dirty="0"/>
+              <a:t>Lookup</a:t>
+            </a:r>
+          </a:p>
+        </p:txBody>
+      </p:sp>
+    </p:spTree>
+    <p:extLst>
+      <p:ext uri="{BB962C8B-B14F-4D97-AF65-F5344CB8AC3E}">
+        <p14:creationId xmlns:p14="http://schemas.microsoft.com/office/powerpoint/2010/main" val="144830472"/>
+      </p:ext>
+    </p:extLst>
+  </p:cSld>
+  <p:clrMapOvr>
+    <a:masterClrMapping/>
+  </p:clrMapOvr>
+</p:sld>
+</file>
+
+<file path=ppt/slides/slide15.xml><?xml version="1.0" encoding="utf-8"?>
+<p:sld xmlns:a="http://schemas.openxmlformats.org/drawingml/2006/main" xmlns:r="http://schemas.openxmlformats.org/officeDocument/2006/relationships" xmlns:p="http://schemas.openxmlformats.org/presentationml/2006/main" show="0">
+  <p:cSld>
+    <p:spTree>
+      <p:nvGrpSpPr>
+        <p:cNvPr id="1" name=""/>
+        <p:cNvGrpSpPr/>
+        <p:nvPr/>
+      </p:nvGrpSpPr>
+      <p:grpSpPr>
+        <a:xfrm>
+          <a:off x="0" y="0"/>
+          <a:ext cx="0" cy="0"/>
+          <a:chOff x="0" y="0"/>
+          <a:chExt cx="0" cy="0"/>
+        </a:xfrm>
+      </p:grpSpPr>
+      <p:grpSp>
+        <p:nvGrpSpPr>
+          <p:cNvPr id="12" name="Group 11">
+            <a:extLst>
+              <a:ext uri="{FF2B5EF4-FFF2-40B4-BE49-F238E27FC236}">
+                <a16:creationId xmlns:a16="http://schemas.microsoft.com/office/drawing/2014/main" id="{475C41AE-9704-3B51-0D67-55D3F1BA8FB3}"/>
+              </a:ext>
+            </a:extLst>
+          </p:cNvPr>
+          <p:cNvGrpSpPr/>
+          <p:nvPr/>
+        </p:nvGrpSpPr>
+        <p:grpSpPr>
+          <a:xfrm>
+            <a:off x="2578851" y="817908"/>
+            <a:ext cx="789500" cy="789500"/>
+            <a:chOff x="5411755" y="270588"/>
+            <a:chExt cx="1866122" cy="1866122"/>
+          </a:xfrm>
+        </p:grpSpPr>
+        <p:sp>
+          <p:nvSpPr>
+            <p:cNvPr id="2" name="Oval 1">
+              <a:extLst>
+                <a:ext uri="{FF2B5EF4-FFF2-40B4-BE49-F238E27FC236}">
+                  <a16:creationId xmlns:a16="http://schemas.microsoft.com/office/drawing/2014/main" id="{DE784E79-97CD-5541-FE30-0EFAFDBF7A96}"/>
+                </a:ext>
+              </a:extLst>
+            </p:cNvPr>
+            <p:cNvSpPr/>
+            <p:nvPr/>
+          </p:nvSpPr>
+          <p:spPr>
+            <a:xfrm>
+              <a:off x="5411755" y="270588"/>
+              <a:ext cx="1866122" cy="1866122"/>
+            </a:xfrm>
+            <a:prstGeom prst="ellipse">
+              <a:avLst/>
+            </a:prstGeom>
+          </p:spPr>
+          <p:style>
+            <a:lnRef idx="2">
+              <a:schemeClr val="accent1">
+                <a:shade val="15000"/>
+              </a:schemeClr>
+            </a:lnRef>
+            <a:fillRef idx="1">
+              <a:schemeClr val="accent1"/>
+            </a:fillRef>
+            <a:effectRef idx="0">
+              <a:schemeClr val="accent1"/>
+            </a:effectRef>
+            <a:fontRef idx="minor">
+              <a:schemeClr val="lt1"/>
+            </a:fontRef>
+          </p:style>
+          <p:txBody>
+            <a:bodyPr rtlCol="0" anchor="ctr"/>
+            <a:lstStyle/>
+            <a:p>
+              <a:pPr algn="ctr"/>
+              <a:endParaRPr lang="en-CA"/>
+            </a:p>
+          </p:txBody>
+        </p:sp>
+        <p:sp>
+          <p:nvSpPr>
+            <p:cNvPr id="4" name="Oval 3">
+              <a:extLst>
+                <a:ext uri="{FF2B5EF4-FFF2-40B4-BE49-F238E27FC236}">
+                  <a16:creationId xmlns:a16="http://schemas.microsoft.com/office/drawing/2014/main" id="{31978DBD-65A7-1943-216C-5EE14F1429CB}"/>
+                </a:ext>
+              </a:extLst>
+            </p:cNvPr>
+            <p:cNvSpPr/>
+            <p:nvPr/>
+          </p:nvSpPr>
+          <p:spPr>
+            <a:xfrm>
+              <a:off x="6218853" y="1077686"/>
+              <a:ext cx="251926" cy="251926"/>
+            </a:xfrm>
+            <a:prstGeom prst="ellipse">
+              <a:avLst/>
+            </a:prstGeom>
+          </p:spPr>
+          <p:style>
+            <a:lnRef idx="2">
+              <a:schemeClr val="accent6">
+                <a:shade val="15000"/>
+              </a:schemeClr>
+            </a:lnRef>
+            <a:fillRef idx="1">
+              <a:schemeClr val="accent6"/>
+            </a:fillRef>
+            <a:effectRef idx="0">
+              <a:schemeClr val="accent6"/>
+            </a:effectRef>
+            <a:fontRef idx="minor">
+              <a:schemeClr val="lt1"/>
+            </a:fontRef>
+          </p:style>
+          <p:txBody>
+            <a:bodyPr rtlCol="0" anchor="ctr"/>
+            <a:lstStyle/>
+            <a:p>
+              <a:pPr algn="ctr"/>
+              <a:endParaRPr lang="en-CA"/>
+            </a:p>
+          </p:txBody>
+        </p:sp>
+      </p:grpSp>
+      <p:sp>
+        <p:nvSpPr>
+          <p:cNvPr id="17" name="Arrow: Right 16">
+            <a:extLst>
+              <a:ext uri="{FF2B5EF4-FFF2-40B4-BE49-F238E27FC236}">
+                <a16:creationId xmlns:a16="http://schemas.microsoft.com/office/drawing/2014/main" id="{B77EB834-2A4E-B955-6342-3B510927C9A2}"/>
+              </a:ext>
+            </a:extLst>
+          </p:cNvPr>
+          <p:cNvSpPr/>
+          <p:nvPr/>
+        </p:nvSpPr>
+        <p:spPr>
+          <a:xfrm rot="5400000">
+            <a:off x="2478434" y="1915218"/>
+            <a:ext cx="990333" cy="472077"/>
+          </a:xfrm>
+          <a:prstGeom prst="rightArrow">
+            <a:avLst/>
+          </a:prstGeom>
+        </p:spPr>
+        <p:style>
+          <a:lnRef idx="1">
+            <a:schemeClr val="accent4"/>
+          </a:lnRef>
+          <a:fillRef idx="3">
+            <a:schemeClr val="accent4"/>
+          </a:fillRef>
+          <a:effectRef idx="2">
+            <a:schemeClr val="accent4"/>
+          </a:effectRef>
+          <a:fontRef idx="minor">
+            <a:schemeClr val="lt1"/>
+          </a:fontRef>
+        </p:style>
+        <p:txBody>
+          <a:bodyPr rtlCol="0" anchor="ctr"/>
+          <a:lstStyle/>
+          <a:p>
+            <a:pPr algn="ctr"/>
+            <a:r>
+              <a:rPr lang="en-CA" dirty="0">
+                <a:solidFill>
+                  <a:schemeClr val="tx1"/>
+                </a:solidFill>
+              </a:rPr>
+              <a:t>1</a:t>
+            </a:r>
+          </a:p>
+        </p:txBody>
+      </p:sp>
+      <p:sp>
+        <p:nvSpPr>
+          <p:cNvPr id="20" name="Arrow: Right 19">
+            <a:extLst>
+              <a:ext uri="{FF2B5EF4-FFF2-40B4-BE49-F238E27FC236}">
+                <a16:creationId xmlns:a16="http://schemas.microsoft.com/office/drawing/2014/main" id="{17D2C71A-B742-3337-470C-0F632F163C42}"/>
+              </a:ext>
+            </a:extLst>
+          </p:cNvPr>
+          <p:cNvSpPr/>
+          <p:nvPr/>
+        </p:nvSpPr>
+        <p:spPr>
+          <a:xfrm>
+            <a:off x="233266" y="817908"/>
+            <a:ext cx="2090057" cy="783771"/>
+          </a:xfrm>
+          <a:prstGeom prst="rightArrow">
+            <a:avLst/>
+          </a:prstGeom>
+        </p:spPr>
+        <p:style>
+          <a:lnRef idx="2">
+            <a:schemeClr val="accent1">
+              <a:shade val="15000"/>
+            </a:schemeClr>
+          </a:lnRef>
+          <a:fillRef idx="1">
+            <a:schemeClr val="accent1"/>
+          </a:fillRef>
+          <a:effectRef idx="0">
+            <a:schemeClr val="accent1"/>
+          </a:effectRef>
+          <a:fontRef idx="minor">
+            <a:schemeClr val="lt1"/>
+          </a:fontRef>
+        </p:style>
+        <p:txBody>
+          <a:bodyPr rtlCol="0" anchor="ctr"/>
+          <a:lstStyle/>
+          <a:p>
+            <a:pPr algn="ctr"/>
+            <a:r>
+              <a:rPr lang="en-CA" dirty="0"/>
+              <a:t>t = 0, Y = 10</a:t>
+            </a:r>
+          </a:p>
+        </p:txBody>
+      </p:sp>
+      <p:grpSp>
+        <p:nvGrpSpPr>
+          <p:cNvPr id="21" name="Group 20">
+            <a:extLst>
+              <a:ext uri="{FF2B5EF4-FFF2-40B4-BE49-F238E27FC236}">
+                <a16:creationId xmlns:a16="http://schemas.microsoft.com/office/drawing/2014/main" id="{84AD5A3F-864A-ECEC-B8A9-670A1E187480}"/>
+              </a:ext>
+            </a:extLst>
+          </p:cNvPr>
+          <p:cNvGrpSpPr/>
+          <p:nvPr/>
+        </p:nvGrpSpPr>
+        <p:grpSpPr>
+          <a:xfrm>
+            <a:off x="2578851" y="2695106"/>
+            <a:ext cx="789500" cy="789500"/>
+            <a:chOff x="5411755" y="270588"/>
+            <a:chExt cx="1866122" cy="1866122"/>
+          </a:xfrm>
+        </p:grpSpPr>
+        <p:sp>
+          <p:nvSpPr>
+            <p:cNvPr id="22" name="Oval 21">
+              <a:extLst>
+                <a:ext uri="{FF2B5EF4-FFF2-40B4-BE49-F238E27FC236}">
+                  <a16:creationId xmlns:a16="http://schemas.microsoft.com/office/drawing/2014/main" id="{825AFFFC-FF5E-FF33-7085-C26EB63842AF}"/>
+                </a:ext>
+              </a:extLst>
+            </p:cNvPr>
+            <p:cNvSpPr/>
+            <p:nvPr/>
+          </p:nvSpPr>
+          <p:spPr>
+            <a:xfrm>
+              <a:off x="5411755" y="270588"/>
+              <a:ext cx="1866122" cy="1866122"/>
+            </a:xfrm>
+            <a:prstGeom prst="ellipse">
+              <a:avLst/>
+            </a:prstGeom>
+          </p:spPr>
+          <p:style>
+            <a:lnRef idx="2">
+              <a:schemeClr val="accent1">
+                <a:shade val="15000"/>
+              </a:schemeClr>
+            </a:lnRef>
+            <a:fillRef idx="1">
+              <a:schemeClr val="accent1"/>
+            </a:fillRef>
+            <a:effectRef idx="0">
+              <a:schemeClr val="accent1"/>
+            </a:effectRef>
+            <a:fontRef idx="minor">
+              <a:schemeClr val="lt1"/>
+            </a:fontRef>
+          </p:style>
+          <p:txBody>
+            <a:bodyPr rtlCol="0" anchor="ctr"/>
+            <a:lstStyle/>
+            <a:p>
+              <a:pPr algn="ctr"/>
+              <a:endParaRPr lang="en-CA"/>
+            </a:p>
+          </p:txBody>
+        </p:sp>
+        <p:sp>
+          <p:nvSpPr>
+            <p:cNvPr id="23" name="Oval 22">
+              <a:extLst>
+                <a:ext uri="{FF2B5EF4-FFF2-40B4-BE49-F238E27FC236}">
+                  <a16:creationId xmlns:a16="http://schemas.microsoft.com/office/drawing/2014/main" id="{83C253AA-3039-5D64-1249-B335672BAF69}"/>
+                </a:ext>
+              </a:extLst>
+            </p:cNvPr>
+            <p:cNvSpPr/>
+            <p:nvPr/>
+          </p:nvSpPr>
+          <p:spPr>
+            <a:xfrm>
+              <a:off x="6218853" y="1077686"/>
+              <a:ext cx="251926" cy="251926"/>
+            </a:xfrm>
+            <a:prstGeom prst="ellipse">
+              <a:avLst/>
+            </a:prstGeom>
+          </p:spPr>
+          <p:style>
+            <a:lnRef idx="2">
+              <a:schemeClr val="accent6">
+                <a:shade val="15000"/>
+              </a:schemeClr>
+            </a:lnRef>
+            <a:fillRef idx="1">
+              <a:schemeClr val="accent6"/>
+            </a:fillRef>
+            <a:effectRef idx="0">
+              <a:schemeClr val="accent6"/>
+            </a:effectRef>
+            <a:fontRef idx="minor">
+              <a:schemeClr val="lt1"/>
+            </a:fontRef>
+          </p:style>
+          <p:txBody>
+            <a:bodyPr rtlCol="0" anchor="ctr"/>
+            <a:lstStyle/>
+            <a:p>
+              <a:pPr algn="ctr"/>
+              <a:endParaRPr lang="en-CA"/>
+            </a:p>
+          </p:txBody>
+        </p:sp>
+      </p:grpSp>
+      <p:sp>
+        <p:nvSpPr>
+          <p:cNvPr id="24" name="Arrow: Right 23">
+            <a:extLst>
+              <a:ext uri="{FF2B5EF4-FFF2-40B4-BE49-F238E27FC236}">
+                <a16:creationId xmlns:a16="http://schemas.microsoft.com/office/drawing/2014/main" id="{613BBE66-9656-16BB-7D74-6F7B0ACB816F}"/>
+              </a:ext>
+            </a:extLst>
+          </p:cNvPr>
+          <p:cNvSpPr/>
+          <p:nvPr/>
+        </p:nvSpPr>
+        <p:spPr>
+          <a:xfrm>
+            <a:off x="233266" y="2695106"/>
+            <a:ext cx="2090057" cy="783771"/>
+          </a:xfrm>
+          <a:prstGeom prst="rightArrow">
+            <a:avLst/>
+          </a:prstGeom>
+        </p:spPr>
+        <p:style>
+          <a:lnRef idx="2">
+            <a:schemeClr val="accent1">
+              <a:shade val="15000"/>
+            </a:schemeClr>
+          </a:lnRef>
+          <a:fillRef idx="1">
+            <a:schemeClr val="accent1"/>
+          </a:fillRef>
+          <a:effectRef idx="0">
+            <a:schemeClr val="accent1"/>
+          </a:effectRef>
+          <a:fontRef idx="minor">
+            <a:schemeClr val="lt1"/>
+          </a:fontRef>
+        </p:style>
+        <p:txBody>
+          <a:bodyPr rtlCol="0" anchor="ctr"/>
+          <a:lstStyle/>
+          <a:p>
+            <a:pPr algn="ctr"/>
+            <a:r>
+              <a:rPr lang="en-CA" dirty="0"/>
+              <a:t>t = 1, Y = 9</a:t>
+            </a:r>
+          </a:p>
+        </p:txBody>
+      </p:sp>
+      <p:sp>
+        <p:nvSpPr>
+          <p:cNvPr id="25" name="TextBox 24">
+            <a:extLst>
+              <a:ext uri="{FF2B5EF4-FFF2-40B4-BE49-F238E27FC236}">
+                <a16:creationId xmlns:a16="http://schemas.microsoft.com/office/drawing/2014/main" id="{EFEB5733-8A52-A2CE-6047-0FBDF6BA4ECD}"/>
+              </a:ext>
+            </a:extLst>
+          </p:cNvPr>
+          <p:cNvSpPr txBox="1"/>
+          <p:nvPr/>
+        </p:nvSpPr>
+        <p:spPr>
+          <a:xfrm>
+            <a:off x="3629608" y="241528"/>
+            <a:ext cx="2090057" cy="646331"/>
+          </a:xfrm>
+          <a:prstGeom prst="rect">
+            <a:avLst/>
+          </a:prstGeom>
+          <a:noFill/>
+        </p:spPr>
+        <p:txBody>
+          <a:bodyPr wrap="square" rtlCol="0">
+            <a:spAutoFit/>
+          </a:bodyPr>
+          <a:lstStyle/>
+          <a:p>
+            <a:r>
+              <a:rPr lang="en-CA" dirty="0"/>
+              <a:t>Vel = -1 m/s</a:t>
+            </a:r>
+          </a:p>
+          <a:p>
+            <a:r>
+              <a:rPr lang="en-CA" dirty="0"/>
+              <a:t>Accel = -1 m/s/s</a:t>
+            </a:r>
+          </a:p>
+        </p:txBody>
+      </p:sp>
+      <p:sp>
+        <p:nvSpPr>
+          <p:cNvPr id="26" name="TextBox 25">
+            <a:extLst>
+              <a:ext uri="{FF2B5EF4-FFF2-40B4-BE49-F238E27FC236}">
+                <a16:creationId xmlns:a16="http://schemas.microsoft.com/office/drawing/2014/main" id="{2FCC90B8-0704-668B-C8D3-74A54B89F742}"/>
+              </a:ext>
+            </a:extLst>
+          </p:cNvPr>
+          <p:cNvSpPr txBox="1"/>
+          <p:nvPr/>
+        </p:nvSpPr>
+        <p:spPr>
+          <a:xfrm>
+            <a:off x="3597688" y="2967335"/>
+            <a:ext cx="2090057" cy="1200329"/>
+          </a:xfrm>
+          <a:prstGeom prst="rect">
+            <a:avLst/>
+          </a:prstGeom>
+          <a:noFill/>
+        </p:spPr>
+        <p:txBody>
+          <a:bodyPr wrap="square" rtlCol="0">
+            <a:spAutoFit/>
+          </a:bodyPr>
+          <a:lstStyle/>
+          <a:p>
+            <a:r>
+              <a:rPr lang="en-CA" dirty="0"/>
+              <a:t>dT = 1 second</a:t>
+            </a:r>
+          </a:p>
+          <a:p>
+            <a:r>
+              <a:rPr lang="en-CA" dirty="0" err="1"/>
+              <a:t>dV</a:t>
+            </a:r>
+            <a:r>
+              <a:rPr lang="en-CA" dirty="0"/>
+              <a:t> = dT * Vel         </a:t>
+            </a:r>
+          </a:p>
+          <a:p>
+            <a:r>
+              <a:rPr lang="en-CA" dirty="0" err="1"/>
+              <a:t>dP</a:t>
+            </a:r>
+            <a:r>
+              <a:rPr lang="en-CA" dirty="0"/>
+              <a:t> = 1 * -2 = -2 m</a:t>
+            </a:r>
+          </a:p>
+          <a:p>
+            <a:r>
+              <a:rPr lang="en-CA" dirty="0"/>
+              <a:t>P = P + </a:t>
+            </a:r>
+            <a:r>
+              <a:rPr lang="en-CA" dirty="0" err="1"/>
+              <a:t>dP</a:t>
+            </a:r>
+            <a:endParaRPr lang="en-CA" dirty="0"/>
+          </a:p>
+        </p:txBody>
+      </p:sp>
+      <p:grpSp>
+        <p:nvGrpSpPr>
+          <p:cNvPr id="27" name="Group 26">
+            <a:extLst>
+              <a:ext uri="{FF2B5EF4-FFF2-40B4-BE49-F238E27FC236}">
+                <a16:creationId xmlns:a16="http://schemas.microsoft.com/office/drawing/2014/main" id="{91DCFD37-34BE-43BD-C542-FF17D666820C}"/>
+              </a:ext>
+            </a:extLst>
+          </p:cNvPr>
+          <p:cNvGrpSpPr/>
+          <p:nvPr/>
+        </p:nvGrpSpPr>
+        <p:grpSpPr>
+          <a:xfrm>
+            <a:off x="8093242" y="955348"/>
+            <a:ext cx="789500" cy="789500"/>
+            <a:chOff x="5411755" y="270588"/>
+            <a:chExt cx="1866122" cy="1866122"/>
+          </a:xfrm>
+        </p:grpSpPr>
+        <p:sp>
+          <p:nvSpPr>
+            <p:cNvPr id="28" name="Oval 27">
+              <a:extLst>
+                <a:ext uri="{FF2B5EF4-FFF2-40B4-BE49-F238E27FC236}">
+                  <a16:creationId xmlns:a16="http://schemas.microsoft.com/office/drawing/2014/main" id="{4BC15F96-6D8D-82B5-F66A-B510C934940E}"/>
+                </a:ext>
+              </a:extLst>
+            </p:cNvPr>
+            <p:cNvSpPr/>
+            <p:nvPr/>
+          </p:nvSpPr>
+          <p:spPr>
+            <a:xfrm>
+              <a:off x="5411755" y="270588"/>
+              <a:ext cx="1866122" cy="1866122"/>
+            </a:xfrm>
+            <a:prstGeom prst="ellipse">
+              <a:avLst/>
+            </a:prstGeom>
+          </p:spPr>
+          <p:style>
+            <a:lnRef idx="2">
+              <a:schemeClr val="accent1">
+                <a:shade val="15000"/>
+              </a:schemeClr>
+            </a:lnRef>
+            <a:fillRef idx="1">
+              <a:schemeClr val="accent1"/>
+            </a:fillRef>
+            <a:effectRef idx="0">
+              <a:schemeClr val="accent1"/>
+            </a:effectRef>
+            <a:fontRef idx="minor">
+              <a:schemeClr val="lt1"/>
+            </a:fontRef>
+          </p:style>
+          <p:txBody>
+            <a:bodyPr rtlCol="0" anchor="ctr"/>
+            <a:lstStyle/>
+            <a:p>
+              <a:pPr algn="ctr"/>
+              <a:endParaRPr lang="en-CA"/>
+            </a:p>
+          </p:txBody>
+        </p:sp>
+        <p:sp>
+          <p:nvSpPr>
+            <p:cNvPr id="29" name="Oval 28">
+              <a:extLst>
+                <a:ext uri="{FF2B5EF4-FFF2-40B4-BE49-F238E27FC236}">
+                  <a16:creationId xmlns:a16="http://schemas.microsoft.com/office/drawing/2014/main" id="{41424F1A-DF80-6A11-AD99-DC8E0FE5953C}"/>
+                </a:ext>
+              </a:extLst>
+            </p:cNvPr>
+            <p:cNvSpPr/>
+            <p:nvPr/>
+          </p:nvSpPr>
+          <p:spPr>
+            <a:xfrm>
+              <a:off x="6218853" y="1077686"/>
+              <a:ext cx="251926" cy="251926"/>
+            </a:xfrm>
+            <a:prstGeom prst="ellipse">
+              <a:avLst/>
+            </a:prstGeom>
+          </p:spPr>
+          <p:style>
+            <a:lnRef idx="2">
+              <a:schemeClr val="accent6">
+                <a:shade val="15000"/>
+              </a:schemeClr>
+            </a:lnRef>
+            <a:fillRef idx="1">
+              <a:schemeClr val="accent6"/>
+            </a:fillRef>
+            <a:effectRef idx="0">
+              <a:schemeClr val="accent6"/>
+            </a:effectRef>
+            <a:fontRef idx="minor">
+              <a:schemeClr val="lt1"/>
+            </a:fontRef>
+          </p:style>
+          <p:txBody>
+            <a:bodyPr rtlCol="0" anchor="ctr"/>
+            <a:lstStyle/>
+            <a:p>
+              <a:pPr algn="ctr"/>
+              <a:endParaRPr lang="en-CA"/>
+            </a:p>
+          </p:txBody>
+        </p:sp>
+      </p:grpSp>
+      <p:sp>
+        <p:nvSpPr>
+          <p:cNvPr id="31" name="Arrow: Right 30">
+            <a:extLst>
+              <a:ext uri="{FF2B5EF4-FFF2-40B4-BE49-F238E27FC236}">
+                <a16:creationId xmlns:a16="http://schemas.microsoft.com/office/drawing/2014/main" id="{70E384EA-8268-4A53-A148-17D2A50A84D7}"/>
+              </a:ext>
+            </a:extLst>
+          </p:cNvPr>
+          <p:cNvSpPr/>
+          <p:nvPr/>
+        </p:nvSpPr>
+        <p:spPr>
+          <a:xfrm>
+            <a:off x="5747657" y="955348"/>
+            <a:ext cx="2090057" cy="783771"/>
+          </a:xfrm>
+          <a:prstGeom prst="rightArrow">
+            <a:avLst/>
+          </a:prstGeom>
+        </p:spPr>
+        <p:style>
+          <a:lnRef idx="2">
+            <a:schemeClr val="accent1">
+              <a:shade val="15000"/>
+            </a:schemeClr>
+          </a:lnRef>
+          <a:fillRef idx="1">
+            <a:schemeClr val="accent1"/>
+          </a:fillRef>
+          <a:effectRef idx="0">
+            <a:schemeClr val="accent1"/>
+          </a:effectRef>
+          <a:fontRef idx="minor">
+            <a:schemeClr val="lt1"/>
+          </a:fontRef>
+        </p:style>
+        <p:txBody>
+          <a:bodyPr rtlCol="0" anchor="ctr"/>
+          <a:lstStyle/>
+          <a:p>
+            <a:pPr algn="ctr"/>
+            <a:r>
+              <a:rPr lang="en-CA" dirty="0"/>
+              <a:t>t = 0, Y = 10</a:t>
+            </a:r>
+          </a:p>
+        </p:txBody>
+      </p:sp>
+      <p:grpSp>
+        <p:nvGrpSpPr>
+          <p:cNvPr id="32" name="Group 31">
+            <a:extLst>
+              <a:ext uri="{FF2B5EF4-FFF2-40B4-BE49-F238E27FC236}">
+                <a16:creationId xmlns:a16="http://schemas.microsoft.com/office/drawing/2014/main" id="{49D9B9E5-E36B-F81F-FC08-FB8FA409F1C8}"/>
+              </a:ext>
+            </a:extLst>
+          </p:cNvPr>
+          <p:cNvGrpSpPr/>
+          <p:nvPr/>
+        </p:nvGrpSpPr>
+        <p:grpSpPr>
+          <a:xfrm>
+            <a:off x="8093242" y="1905606"/>
+            <a:ext cx="789500" cy="789500"/>
+            <a:chOff x="5411755" y="270588"/>
+            <a:chExt cx="1866122" cy="1866122"/>
+          </a:xfrm>
+        </p:grpSpPr>
+        <p:sp>
+          <p:nvSpPr>
+            <p:cNvPr id="33" name="Oval 32">
+              <a:extLst>
+                <a:ext uri="{FF2B5EF4-FFF2-40B4-BE49-F238E27FC236}">
+                  <a16:creationId xmlns:a16="http://schemas.microsoft.com/office/drawing/2014/main" id="{784E5C8F-2200-2964-EC5A-073C6FEE7E25}"/>
+                </a:ext>
+              </a:extLst>
+            </p:cNvPr>
+            <p:cNvSpPr/>
+            <p:nvPr/>
+          </p:nvSpPr>
+          <p:spPr>
+            <a:xfrm>
+              <a:off x="5411755" y="270588"/>
+              <a:ext cx="1866122" cy="1866122"/>
+            </a:xfrm>
+            <a:prstGeom prst="ellipse">
+              <a:avLst/>
+            </a:prstGeom>
+          </p:spPr>
+          <p:style>
+            <a:lnRef idx="2">
+              <a:schemeClr val="accent1">
+                <a:shade val="15000"/>
+              </a:schemeClr>
+            </a:lnRef>
+            <a:fillRef idx="1">
+              <a:schemeClr val="accent1"/>
+            </a:fillRef>
+            <a:effectRef idx="0">
+              <a:schemeClr val="accent1"/>
+            </a:effectRef>
+            <a:fontRef idx="minor">
+              <a:schemeClr val="lt1"/>
+            </a:fontRef>
+          </p:style>
+          <p:txBody>
+            <a:bodyPr rtlCol="0" anchor="ctr"/>
+            <a:lstStyle/>
+            <a:p>
+              <a:pPr algn="ctr"/>
+              <a:endParaRPr lang="en-CA"/>
+            </a:p>
+          </p:txBody>
+        </p:sp>
+        <p:sp>
+          <p:nvSpPr>
+            <p:cNvPr id="34" name="Oval 33">
+              <a:extLst>
+                <a:ext uri="{FF2B5EF4-FFF2-40B4-BE49-F238E27FC236}">
+                  <a16:creationId xmlns:a16="http://schemas.microsoft.com/office/drawing/2014/main" id="{A2215C86-222D-C5EF-C2E1-4F8312FD0C26}"/>
+                </a:ext>
+              </a:extLst>
+            </p:cNvPr>
+            <p:cNvSpPr/>
+            <p:nvPr/>
+          </p:nvSpPr>
+          <p:spPr>
+            <a:xfrm>
+              <a:off x="6218853" y="1077686"/>
+              <a:ext cx="251926" cy="251926"/>
+            </a:xfrm>
+            <a:prstGeom prst="ellipse">
+              <a:avLst/>
+            </a:prstGeom>
+          </p:spPr>
+          <p:style>
+            <a:lnRef idx="2">
+              <a:schemeClr val="accent6">
+                <a:shade val="15000"/>
+              </a:schemeClr>
+            </a:lnRef>
+            <a:fillRef idx="1">
+              <a:schemeClr val="accent6"/>
+            </a:fillRef>
+            <a:effectRef idx="0">
+              <a:schemeClr val="accent6"/>
+            </a:effectRef>
+            <a:fontRef idx="minor">
+              <a:schemeClr val="lt1"/>
+            </a:fontRef>
+          </p:style>
+          <p:txBody>
+            <a:bodyPr rtlCol="0" anchor="ctr"/>
+            <a:lstStyle/>
+            <a:p>
+              <a:pPr algn="ctr"/>
+              <a:endParaRPr lang="en-CA"/>
+            </a:p>
+          </p:txBody>
+        </p:sp>
+      </p:grpSp>
+      <p:sp>
+        <p:nvSpPr>
+          <p:cNvPr id="35" name="Arrow: Right 34">
+            <a:extLst>
+              <a:ext uri="{FF2B5EF4-FFF2-40B4-BE49-F238E27FC236}">
+                <a16:creationId xmlns:a16="http://schemas.microsoft.com/office/drawing/2014/main" id="{B7AD19BC-D61C-E956-7D79-56AB8B69A2F8}"/>
+              </a:ext>
+            </a:extLst>
+          </p:cNvPr>
+          <p:cNvSpPr/>
+          <p:nvPr/>
+        </p:nvSpPr>
+        <p:spPr>
+          <a:xfrm>
+            <a:off x="5832455" y="1911335"/>
+            <a:ext cx="2090057" cy="783771"/>
+          </a:xfrm>
+          <a:prstGeom prst="rightArrow">
+            <a:avLst/>
+          </a:prstGeom>
+        </p:spPr>
+        <p:style>
+          <a:lnRef idx="2">
+            <a:schemeClr val="accent1">
+              <a:shade val="15000"/>
+            </a:schemeClr>
+          </a:lnRef>
+          <a:fillRef idx="1">
+            <a:schemeClr val="accent1"/>
+          </a:fillRef>
+          <a:effectRef idx="0">
+            <a:schemeClr val="accent1"/>
+          </a:effectRef>
+          <a:fontRef idx="minor">
+            <a:schemeClr val="lt1"/>
+          </a:fontRef>
+        </p:style>
+        <p:txBody>
+          <a:bodyPr rtlCol="0" anchor="ctr"/>
+          <a:lstStyle/>
+          <a:p>
+            <a:pPr algn="ctr"/>
+            <a:r>
+              <a:rPr lang="en-CA" dirty="0"/>
+              <a:t>t = 0.1, Y = 9.9</a:t>
+            </a:r>
+          </a:p>
+        </p:txBody>
+      </p:sp>
+      <p:sp>
+        <p:nvSpPr>
+          <p:cNvPr id="36" name="TextBox 35">
+            <a:extLst>
+              <a:ext uri="{FF2B5EF4-FFF2-40B4-BE49-F238E27FC236}">
+                <a16:creationId xmlns:a16="http://schemas.microsoft.com/office/drawing/2014/main" id="{3A5BB0F2-8CCD-F27F-BF11-7E2CC6F66DE0}"/>
+              </a:ext>
+            </a:extLst>
+          </p:cNvPr>
+          <p:cNvSpPr txBox="1"/>
+          <p:nvPr/>
+        </p:nvSpPr>
+        <p:spPr>
+          <a:xfrm>
+            <a:off x="9224200" y="3244334"/>
+            <a:ext cx="2659143" cy="923330"/>
+          </a:xfrm>
+          <a:prstGeom prst="rect">
+            <a:avLst/>
+          </a:prstGeom>
+          <a:noFill/>
+        </p:spPr>
+        <p:txBody>
+          <a:bodyPr wrap="square" rtlCol="0">
+            <a:spAutoFit/>
+          </a:bodyPr>
+          <a:lstStyle/>
+          <a:p>
+            <a:r>
+              <a:rPr lang="en-CA" dirty="0"/>
+              <a:t>dT = 0.1 second</a:t>
+            </a:r>
+          </a:p>
+          <a:p>
+            <a:r>
+              <a:rPr lang="en-CA" dirty="0" err="1"/>
+              <a:t>dV</a:t>
+            </a:r>
+            <a:r>
+              <a:rPr lang="en-CA" dirty="0"/>
+              <a:t> = dT * Vel            </a:t>
+            </a:r>
+          </a:p>
+          <a:p>
+            <a:r>
+              <a:rPr lang="en-CA" dirty="0" err="1"/>
+              <a:t>dP</a:t>
+            </a:r>
+            <a:r>
+              <a:rPr lang="en-CA" dirty="0"/>
+              <a:t> = 0.1 * -1.1 = -0.1</a:t>
+            </a:r>
+          </a:p>
+        </p:txBody>
+      </p:sp>
+      <p:sp>
+        <p:nvSpPr>
+          <p:cNvPr id="37" name="TextBox 36">
+            <a:extLst>
+              <a:ext uri="{FF2B5EF4-FFF2-40B4-BE49-F238E27FC236}">
+                <a16:creationId xmlns:a16="http://schemas.microsoft.com/office/drawing/2014/main" id="{9E0668F4-4F54-2FF0-6265-000EA76B7C3A}"/>
+              </a:ext>
+            </a:extLst>
+          </p:cNvPr>
+          <p:cNvSpPr txBox="1"/>
+          <p:nvPr/>
+        </p:nvSpPr>
+        <p:spPr>
+          <a:xfrm>
+            <a:off x="1485946" y="4740245"/>
+            <a:ext cx="2824797" cy="646331"/>
+          </a:xfrm>
+          <a:prstGeom prst="rect">
+            <a:avLst/>
+          </a:prstGeom>
+          <a:noFill/>
+        </p:spPr>
+        <p:txBody>
+          <a:bodyPr wrap="square" rtlCol="0">
+            <a:spAutoFit/>
+          </a:bodyPr>
+          <a:lstStyle/>
+          <a:p>
+            <a:r>
+              <a:rPr lang="en-CA" dirty="0"/>
+              <a:t> v = dT * A</a:t>
+            </a:r>
+          </a:p>
+          <a:p>
+            <a:r>
+              <a:rPr lang="en-CA" dirty="0"/>
+              <a:t> x = dT * V</a:t>
+            </a:r>
+          </a:p>
+        </p:txBody>
+      </p:sp>
+      <p:sp>
+        <p:nvSpPr>
+          <p:cNvPr id="38" name="TextBox 37">
+            <a:extLst>
+              <a:ext uri="{FF2B5EF4-FFF2-40B4-BE49-F238E27FC236}">
+                <a16:creationId xmlns:a16="http://schemas.microsoft.com/office/drawing/2014/main" id="{E729CD7C-6AAF-B9DC-8B0E-C3A0C4151A13}"/>
+              </a:ext>
+            </a:extLst>
+          </p:cNvPr>
+          <p:cNvSpPr txBox="1"/>
+          <p:nvPr/>
+        </p:nvSpPr>
+        <p:spPr>
+          <a:xfrm>
+            <a:off x="3509294" y="1346704"/>
+            <a:ext cx="2386190" cy="1200329"/>
+          </a:xfrm>
+          <a:prstGeom prst="rect">
+            <a:avLst/>
+          </a:prstGeom>
+          <a:noFill/>
+        </p:spPr>
+        <p:txBody>
+          <a:bodyPr wrap="square" rtlCol="0">
+            <a:spAutoFit/>
+          </a:bodyPr>
+          <a:lstStyle/>
+          <a:p>
+            <a:r>
+              <a:rPr lang="en-CA" dirty="0"/>
+              <a:t>dT = 1 second</a:t>
+            </a:r>
+          </a:p>
+          <a:p>
+            <a:r>
+              <a:rPr lang="en-CA" dirty="0" err="1"/>
+              <a:t>dA</a:t>
+            </a:r>
+            <a:r>
+              <a:rPr lang="en-CA" dirty="0"/>
+              <a:t> = dT * A         </a:t>
+            </a:r>
+          </a:p>
+          <a:p>
+            <a:r>
+              <a:rPr lang="en-CA" dirty="0" err="1"/>
+              <a:t>dV</a:t>
+            </a:r>
+            <a:r>
+              <a:rPr lang="en-CA" dirty="0"/>
+              <a:t> = 1 * -1 = -1  m/s</a:t>
+            </a:r>
+          </a:p>
+          <a:p>
+            <a:r>
+              <a:rPr lang="en-CA" dirty="0"/>
+              <a:t>V = V + </a:t>
+            </a:r>
+            <a:r>
+              <a:rPr lang="en-CA" dirty="0" err="1"/>
+              <a:t>dV</a:t>
+            </a:r>
+            <a:endParaRPr lang="en-CA" dirty="0"/>
+          </a:p>
+        </p:txBody>
+      </p:sp>
+      <p:sp>
+        <p:nvSpPr>
+          <p:cNvPr id="39" name="TextBox 38">
+            <a:extLst>
+              <a:ext uri="{FF2B5EF4-FFF2-40B4-BE49-F238E27FC236}">
+                <a16:creationId xmlns:a16="http://schemas.microsoft.com/office/drawing/2014/main" id="{08686142-6644-CE17-26F2-FF1751DCA790}"/>
+              </a:ext>
+            </a:extLst>
+          </p:cNvPr>
+          <p:cNvSpPr txBox="1"/>
+          <p:nvPr/>
+        </p:nvSpPr>
+        <p:spPr>
+          <a:xfrm>
+            <a:off x="9224200" y="1551091"/>
+            <a:ext cx="2734533" cy="1477328"/>
+          </a:xfrm>
+          <a:prstGeom prst="rect">
+            <a:avLst/>
+          </a:prstGeom>
+          <a:noFill/>
+        </p:spPr>
+        <p:txBody>
+          <a:bodyPr wrap="square" rtlCol="0">
+            <a:spAutoFit/>
+          </a:bodyPr>
+          <a:lstStyle/>
+          <a:p>
+            <a:r>
+              <a:rPr lang="en-CA" dirty="0"/>
+              <a:t>dT = 0.1 second</a:t>
+            </a:r>
+          </a:p>
+          <a:p>
+            <a:r>
+              <a:rPr lang="en-CA" dirty="0" err="1"/>
+              <a:t>dA</a:t>
+            </a:r>
+            <a:r>
+              <a:rPr lang="en-CA" dirty="0"/>
+              <a:t> = dT * A         </a:t>
+            </a:r>
+          </a:p>
+          <a:p>
+            <a:r>
+              <a:rPr lang="en-CA" dirty="0" err="1"/>
+              <a:t>dV</a:t>
+            </a:r>
+            <a:r>
+              <a:rPr lang="en-CA" dirty="0"/>
+              <a:t> = 0.1 * -1 = -0.1  m/s</a:t>
+            </a:r>
+          </a:p>
+          <a:p>
+            <a:r>
+              <a:rPr lang="en-CA" dirty="0"/>
+              <a:t>V = V + </a:t>
+            </a:r>
+            <a:r>
+              <a:rPr lang="en-CA" dirty="0" err="1"/>
+              <a:t>dV</a:t>
+            </a:r>
+            <a:endParaRPr lang="en-CA" dirty="0"/>
+          </a:p>
+          <a:p>
+            <a:r>
+              <a:rPr lang="en-CA" dirty="0"/>
+              <a:t>V = -1 + (-0.1) = -1.1 m/</a:t>
+            </a:r>
+          </a:p>
+        </p:txBody>
+      </p:sp>
+    </p:spTree>
+    <p:extLst>
+      <p:ext uri="{BB962C8B-B14F-4D97-AF65-F5344CB8AC3E}">
+        <p14:creationId xmlns:p14="http://schemas.microsoft.com/office/powerpoint/2010/main" val="3035860912"/>
+      </p:ext>
+    </p:extLst>
+  </p:cSld>
+  <p:clrMapOvr>
+    <a:masterClrMapping/>
+  </p:clrMapOvr>
+</p:sld>
+</file>
+
 <file path=ppt/slides/slide2.xml><?xml version="1.0" encoding="utf-8"?>
 <p:sld xmlns:a="http://schemas.openxmlformats.org/drawingml/2006/main" xmlns:r="http://schemas.openxmlformats.org/officeDocument/2006/relationships" xmlns:p="http://schemas.openxmlformats.org/presentationml/2006/main">
   <p:cSld>
@@ -5763,7 +7514,12 @@
             <p:ph type="title"/>
           </p:nvPr>
         </p:nvSpPr>
-        <p:spPr/>
+        <p:spPr>
+          <a:xfrm>
+            <a:off x="838200" y="365125"/>
+            <a:ext cx="10515600" cy="750893"/>
+          </a:xfrm>
+        </p:spPr>
         <p:txBody>
           <a:bodyPr/>
           <a:lstStyle/>
@@ -6007,58 +7763,12 @@
           </a:p>
         </p:txBody>
       </p:sp>
-      <p:sp>
-        <p:nvSpPr>
-          <p:cNvPr id="10" name="Flowchart: Terminator 9">
-            <a:extLst>
-              <a:ext uri="{FF2B5EF4-FFF2-40B4-BE49-F238E27FC236}">
-                <a16:creationId xmlns:a16="http://schemas.microsoft.com/office/drawing/2014/main" id="{656EB99F-7322-77DF-DF23-ECB7804021C7}"/>
-              </a:ext>
-            </a:extLst>
-          </p:cNvPr>
-          <p:cNvSpPr/>
-          <p:nvPr/>
-        </p:nvSpPr>
-        <p:spPr>
-          <a:xfrm>
-            <a:off x="5159829" y="4394718"/>
-            <a:ext cx="4890070" cy="1613723"/>
-          </a:xfrm>
-          <a:prstGeom prst="flowChartTerminator">
-            <a:avLst/>
-          </a:prstGeom>
-        </p:spPr>
-        <p:style>
-          <a:lnRef idx="2">
-            <a:schemeClr val="accent1">
-              <a:shade val="15000"/>
-            </a:schemeClr>
-          </a:lnRef>
-          <a:fillRef idx="1">
-            <a:schemeClr val="accent1"/>
-          </a:fillRef>
-          <a:effectRef idx="0">
-            <a:schemeClr val="accent1"/>
-          </a:effectRef>
-          <a:fontRef idx="minor">
-            <a:schemeClr val="lt1"/>
-          </a:fontRef>
-        </p:style>
-        <p:txBody>
-          <a:bodyPr rtlCol="0" anchor="ctr"/>
-          <a:lstStyle/>
-          <a:p>
-            <a:pPr algn="ctr"/>
-            <a:endParaRPr lang="en-CA"/>
-          </a:p>
-        </p:txBody>
-      </p:sp>
       <p:grpSp>
         <p:nvGrpSpPr>
-          <p:cNvPr id="19" name="Group 18">
-            <a:extLst>
-              <a:ext uri="{FF2B5EF4-FFF2-40B4-BE49-F238E27FC236}">
-                <a16:creationId xmlns:a16="http://schemas.microsoft.com/office/drawing/2014/main" id="{B1B25250-59B7-9691-9F0F-FB53A75F2021}"/>
+          <p:cNvPr id="13" name="Group 12">
+            <a:extLst>
+              <a:ext uri="{FF2B5EF4-FFF2-40B4-BE49-F238E27FC236}">
+                <a16:creationId xmlns:a16="http://schemas.microsoft.com/office/drawing/2014/main" id="{5EF55A50-C4F1-0656-3F8C-950310F9580F}"/>
               </a:ext>
             </a:extLst>
           </p:cNvPr>
@@ -6066,19 +7776,65 @@
           <p:nvPr/>
         </p:nvGrpSpPr>
         <p:grpSpPr>
-          <a:xfrm>
-            <a:off x="5159829" y="4413142"/>
-            <a:ext cx="1576873" cy="1576873"/>
-            <a:chOff x="5159829" y="4413142"/>
-            <a:chExt cx="1576873" cy="1576873"/>
+          <a:xfrm rot="803927">
+            <a:off x="4422295" y="4446273"/>
+            <a:ext cx="4890070" cy="1613723"/>
+            <a:chOff x="5159829" y="4394718"/>
+            <a:chExt cx="4890070" cy="1613723"/>
           </a:xfrm>
         </p:grpSpPr>
+        <p:sp>
+          <p:nvSpPr>
+            <p:cNvPr id="10" name="Flowchart: Terminator 9">
+              <a:extLst>
+                <a:ext uri="{FF2B5EF4-FFF2-40B4-BE49-F238E27FC236}">
+                  <a16:creationId xmlns:a16="http://schemas.microsoft.com/office/drawing/2014/main" id="{656EB99F-7322-77DF-DF23-ECB7804021C7}"/>
+                </a:ext>
+              </a:extLst>
+            </p:cNvPr>
+            <p:cNvSpPr/>
+            <p:nvPr/>
+          </p:nvSpPr>
+          <p:spPr>
+            <a:xfrm>
+              <a:off x="5159829" y="4394718"/>
+              <a:ext cx="4890070" cy="1613723"/>
+            </a:xfrm>
+            <a:prstGeom prst="flowChartTerminator">
+              <a:avLst/>
+            </a:prstGeom>
+          </p:spPr>
+          <p:style>
+            <a:lnRef idx="2">
+              <a:schemeClr val="accent1">
+                <a:shade val="15000"/>
+              </a:schemeClr>
+            </a:lnRef>
+            <a:fillRef idx="1">
+              <a:schemeClr val="accent1"/>
+            </a:fillRef>
+            <a:effectRef idx="0">
+              <a:schemeClr val="accent1"/>
+            </a:effectRef>
+            <a:fontRef idx="minor">
+              <a:schemeClr val="lt1"/>
+            </a:fontRef>
+          </p:style>
+          <p:txBody>
+            <a:bodyPr rtlCol="0" anchor="ctr"/>
+            <a:lstStyle/>
+            <a:p>
+              <a:pPr algn="ctr"/>
+              <a:endParaRPr lang="en-CA"/>
+            </a:p>
+          </p:txBody>
+        </p:sp>
         <p:grpSp>
           <p:nvGrpSpPr>
-            <p:cNvPr id="15" name="Group 14">
+            <p:cNvPr id="19" name="Group 18">
               <a:extLst>
                 <a:ext uri="{FF2B5EF4-FFF2-40B4-BE49-F238E27FC236}">
-                  <a16:creationId xmlns:a16="http://schemas.microsoft.com/office/drawing/2014/main" id="{1C977840-FCA4-D7B1-C60B-368189FC1EDC}"/>
+                  <a16:creationId xmlns:a16="http://schemas.microsoft.com/office/drawing/2014/main" id="{B1B25250-59B7-9691-9F0F-FB53A75F2021}"/>
                 </a:ext>
               </a:extLst>
             </p:cNvPr>
@@ -6093,12 +7849,187 @@
               <a:chExt cx="1576873" cy="1576873"/>
             </a:xfrm>
           </p:grpSpPr>
+          <p:grpSp>
+            <p:nvGrpSpPr>
+              <p:cNvPr id="15" name="Group 14">
+                <a:extLst>
+                  <a:ext uri="{FF2B5EF4-FFF2-40B4-BE49-F238E27FC236}">
+                    <a16:creationId xmlns:a16="http://schemas.microsoft.com/office/drawing/2014/main" id="{1C977840-FCA4-D7B1-C60B-368189FC1EDC}"/>
+                  </a:ext>
+                </a:extLst>
+              </p:cNvPr>
+              <p:cNvGrpSpPr/>
+              <p:nvPr/>
+            </p:nvGrpSpPr>
+            <p:grpSpPr>
+              <a:xfrm>
+                <a:off x="5159829" y="4413142"/>
+                <a:ext cx="1576873" cy="1576873"/>
+                <a:chOff x="5159829" y="4413142"/>
+                <a:chExt cx="1576873" cy="1576873"/>
+              </a:xfrm>
+            </p:grpSpPr>
+            <p:sp>
+              <p:nvSpPr>
+                <p:cNvPr id="11" name="Oval 10">
+                  <a:extLst>
+                    <a:ext uri="{FF2B5EF4-FFF2-40B4-BE49-F238E27FC236}">
+                      <a16:creationId xmlns:a16="http://schemas.microsoft.com/office/drawing/2014/main" id="{40D7C560-ACF1-ACBA-A6D2-2311A0BE6A1B}"/>
+                    </a:ext>
+                  </a:extLst>
+                </p:cNvPr>
+                <p:cNvSpPr/>
+                <p:nvPr/>
+              </p:nvSpPr>
+              <p:spPr>
+                <a:xfrm>
+                  <a:off x="5159829" y="4413142"/>
+                  <a:ext cx="1576873" cy="1576873"/>
+                </a:xfrm>
+                <a:prstGeom prst="ellipse">
+                  <a:avLst/>
+                </a:prstGeom>
+              </p:spPr>
+              <p:style>
+                <a:lnRef idx="1">
+                  <a:schemeClr val="accent4"/>
+                </a:lnRef>
+                <a:fillRef idx="3">
+                  <a:schemeClr val="accent4"/>
+                </a:fillRef>
+                <a:effectRef idx="2">
+                  <a:schemeClr val="accent4"/>
+                </a:effectRef>
+                <a:fontRef idx="minor">
+                  <a:schemeClr val="lt1"/>
+                </a:fontRef>
+              </p:style>
+              <p:txBody>
+                <a:bodyPr rtlCol="0" anchor="ctr"/>
+                <a:lstStyle/>
+                <a:p>
+                  <a:pPr algn="ctr"/>
+                  <a:endParaRPr lang="en-CA"/>
+                </a:p>
+              </p:txBody>
+            </p:sp>
+            <p:sp>
+              <p:nvSpPr>
+                <p:cNvPr id="14" name="Oval 13">
+                  <a:extLst>
+                    <a:ext uri="{FF2B5EF4-FFF2-40B4-BE49-F238E27FC236}">
+                      <a16:creationId xmlns:a16="http://schemas.microsoft.com/office/drawing/2014/main" id="{605B340A-37B1-877D-B679-B0943ED4C213}"/>
+                    </a:ext>
+                  </a:extLst>
+                </p:cNvPr>
+                <p:cNvSpPr/>
+                <p:nvPr/>
+              </p:nvSpPr>
+              <p:spPr>
+                <a:xfrm>
+                  <a:off x="5822302" y="5038531"/>
+                  <a:ext cx="251926" cy="251926"/>
+                </a:xfrm>
+                <a:prstGeom prst="ellipse">
+                  <a:avLst/>
+                </a:prstGeom>
+              </p:spPr>
+              <p:style>
+                <a:lnRef idx="2">
+                  <a:schemeClr val="dk1">
+                    <a:shade val="15000"/>
+                  </a:schemeClr>
+                </a:lnRef>
+                <a:fillRef idx="1">
+                  <a:schemeClr val="dk1"/>
+                </a:fillRef>
+                <a:effectRef idx="0">
+                  <a:schemeClr val="dk1"/>
+                </a:effectRef>
+                <a:fontRef idx="minor">
+                  <a:schemeClr val="lt1"/>
+                </a:fontRef>
+              </p:style>
+              <p:txBody>
+                <a:bodyPr rtlCol="0" anchor="ctr"/>
+                <a:lstStyle/>
+                <a:p>
+                  <a:pPr algn="ctr"/>
+                  <a:endParaRPr lang="en-CA"/>
+                </a:p>
+              </p:txBody>
+            </p:sp>
+          </p:grpSp>
+          <p:cxnSp>
+            <p:nvCxnSpPr>
+              <p:cNvPr id="17" name="Straight Arrow Connector 16">
+                <a:extLst>
+                  <a:ext uri="{FF2B5EF4-FFF2-40B4-BE49-F238E27FC236}">
+                    <a16:creationId xmlns:a16="http://schemas.microsoft.com/office/drawing/2014/main" id="{67ECBC2C-1023-DE31-EBA4-93EDCDABAF88}"/>
+                  </a:ext>
+                </a:extLst>
+              </p:cNvPr>
+              <p:cNvCxnSpPr>
+                <a:cxnSpLocks/>
+                <a:stCxn id="14" idx="7"/>
+                <a:endCxn id="11" idx="7"/>
+              </p:cNvCxnSpPr>
+              <p:nvPr/>
+            </p:nvCxnSpPr>
+            <p:spPr>
+              <a:xfrm flipV="1">
+                <a:off x="6037334" y="4644070"/>
+                <a:ext cx="468440" cy="431355"/>
+              </a:xfrm>
+              <a:prstGeom prst="straightConnector1">
+                <a:avLst/>
+              </a:prstGeom>
+              <a:ln>
+                <a:tailEnd type="triangle"/>
+              </a:ln>
+            </p:spPr>
+            <p:style>
+              <a:lnRef idx="1">
+                <a:schemeClr val="accent1"/>
+              </a:lnRef>
+              <a:fillRef idx="0">
+                <a:schemeClr val="accent1"/>
+              </a:fillRef>
+              <a:effectRef idx="0">
+                <a:schemeClr val="accent1"/>
+              </a:effectRef>
+              <a:fontRef idx="minor">
+                <a:schemeClr val="tx1"/>
+              </a:fontRef>
+            </p:style>
+          </p:cxnSp>
+        </p:grpSp>
+        <p:grpSp>
+          <p:nvGrpSpPr>
+            <p:cNvPr id="21" name="Group 20">
+              <a:extLst>
+                <a:ext uri="{FF2B5EF4-FFF2-40B4-BE49-F238E27FC236}">
+                  <a16:creationId xmlns:a16="http://schemas.microsoft.com/office/drawing/2014/main" id="{F60B13A9-B69C-C4A9-923B-C4C025D79E8B}"/>
+                </a:ext>
+              </a:extLst>
+            </p:cNvPr>
+            <p:cNvGrpSpPr/>
+            <p:nvPr/>
+          </p:nvGrpSpPr>
+          <p:grpSpPr>
+            <a:xfrm>
+              <a:off x="8473026" y="4394718"/>
+              <a:ext cx="1576873" cy="1576873"/>
+              <a:chOff x="5159829" y="4413142"/>
+              <a:chExt cx="1576873" cy="1576873"/>
+            </a:xfrm>
+          </p:grpSpPr>
           <p:sp>
             <p:nvSpPr>
-              <p:cNvPr id="11" name="Oval 10">
+              <p:cNvPr id="23" name="Oval 22">
                 <a:extLst>
                   <a:ext uri="{FF2B5EF4-FFF2-40B4-BE49-F238E27FC236}">
-                    <a16:creationId xmlns:a16="http://schemas.microsoft.com/office/drawing/2014/main" id="{40D7C560-ACF1-ACBA-A6D2-2311A0BE6A1B}"/>
+                    <a16:creationId xmlns:a16="http://schemas.microsoft.com/office/drawing/2014/main" id="{C728DDF5-A3A5-281D-68B9-B46746BBA087}"/>
                   </a:ext>
                 </a:extLst>
               </p:cNvPr>
@@ -6139,10 +8070,10 @@
           </p:sp>
           <p:sp>
             <p:nvSpPr>
-              <p:cNvPr id="14" name="Oval 13">
+              <p:cNvPr id="24" name="Oval 23">
                 <a:extLst>
                   <a:ext uri="{FF2B5EF4-FFF2-40B4-BE49-F238E27FC236}">
-                    <a16:creationId xmlns:a16="http://schemas.microsoft.com/office/drawing/2014/main" id="{605B340A-37B1-877D-B679-B0943ED4C213}"/>
+                    <a16:creationId xmlns:a16="http://schemas.microsoft.com/office/drawing/2014/main" id="{31F77834-D9B4-8B23-CF75-3A95EB646EFD}"/>
                   </a:ext>
                 </a:extLst>
               </p:cNvPr>
@@ -6186,23 +8117,23 @@
         </p:grpSp>
         <p:cxnSp>
           <p:nvCxnSpPr>
-            <p:cNvPr id="17" name="Straight Arrow Connector 16">
+            <p:cNvPr id="22" name="Straight Arrow Connector 21">
               <a:extLst>
                 <a:ext uri="{FF2B5EF4-FFF2-40B4-BE49-F238E27FC236}">
-                  <a16:creationId xmlns:a16="http://schemas.microsoft.com/office/drawing/2014/main" id="{67ECBC2C-1023-DE31-EBA4-93EDCDABAF88}"/>
+                  <a16:creationId xmlns:a16="http://schemas.microsoft.com/office/drawing/2014/main" id="{E7D68BDC-A763-EBD9-2496-2FDFFF9D31B8}"/>
                 </a:ext>
               </a:extLst>
             </p:cNvPr>
             <p:cNvCxnSpPr>
               <a:cxnSpLocks/>
-              <a:stCxn id="14" idx="7"/>
-              <a:endCxn id="11" idx="7"/>
+              <a:stCxn id="24" idx="7"/>
+              <a:endCxn id="23" idx="7"/>
             </p:cNvCxnSpPr>
             <p:nvPr/>
           </p:nvCxnSpPr>
           <p:spPr>
             <a:xfrm flipV="1">
-              <a:off x="6037334" y="4644070"/>
+              <a:off x="9350531" y="4625646"/>
               <a:ext cx="468440" cy="431355"/>
             </a:xfrm>
             <a:prstGeom prst="straightConnector1">
@@ -6227,244 +8158,179 @@
             </a:fontRef>
           </p:style>
         </p:cxnSp>
-      </p:grpSp>
-      <p:grpSp>
-        <p:nvGrpSpPr>
-          <p:cNvPr id="21" name="Group 20">
-            <a:extLst>
-              <a:ext uri="{FF2B5EF4-FFF2-40B4-BE49-F238E27FC236}">
-                <a16:creationId xmlns:a16="http://schemas.microsoft.com/office/drawing/2014/main" id="{F60B13A9-B69C-C4A9-923B-C4C025D79E8B}"/>
-              </a:ext>
-            </a:extLst>
-          </p:cNvPr>
-          <p:cNvGrpSpPr/>
-          <p:nvPr/>
-        </p:nvGrpSpPr>
-        <p:grpSpPr>
-          <a:xfrm>
-            <a:off x="8473026" y="4394718"/>
-            <a:ext cx="1576873" cy="1576873"/>
-            <a:chOff x="5159829" y="4413142"/>
-            <a:chExt cx="1576873" cy="1576873"/>
-          </a:xfrm>
-        </p:grpSpPr>
-        <p:sp>
-          <p:nvSpPr>
-            <p:cNvPr id="23" name="Oval 22">
+        <p:cxnSp>
+          <p:nvCxnSpPr>
+            <p:cNvPr id="26" name="Straight Connector 25">
               <a:extLst>
                 <a:ext uri="{FF2B5EF4-FFF2-40B4-BE49-F238E27FC236}">
-                  <a16:creationId xmlns:a16="http://schemas.microsoft.com/office/drawing/2014/main" id="{C728DDF5-A3A5-281D-68B9-B46746BBA087}"/>
+                  <a16:creationId xmlns:a16="http://schemas.microsoft.com/office/drawing/2014/main" id="{291EFA7E-FB51-226D-F593-AD5E35E8C194}"/>
                 </a:ext>
               </a:extLst>
             </p:cNvPr>
-            <p:cNvSpPr/>
+            <p:cNvCxnSpPr>
+              <a:cxnSpLocks/>
+              <a:stCxn id="14" idx="6"/>
+              <a:endCxn id="24" idx="2"/>
+            </p:cNvCxnSpPr>
             <p:nvPr/>
-          </p:nvSpPr>
+          </p:nvCxnSpPr>
           <p:spPr>
-            <a:xfrm>
-              <a:off x="5159829" y="4413142"/>
-              <a:ext cx="1576873" cy="1576873"/>
+            <a:xfrm flipV="1">
+              <a:off x="6074228" y="5146070"/>
+              <a:ext cx="3061271" cy="18424"/>
             </a:xfrm>
-            <a:prstGeom prst="ellipse">
+            <a:prstGeom prst="line">
               <a:avLst/>
             </a:prstGeom>
           </p:spPr>
           <p:style>
-            <a:lnRef idx="1">
-              <a:schemeClr val="accent4"/>
+            <a:lnRef idx="3">
+              <a:schemeClr val="dk1"/>
             </a:lnRef>
-            <a:fillRef idx="3">
-              <a:schemeClr val="accent4"/>
+            <a:fillRef idx="0">
+              <a:schemeClr val="dk1"/>
             </a:fillRef>
             <a:effectRef idx="2">
-              <a:schemeClr val="accent4"/>
+              <a:schemeClr val="dk1"/>
             </a:effectRef>
             <a:fontRef idx="minor">
-              <a:schemeClr val="lt1"/>
+              <a:schemeClr val="tx1"/>
             </a:fontRef>
           </p:style>
-          <p:txBody>
-            <a:bodyPr rtlCol="0" anchor="ctr"/>
-            <a:lstStyle/>
-            <a:p>
-              <a:pPr algn="ctr"/>
-              <a:endParaRPr lang="en-CA"/>
-            </a:p>
-          </p:txBody>
-        </p:sp>
-        <p:sp>
-          <p:nvSpPr>
-            <p:cNvPr id="24" name="Oval 23">
+        </p:cxnSp>
+        <p:cxnSp>
+          <p:nvCxnSpPr>
+            <p:cNvPr id="27" name="Straight Arrow Connector 26">
               <a:extLst>
                 <a:ext uri="{FF2B5EF4-FFF2-40B4-BE49-F238E27FC236}">
-                  <a16:creationId xmlns:a16="http://schemas.microsoft.com/office/drawing/2014/main" id="{31F77834-D9B4-8B23-CF75-3A95EB646EFD}"/>
+                  <a16:creationId xmlns:a16="http://schemas.microsoft.com/office/drawing/2014/main" id="{ABB89376-AF48-9C52-6598-8B05959F2259}"/>
                 </a:ext>
               </a:extLst>
             </p:cNvPr>
-            <p:cNvSpPr/>
+            <p:cNvCxnSpPr>
+              <a:cxnSpLocks/>
+            </p:cNvCxnSpPr>
             <p:nvPr/>
-          </p:nvSpPr>
+          </p:nvCxnSpPr>
           <p:spPr>
-            <a:xfrm>
-              <a:off x="5822302" y="5038531"/>
-              <a:ext cx="251926" cy="251926"/>
+            <a:xfrm flipH="1" flipV="1">
+              <a:off x="7370644" y="4394718"/>
+              <a:ext cx="12635" cy="742084"/>
             </a:xfrm>
-            <a:prstGeom prst="ellipse">
+            <a:prstGeom prst="straightConnector1">
               <a:avLst/>
             </a:prstGeom>
+            <a:ln w="53975">
+              <a:solidFill>
+                <a:schemeClr val="tx1"/>
+              </a:solidFill>
+              <a:tailEnd type="triangle"/>
+            </a:ln>
           </p:spPr>
           <p:style>
-            <a:lnRef idx="2">
-              <a:schemeClr val="dk1">
-                <a:shade val="15000"/>
-              </a:schemeClr>
+            <a:lnRef idx="1">
+              <a:schemeClr val="accent1"/>
             </a:lnRef>
-            <a:fillRef idx="1">
-              <a:schemeClr val="dk1"/>
+            <a:fillRef idx="0">
+              <a:schemeClr val="accent1"/>
             </a:fillRef>
             <a:effectRef idx="0">
-              <a:schemeClr val="dk1"/>
+              <a:schemeClr val="accent1"/>
             </a:effectRef>
             <a:fontRef idx="minor">
-              <a:schemeClr val="lt1"/>
+              <a:schemeClr val="tx1"/>
             </a:fontRef>
           </p:style>
-          <p:txBody>
-            <a:bodyPr rtlCol="0" anchor="ctr"/>
-            <a:lstStyle/>
-            <a:p>
-              <a:pPr algn="ctr"/>
-              <a:endParaRPr lang="en-CA"/>
-            </a:p>
-          </p:txBody>
-        </p:sp>
+        </p:cxnSp>
       </p:grpSp>
-      <p:cxnSp>
-        <p:nvCxnSpPr>
-          <p:cNvPr id="22" name="Straight Arrow Connector 21">
-            <a:extLst>
-              <a:ext uri="{FF2B5EF4-FFF2-40B4-BE49-F238E27FC236}">
-                <a16:creationId xmlns:a16="http://schemas.microsoft.com/office/drawing/2014/main" id="{E7D68BDC-A763-EBD9-2496-2FDFFF9D31B8}"/>
-              </a:ext>
-            </a:extLst>
-          </p:cNvPr>
-          <p:cNvCxnSpPr>
-            <a:cxnSpLocks/>
-            <a:stCxn id="24" idx="7"/>
-            <a:endCxn id="23" idx="7"/>
-          </p:cNvCxnSpPr>
+      <p:sp>
+        <p:nvSpPr>
+          <p:cNvPr id="16" name="Oval 15">
+            <a:extLst>
+              <a:ext uri="{FF2B5EF4-FFF2-40B4-BE49-F238E27FC236}">
+                <a16:creationId xmlns:a16="http://schemas.microsoft.com/office/drawing/2014/main" id="{FF499C41-B587-F297-462E-0EF2C7E42D4F}"/>
+              </a:ext>
+            </a:extLst>
+          </p:cNvPr>
+          <p:cNvSpPr/>
           <p:nvPr/>
-        </p:nvCxnSpPr>
+        </p:nvSpPr>
         <p:spPr>
-          <a:xfrm flipV="1">
-            <a:off x="9350531" y="4625646"/>
-            <a:ext cx="468440" cy="431355"/>
+          <a:xfrm>
+            <a:off x="6834807" y="3620632"/>
+            <a:ext cx="355942" cy="355942"/>
           </a:xfrm>
-          <a:prstGeom prst="straightConnector1">
+          <a:prstGeom prst="ellipse">
             <a:avLst/>
           </a:prstGeom>
-          <a:ln>
-            <a:tailEnd type="triangle"/>
-          </a:ln>
         </p:spPr>
         <p:style>
           <a:lnRef idx="1">
-            <a:schemeClr val="accent1"/>
+            <a:schemeClr val="accent2"/>
           </a:lnRef>
-          <a:fillRef idx="0">
-            <a:schemeClr val="accent1"/>
+          <a:fillRef idx="3">
+            <a:schemeClr val="accent2"/>
           </a:fillRef>
-          <a:effectRef idx="0">
-            <a:schemeClr val="accent1"/>
+          <a:effectRef idx="2">
+            <a:schemeClr val="accent2"/>
           </a:effectRef>
           <a:fontRef idx="minor">
-            <a:schemeClr val="tx1"/>
+            <a:schemeClr val="lt1"/>
           </a:fontRef>
         </p:style>
-      </p:cxnSp>
-      <p:cxnSp>
-        <p:nvCxnSpPr>
-          <p:cNvPr id="26" name="Straight Connector 25">
-            <a:extLst>
-              <a:ext uri="{FF2B5EF4-FFF2-40B4-BE49-F238E27FC236}">
-                <a16:creationId xmlns:a16="http://schemas.microsoft.com/office/drawing/2014/main" id="{291EFA7E-FB51-226D-F593-AD5E35E8C194}"/>
-              </a:ext>
-            </a:extLst>
-          </p:cNvPr>
-          <p:cNvCxnSpPr>
-            <a:stCxn id="14" idx="6"/>
-            <a:endCxn id="24" idx="2"/>
-          </p:cNvCxnSpPr>
+        <p:txBody>
+          <a:bodyPr rtlCol="0" anchor="ctr"/>
+          <a:lstStyle/>
+          <a:p>
+            <a:pPr algn="ctr"/>
+            <a:endParaRPr lang="en-CA"/>
+          </a:p>
+        </p:txBody>
+      </p:sp>
+      <p:sp>
+        <p:nvSpPr>
+          <p:cNvPr id="18" name="Oval 17">
+            <a:extLst>
+              <a:ext uri="{FF2B5EF4-FFF2-40B4-BE49-F238E27FC236}">
+                <a16:creationId xmlns:a16="http://schemas.microsoft.com/office/drawing/2014/main" id="{5F1E9C24-0427-990A-47D1-9504DA2BACE7}"/>
+              </a:ext>
+            </a:extLst>
+          </p:cNvPr>
+          <p:cNvSpPr/>
           <p:nvPr/>
-        </p:nvCxnSpPr>
+        </p:nvSpPr>
         <p:spPr>
-          <a:xfrm flipV="1">
-            <a:off x="6074228" y="5146070"/>
-            <a:ext cx="3061271" cy="18424"/>
+          <a:xfrm>
+            <a:off x="6569160" y="5052931"/>
+            <a:ext cx="200203" cy="200203"/>
           </a:xfrm>
-          <a:prstGeom prst="line">
+          <a:prstGeom prst="ellipse">
             <a:avLst/>
           </a:prstGeom>
         </p:spPr>
         <p:style>
           <a:lnRef idx="3">
-            <a:schemeClr val="dk1"/>
+            <a:schemeClr val="lt1"/>
           </a:lnRef>
-          <a:fillRef idx="0">
-            <a:schemeClr val="dk1"/>
+          <a:fillRef idx="1">
+            <a:schemeClr val="accent6"/>
           </a:fillRef>
-          <a:effectRef idx="2">
-            <a:schemeClr val="dk1"/>
+          <a:effectRef idx="1">
+            <a:schemeClr val="accent6"/>
           </a:effectRef>
           <a:fontRef idx="minor">
-            <a:schemeClr val="tx1"/>
+            <a:schemeClr val="lt1"/>
           </a:fontRef>
         </p:style>
-      </p:cxnSp>
-      <p:cxnSp>
-        <p:nvCxnSpPr>
-          <p:cNvPr id="27" name="Straight Arrow Connector 26">
-            <a:extLst>
-              <a:ext uri="{FF2B5EF4-FFF2-40B4-BE49-F238E27FC236}">
-                <a16:creationId xmlns:a16="http://schemas.microsoft.com/office/drawing/2014/main" id="{ABB89376-AF48-9C52-6598-8B05959F2259}"/>
-              </a:ext>
-            </a:extLst>
-          </p:cNvPr>
-          <p:cNvCxnSpPr>
-            <a:cxnSpLocks/>
-          </p:cNvCxnSpPr>
-          <p:nvPr/>
-        </p:nvCxnSpPr>
-        <p:spPr>
-          <a:xfrm flipH="1" flipV="1">
-            <a:off x="7370644" y="4394718"/>
-            <a:ext cx="12635" cy="742084"/>
-          </a:xfrm>
-          <a:prstGeom prst="straightConnector1">
-            <a:avLst/>
-          </a:prstGeom>
-          <a:ln w="53975">
-            <a:solidFill>
-              <a:schemeClr val="tx1"/>
-            </a:solidFill>
-            <a:tailEnd type="triangle"/>
-          </a:ln>
-        </p:spPr>
-        <p:style>
-          <a:lnRef idx="1">
-            <a:schemeClr val="accent1"/>
-          </a:lnRef>
-          <a:fillRef idx="0">
-            <a:schemeClr val="accent1"/>
-          </a:fillRef>
-          <a:effectRef idx="0">
-            <a:schemeClr val="accent1"/>
-          </a:effectRef>
-          <a:fontRef idx="minor">
-            <a:schemeClr val="tx1"/>
-          </a:fontRef>
-        </p:style>
-      </p:cxnSp>
+        <p:txBody>
+          <a:bodyPr rtlCol="0" anchor="ctr"/>
+          <a:lstStyle/>
+          <a:p>
+            <a:pPr algn="ctr"/>
+            <a:endParaRPr lang="en-CA"/>
+          </a:p>
+        </p:txBody>
+      </p:sp>
     </p:spTree>
     <p:extLst>
       <p:ext uri="{BB962C8B-B14F-4D97-AF65-F5344CB8AC3E}">
@@ -7001,7 +8867,7 @@
         </p:nvGrpSpPr>
         <p:grpSpPr>
           <a:xfrm>
-            <a:off x="10300995" y="2267336"/>
+            <a:off x="6680716" y="261255"/>
             <a:ext cx="2323322" cy="2323322"/>
             <a:chOff x="1436914" y="485193"/>
             <a:chExt cx="2323322" cy="2323322"/>
@@ -7149,161 +9015,274 @@
           <a:chExt cx="0" cy="0"/>
         </a:xfrm>
       </p:grpSpPr>
-      <p:sp>
-        <p:nvSpPr>
-          <p:cNvPr id="2" name="Title 1">
-            <a:extLst>
-              <a:ext uri="{FF2B5EF4-FFF2-40B4-BE49-F238E27FC236}">
-                <a16:creationId xmlns:a16="http://schemas.microsoft.com/office/drawing/2014/main" id="{E4FF9B25-CC32-67D1-517D-1A3DAD41A033}"/>
-              </a:ext>
-            </a:extLst>
-          </p:cNvPr>
-          <p:cNvSpPr>
-            <a:spLocks noGrp="1"/>
-          </p:cNvSpPr>
-          <p:nvPr>
-            <p:ph type="title"/>
-          </p:nvPr>
-        </p:nvSpPr>
-        <p:spPr>
+      <p:grpSp>
+        <p:nvGrpSpPr>
+          <p:cNvPr id="13" name="Group 12">
+            <a:extLst>
+              <a:ext uri="{FF2B5EF4-FFF2-40B4-BE49-F238E27FC236}">
+                <a16:creationId xmlns:a16="http://schemas.microsoft.com/office/drawing/2014/main" id="{64F1BECD-E5C1-DBF0-D116-21B87358E6AE}"/>
+              </a:ext>
+            </a:extLst>
+          </p:cNvPr>
+          <p:cNvGrpSpPr/>
+          <p:nvPr/>
+        </p:nvGrpSpPr>
+        <p:grpSpPr>
           <a:xfrm>
-            <a:off x="632926" y="337133"/>
-            <a:ext cx="10515600" cy="1325563"/>
+            <a:off x="6680716" y="261255"/>
+            <a:ext cx="2323322" cy="2323322"/>
+            <a:chOff x="1436914" y="485193"/>
+            <a:chExt cx="2323322" cy="2323322"/>
           </a:xfrm>
-        </p:spPr>
-        <p:txBody>
-          <a:bodyPr/>
-          <a:lstStyle/>
-          <a:p>
-            <a:r>
-              <a:rPr lang="en-CA" dirty="0"/>
-              <a:t>AABB (or any other shape) has options</a:t>
-            </a:r>
-          </a:p>
-        </p:txBody>
-      </p:sp>
-      <p:sp>
-        <p:nvSpPr>
-          <p:cNvPr id="3" name="Content Placeholder 2">
-            <a:extLst>
-              <a:ext uri="{FF2B5EF4-FFF2-40B4-BE49-F238E27FC236}">
-                <a16:creationId xmlns:a16="http://schemas.microsoft.com/office/drawing/2014/main" id="{F9391EEC-72AA-A975-4B85-87D6F0A3C3D0}"/>
-              </a:ext>
-            </a:extLst>
-          </p:cNvPr>
-          <p:cNvSpPr>
-            <a:spLocks noGrp="1"/>
-          </p:cNvSpPr>
-          <p:nvPr>
-            <p:ph idx="1"/>
-          </p:nvPr>
-        </p:nvSpPr>
-        <p:spPr/>
-        <p:txBody>
-          <a:bodyPr/>
-          <a:lstStyle/>
-          <a:p>
-            <a:r>
-              <a:rPr lang="en-CA" dirty="0"/>
-              <a:t>Centre + distance on each axis?</a:t>
-            </a:r>
-          </a:p>
-          <a:p>
-            <a:r>
-              <a:rPr lang="en-CA" dirty="0">
-                <a:sym typeface="Wingdings" panose="05000000000000000000" pitchFamily="2" charset="2"/>
-              </a:rPr>
-              <a:t>Centre + (width, height, depth) + offset (</a:t>
-            </a:r>
-            <a:r>
-              <a:rPr lang="en-CA" dirty="0" err="1">
-                <a:sym typeface="Wingdings" panose="05000000000000000000" pitchFamily="2" charset="2"/>
-              </a:rPr>
-              <a:t>xyz</a:t>
-            </a:r>
-            <a:r>
-              <a:rPr lang="en-CA" dirty="0">
-                <a:sym typeface="Wingdings" panose="05000000000000000000" pitchFamily="2" charset="2"/>
-              </a:rPr>
-              <a:t>)</a:t>
-            </a:r>
-          </a:p>
-          <a:p>
-            <a:r>
-              <a:rPr lang="en-CA" dirty="0">
-                <a:sym typeface="Wingdings" panose="05000000000000000000" pitchFamily="2" charset="2"/>
-              </a:rPr>
-              <a:t>Min XYZ, Max XYZ</a:t>
-            </a:r>
-          </a:p>
-          <a:p>
-            <a:r>
-              <a:rPr lang="en-CA" dirty="0">
-                <a:sym typeface="Wingdings" panose="05000000000000000000" pitchFamily="2" charset="2"/>
-              </a:rPr>
-              <a:t>Pro Tip:</a:t>
-            </a:r>
-          </a:p>
-          <a:p>
-            <a:pPr lvl="1"/>
-            <a:r>
-              <a:rPr lang="en-CA" dirty="0">
-                <a:sym typeface="Wingdings" panose="05000000000000000000" pitchFamily="2" charset="2"/>
-              </a:rPr>
-              <a:t>Keep only key “setter”/variables, and make “getters” for the rest</a:t>
-            </a:r>
-          </a:p>
-          <a:p>
-            <a:pPr lvl="1"/>
-            <a:r>
-              <a:rPr lang="en-CA" dirty="0">
-                <a:sym typeface="Wingdings" panose="05000000000000000000" pitchFamily="2" charset="2"/>
-              </a:rPr>
-              <a:t>i.e. calculate the “other” variables</a:t>
-            </a:r>
-          </a:p>
-          <a:p>
-            <a:pPr lvl="1"/>
-            <a:r>
-              <a:rPr lang="en-CA" dirty="0">
-                <a:sym typeface="Wingdings" panose="05000000000000000000" pitchFamily="2" charset="2"/>
-              </a:rPr>
-              <a:t>Example: </a:t>
-            </a:r>
-          </a:p>
-          <a:p>
-            <a:pPr lvl="2"/>
-            <a:r>
-              <a:rPr lang="en-CA" dirty="0">
-                <a:sym typeface="Wingdings" panose="05000000000000000000" pitchFamily="2" charset="2"/>
-              </a:rPr>
-              <a:t>Min XYZ, Max XYZ</a:t>
-            </a:r>
-          </a:p>
-          <a:p>
-            <a:pPr lvl="2"/>
-            <a:r>
-              <a:rPr lang="en-CA" dirty="0">
-                <a:sym typeface="Wingdings" panose="05000000000000000000" pitchFamily="2" charset="2"/>
-              </a:rPr>
-              <a:t>Centre</a:t>
-            </a:r>
-          </a:p>
-          <a:p>
-            <a:pPr lvl="2"/>
-            <a:r>
-              <a:rPr lang="en-CA" dirty="0">
-                <a:sym typeface="Wingdings" panose="05000000000000000000" pitchFamily="2" charset="2"/>
-              </a:rPr>
-              <a:t>Offset from centre</a:t>
-            </a:r>
-          </a:p>
-        </p:txBody>
-      </p:sp>
+        </p:grpSpPr>
+        <p:sp>
+          <p:nvSpPr>
+            <p:cNvPr id="4" name="Oval 3">
+              <a:extLst>
+                <a:ext uri="{FF2B5EF4-FFF2-40B4-BE49-F238E27FC236}">
+                  <a16:creationId xmlns:a16="http://schemas.microsoft.com/office/drawing/2014/main" id="{0B429CD4-83AC-5E79-BFA3-904D4F07C200}"/>
+                </a:ext>
+              </a:extLst>
+            </p:cNvPr>
+            <p:cNvSpPr/>
+            <p:nvPr/>
+          </p:nvSpPr>
+          <p:spPr>
+            <a:xfrm>
+              <a:off x="1436914" y="485193"/>
+              <a:ext cx="2323322" cy="2323322"/>
+            </a:xfrm>
+            <a:prstGeom prst="ellipse">
+              <a:avLst/>
+            </a:prstGeom>
+          </p:spPr>
+          <p:style>
+            <a:lnRef idx="2">
+              <a:schemeClr val="accent1">
+                <a:shade val="15000"/>
+              </a:schemeClr>
+            </a:lnRef>
+            <a:fillRef idx="1">
+              <a:schemeClr val="accent1"/>
+            </a:fillRef>
+            <a:effectRef idx="0">
+              <a:schemeClr val="accent1"/>
+            </a:effectRef>
+            <a:fontRef idx="minor">
+              <a:schemeClr val="lt1"/>
+            </a:fontRef>
+          </p:style>
+          <p:txBody>
+            <a:bodyPr rtlCol="0" anchor="ctr"/>
+            <a:lstStyle/>
+            <a:p>
+              <a:pPr algn="ctr"/>
+              <a:r>
+                <a:rPr lang="en-CA" dirty="0"/>
+                <a:t>Centre, radius</a:t>
+              </a:r>
+            </a:p>
+            <a:p>
+              <a:pPr algn="ctr"/>
+              <a:endParaRPr lang="en-CA" dirty="0"/>
+            </a:p>
+            <a:p>
+              <a:pPr algn="ctr"/>
+              <a:endParaRPr lang="en-CA" dirty="0"/>
+            </a:p>
+            <a:p>
+              <a:pPr algn="ctr"/>
+              <a:endParaRPr lang="en-CA" dirty="0"/>
+            </a:p>
+            <a:p>
+              <a:pPr algn="ctr"/>
+              <a:endParaRPr lang="en-CA" dirty="0"/>
+            </a:p>
+          </p:txBody>
+        </p:sp>
+        <p:sp>
+          <p:nvSpPr>
+            <p:cNvPr id="12" name="Oval 11">
+              <a:extLst>
+                <a:ext uri="{FF2B5EF4-FFF2-40B4-BE49-F238E27FC236}">
+                  <a16:creationId xmlns:a16="http://schemas.microsoft.com/office/drawing/2014/main" id="{7028ABD3-B625-C0B4-A775-48CC45639FF2}"/>
+                </a:ext>
+              </a:extLst>
+            </p:cNvPr>
+            <p:cNvSpPr/>
+            <p:nvPr/>
+          </p:nvSpPr>
+          <p:spPr>
+            <a:xfrm>
+              <a:off x="2481942" y="1530221"/>
+              <a:ext cx="233265" cy="233265"/>
+            </a:xfrm>
+            <a:prstGeom prst="ellipse">
+              <a:avLst/>
+            </a:prstGeom>
+          </p:spPr>
+          <p:style>
+            <a:lnRef idx="2">
+              <a:schemeClr val="dk1">
+                <a:shade val="15000"/>
+              </a:schemeClr>
+            </a:lnRef>
+            <a:fillRef idx="1">
+              <a:schemeClr val="dk1"/>
+            </a:fillRef>
+            <a:effectRef idx="0">
+              <a:schemeClr val="dk1"/>
+            </a:effectRef>
+            <a:fontRef idx="minor">
+              <a:schemeClr val="lt1"/>
+            </a:fontRef>
+          </p:style>
+          <p:txBody>
+            <a:bodyPr rtlCol="0" anchor="ctr"/>
+            <a:lstStyle/>
+            <a:p>
+              <a:pPr algn="ctr"/>
+              <a:endParaRPr lang="en-CA"/>
+            </a:p>
+          </p:txBody>
+        </p:sp>
+      </p:grpSp>
+      <p:grpSp>
+        <p:nvGrpSpPr>
+          <p:cNvPr id="2" name="Group 1">
+            <a:extLst>
+              <a:ext uri="{FF2B5EF4-FFF2-40B4-BE49-F238E27FC236}">
+                <a16:creationId xmlns:a16="http://schemas.microsoft.com/office/drawing/2014/main" id="{86C08D9E-3441-C042-7BD9-E9BA6F7591E1}"/>
+              </a:ext>
+            </a:extLst>
+          </p:cNvPr>
+          <p:cNvGrpSpPr/>
+          <p:nvPr/>
+        </p:nvGrpSpPr>
+        <p:grpSpPr>
+          <a:xfrm>
+            <a:off x="3772678" y="2024741"/>
+            <a:ext cx="2323322" cy="2323322"/>
+            <a:chOff x="1436914" y="485193"/>
+            <a:chExt cx="2323322" cy="2323322"/>
+          </a:xfrm>
+        </p:grpSpPr>
+        <p:sp>
+          <p:nvSpPr>
+            <p:cNvPr id="3" name="Oval 2">
+              <a:extLst>
+                <a:ext uri="{FF2B5EF4-FFF2-40B4-BE49-F238E27FC236}">
+                  <a16:creationId xmlns:a16="http://schemas.microsoft.com/office/drawing/2014/main" id="{A253E9A5-54B3-17EA-9D7A-C86D07551AA9}"/>
+                </a:ext>
+              </a:extLst>
+            </p:cNvPr>
+            <p:cNvSpPr/>
+            <p:nvPr/>
+          </p:nvSpPr>
+          <p:spPr>
+            <a:xfrm>
+              <a:off x="1436914" y="485193"/>
+              <a:ext cx="2323322" cy="2323322"/>
+            </a:xfrm>
+            <a:prstGeom prst="ellipse">
+              <a:avLst/>
+            </a:prstGeom>
+          </p:spPr>
+          <p:style>
+            <a:lnRef idx="2">
+              <a:schemeClr val="accent1">
+                <a:shade val="15000"/>
+              </a:schemeClr>
+            </a:lnRef>
+            <a:fillRef idx="1">
+              <a:schemeClr val="accent1"/>
+            </a:fillRef>
+            <a:effectRef idx="0">
+              <a:schemeClr val="accent1"/>
+            </a:effectRef>
+            <a:fontRef idx="minor">
+              <a:schemeClr val="lt1"/>
+            </a:fontRef>
+          </p:style>
+          <p:txBody>
+            <a:bodyPr rtlCol="0" anchor="ctr"/>
+            <a:lstStyle/>
+            <a:p>
+              <a:pPr algn="ctr"/>
+              <a:r>
+                <a:rPr lang="en-CA" dirty="0"/>
+                <a:t>Centre, radius</a:t>
+              </a:r>
+            </a:p>
+            <a:p>
+              <a:pPr algn="ctr"/>
+              <a:endParaRPr lang="en-CA" dirty="0"/>
+            </a:p>
+            <a:p>
+              <a:pPr algn="ctr"/>
+              <a:endParaRPr lang="en-CA" dirty="0"/>
+            </a:p>
+            <a:p>
+              <a:pPr algn="ctr"/>
+              <a:endParaRPr lang="en-CA" dirty="0"/>
+            </a:p>
+            <a:p>
+              <a:pPr algn="ctr"/>
+              <a:endParaRPr lang="en-CA" dirty="0"/>
+            </a:p>
+          </p:txBody>
+        </p:sp>
+        <p:sp>
+          <p:nvSpPr>
+            <p:cNvPr id="6" name="Oval 5">
+              <a:extLst>
+                <a:ext uri="{FF2B5EF4-FFF2-40B4-BE49-F238E27FC236}">
+                  <a16:creationId xmlns:a16="http://schemas.microsoft.com/office/drawing/2014/main" id="{5680D327-1BC6-F4BE-CBDD-7D97EE217EDD}"/>
+                </a:ext>
+              </a:extLst>
+            </p:cNvPr>
+            <p:cNvSpPr/>
+            <p:nvPr/>
+          </p:nvSpPr>
+          <p:spPr>
+            <a:xfrm>
+              <a:off x="2481942" y="1530221"/>
+              <a:ext cx="233265" cy="233265"/>
+            </a:xfrm>
+            <a:prstGeom prst="ellipse">
+              <a:avLst/>
+            </a:prstGeom>
+          </p:spPr>
+          <p:style>
+            <a:lnRef idx="2">
+              <a:schemeClr val="dk1">
+                <a:shade val="15000"/>
+              </a:schemeClr>
+            </a:lnRef>
+            <a:fillRef idx="1">
+              <a:schemeClr val="dk1"/>
+            </a:fillRef>
+            <a:effectRef idx="0">
+              <a:schemeClr val="dk1"/>
+            </a:effectRef>
+            <a:fontRef idx="minor">
+              <a:schemeClr val="lt1"/>
+            </a:fontRef>
+          </p:style>
+          <p:txBody>
+            <a:bodyPr rtlCol="0" anchor="ctr"/>
+            <a:lstStyle/>
+            <a:p>
+              <a:pPr algn="ctr"/>
+              <a:endParaRPr lang="en-CA"/>
+            </a:p>
+          </p:txBody>
+        </p:sp>
+      </p:grpSp>
     </p:spTree>
     <p:extLst>
       <p:ext uri="{BB962C8B-B14F-4D97-AF65-F5344CB8AC3E}">
-        <p14:creationId xmlns:p14="http://schemas.microsoft.com/office/powerpoint/2010/main" val="620713"/>
+        <p14:creationId xmlns:p14="http://schemas.microsoft.com/office/powerpoint/2010/main" val="3785002508"/>
       </p:ext>
     </p:extLst>
   </p:cSld>

</xml_diff>

<commit_message>
Drawing the centre point of the intersection
</commit_message>
<xml_diff>
--- a/6019_Phys_1/D2D/W02/Collision_Detection (2024).pptx
+++ b/6019_Phys_1/D2D/W02/Collision_Detection (2024).pptx
@@ -20,6 +20,15 @@
     <p:sldId id="268" r:id="rId14"/>
     <p:sldId id="269" r:id="rId15"/>
     <p:sldId id="270" r:id="rId16"/>
+    <p:sldId id="272" r:id="rId17"/>
+    <p:sldId id="273" r:id="rId18"/>
+    <p:sldId id="274" r:id="rId19"/>
+    <p:sldId id="275" r:id="rId20"/>
+    <p:sldId id="276" r:id="rId21"/>
+    <p:sldId id="277" r:id="rId22"/>
+    <p:sldId id="278" r:id="rId23"/>
+    <p:sldId id="279" r:id="rId24"/>
+    <p:sldId id="280" r:id="rId25"/>
   </p:sldIdLst>
   <p:sldSz cx="12192000" cy="6858000"/>
   <p:notesSz cx="6858000" cy="9144000"/>
@@ -275,7 +284,7 @@
           <a:p>
             <a:fld id="{17096AE8-8B40-4419-992A-057BFACC0AD3}" type="datetimeFigureOut">
               <a:rPr lang="en-CA" smtClean="0"/>
-              <a:t>2024-10-01</a:t>
+              <a:t>2024-10-03</a:t>
             </a:fld>
             <a:endParaRPr lang="en-CA"/>
           </a:p>
@@ -475,7 +484,7 @@
           <a:p>
             <a:fld id="{17096AE8-8B40-4419-992A-057BFACC0AD3}" type="datetimeFigureOut">
               <a:rPr lang="en-CA" smtClean="0"/>
-              <a:t>2024-10-01</a:t>
+              <a:t>2024-10-03</a:t>
             </a:fld>
             <a:endParaRPr lang="en-CA"/>
           </a:p>
@@ -685,7 +694,7 @@
           <a:p>
             <a:fld id="{17096AE8-8B40-4419-992A-057BFACC0AD3}" type="datetimeFigureOut">
               <a:rPr lang="en-CA" smtClean="0"/>
-              <a:t>2024-10-01</a:t>
+              <a:t>2024-10-03</a:t>
             </a:fld>
             <a:endParaRPr lang="en-CA"/>
           </a:p>
@@ -885,7 +894,7 @@
           <a:p>
             <a:fld id="{17096AE8-8B40-4419-992A-057BFACC0AD3}" type="datetimeFigureOut">
               <a:rPr lang="en-CA" smtClean="0"/>
-              <a:t>2024-10-01</a:t>
+              <a:t>2024-10-03</a:t>
             </a:fld>
             <a:endParaRPr lang="en-CA"/>
           </a:p>
@@ -1161,7 +1170,7 @@
           <a:p>
             <a:fld id="{17096AE8-8B40-4419-992A-057BFACC0AD3}" type="datetimeFigureOut">
               <a:rPr lang="en-CA" smtClean="0"/>
-              <a:t>2024-10-01</a:t>
+              <a:t>2024-10-03</a:t>
             </a:fld>
             <a:endParaRPr lang="en-CA"/>
           </a:p>
@@ -1429,7 +1438,7 @@
           <a:p>
             <a:fld id="{17096AE8-8B40-4419-992A-057BFACC0AD3}" type="datetimeFigureOut">
               <a:rPr lang="en-CA" smtClean="0"/>
-              <a:t>2024-10-01</a:t>
+              <a:t>2024-10-03</a:t>
             </a:fld>
             <a:endParaRPr lang="en-CA"/>
           </a:p>
@@ -1844,7 +1853,7 @@
           <a:p>
             <a:fld id="{17096AE8-8B40-4419-992A-057BFACC0AD3}" type="datetimeFigureOut">
               <a:rPr lang="en-CA" smtClean="0"/>
-              <a:t>2024-10-01</a:t>
+              <a:t>2024-10-03</a:t>
             </a:fld>
             <a:endParaRPr lang="en-CA"/>
           </a:p>
@@ -1986,7 +1995,7 @@
           <a:p>
             <a:fld id="{17096AE8-8B40-4419-992A-057BFACC0AD3}" type="datetimeFigureOut">
               <a:rPr lang="en-CA" smtClean="0"/>
-              <a:t>2024-10-01</a:t>
+              <a:t>2024-10-03</a:t>
             </a:fld>
             <a:endParaRPr lang="en-CA"/>
           </a:p>
@@ -2099,7 +2108,7 @@
           <a:p>
             <a:fld id="{17096AE8-8B40-4419-992A-057BFACC0AD3}" type="datetimeFigureOut">
               <a:rPr lang="en-CA" smtClean="0"/>
-              <a:t>2024-10-01</a:t>
+              <a:t>2024-10-03</a:t>
             </a:fld>
             <a:endParaRPr lang="en-CA"/>
           </a:p>
@@ -2412,7 +2421,7 @@
           <a:p>
             <a:fld id="{17096AE8-8B40-4419-992A-057BFACC0AD3}" type="datetimeFigureOut">
               <a:rPr lang="en-CA" smtClean="0"/>
-              <a:t>2024-10-01</a:t>
+              <a:t>2024-10-03</a:t>
             </a:fld>
             <a:endParaRPr lang="en-CA"/>
           </a:p>
@@ -2701,7 +2710,7 @@
           <a:p>
             <a:fld id="{17096AE8-8B40-4419-992A-057BFACC0AD3}" type="datetimeFigureOut">
               <a:rPr lang="en-CA" smtClean="0"/>
-              <a:t>2024-10-01</a:t>
+              <a:t>2024-10-03</a:t>
             </a:fld>
             <a:endParaRPr lang="en-CA"/>
           </a:p>
@@ -2944,7 +2953,7 @@
           <a:p>
             <a:fld id="{17096AE8-8B40-4419-992A-057BFACC0AD3}" type="datetimeFigureOut">
               <a:rPr lang="en-CA" smtClean="0"/>
-              <a:t>2024-10-01</a:t>
+              <a:t>2024-10-03</a:t>
             </a:fld>
             <a:endParaRPr lang="en-CA"/>
           </a:p>
@@ -7124,6 +7133,1004 @@
 </p:sld>
 </file>
 
+<file path=ppt/slides/slide16.xml><?xml version="1.0" encoding="utf-8"?>
+<p:sld xmlns:a="http://schemas.openxmlformats.org/drawingml/2006/main" xmlns:r="http://schemas.openxmlformats.org/officeDocument/2006/relationships" xmlns:p="http://schemas.openxmlformats.org/presentationml/2006/main">
+  <p:cSld>
+    <p:spTree>
+      <p:nvGrpSpPr>
+        <p:cNvPr id="1" name=""/>
+        <p:cNvGrpSpPr/>
+        <p:nvPr/>
+      </p:nvGrpSpPr>
+      <p:grpSpPr>
+        <a:xfrm>
+          <a:off x="0" y="0"/>
+          <a:ext cx="0" cy="0"/>
+          <a:chOff x="0" y="0"/>
+          <a:chExt cx="0" cy="0"/>
+        </a:xfrm>
+      </p:grpSpPr>
+      <p:sp>
+        <p:nvSpPr>
+          <p:cNvPr id="2" name="Title 1">
+            <a:extLst>
+              <a:ext uri="{FF2B5EF4-FFF2-40B4-BE49-F238E27FC236}">
+                <a16:creationId xmlns:a16="http://schemas.microsoft.com/office/drawing/2014/main" id="{E4FF9B25-CC32-67D1-517D-1A3DAD41A033}"/>
+              </a:ext>
+            </a:extLst>
+          </p:cNvPr>
+          <p:cNvSpPr>
+            <a:spLocks noGrp="1"/>
+          </p:cNvSpPr>
+          <p:nvPr>
+            <p:ph type="title"/>
+          </p:nvPr>
+        </p:nvSpPr>
+        <p:spPr/>
+        <p:txBody>
+          <a:bodyPr/>
+          <a:lstStyle/>
+          <a:p>
+            <a:r>
+              <a:rPr lang="en-CA" dirty="0"/>
+              <a:t>Collision detection</a:t>
+            </a:r>
+          </a:p>
+        </p:txBody>
+      </p:sp>
+      <p:sp>
+        <p:nvSpPr>
+          <p:cNvPr id="3" name="Content Placeholder 2">
+            <a:extLst>
+              <a:ext uri="{FF2B5EF4-FFF2-40B4-BE49-F238E27FC236}">
+                <a16:creationId xmlns:a16="http://schemas.microsoft.com/office/drawing/2014/main" id="{F9391EEC-72AA-A975-4B85-87D6F0A3C3D0}"/>
+              </a:ext>
+            </a:extLst>
+          </p:cNvPr>
+          <p:cNvSpPr>
+            <a:spLocks noGrp="1"/>
+          </p:cNvSpPr>
+          <p:nvPr>
+            <p:ph idx="1"/>
+          </p:nvPr>
+        </p:nvSpPr>
+        <p:spPr/>
+        <p:txBody>
+          <a:bodyPr/>
+          <a:lstStyle/>
+          <a:p>
+            <a:r>
+              <a:rPr lang="en-CA" dirty="0"/>
+              <a:t>Sphere – AABB collision</a:t>
+            </a:r>
+          </a:p>
+          <a:p>
+            <a:r>
+              <a:rPr lang="en-CA" dirty="0">
+                <a:sym typeface="Wingdings" panose="05000000000000000000" pitchFamily="2" charset="2"/>
+              </a:rPr>
+              <a:t>AABB – ABBB collision</a:t>
+            </a:r>
+          </a:p>
+        </p:txBody>
+      </p:sp>
+    </p:spTree>
+    <p:extLst>
+      <p:ext uri="{BB962C8B-B14F-4D97-AF65-F5344CB8AC3E}">
+        <p14:creationId xmlns:p14="http://schemas.microsoft.com/office/powerpoint/2010/main" val="3534307222"/>
+      </p:ext>
+    </p:extLst>
+  </p:cSld>
+  <p:clrMapOvr>
+    <a:masterClrMapping/>
+  </p:clrMapOvr>
+</p:sld>
+</file>
+
+<file path=ppt/slides/slide17.xml><?xml version="1.0" encoding="utf-8"?>
+<p:sld xmlns:a="http://schemas.openxmlformats.org/drawingml/2006/main" xmlns:r="http://schemas.openxmlformats.org/officeDocument/2006/relationships" xmlns:p="http://schemas.openxmlformats.org/presentationml/2006/main">
+  <p:cSld>
+    <p:spTree>
+      <p:nvGrpSpPr>
+        <p:cNvPr id="1" name=""/>
+        <p:cNvGrpSpPr/>
+        <p:nvPr/>
+      </p:nvGrpSpPr>
+      <p:grpSpPr>
+        <a:xfrm>
+          <a:off x="0" y="0"/>
+          <a:ext cx="0" cy="0"/>
+          <a:chOff x="0" y="0"/>
+          <a:chExt cx="0" cy="0"/>
+        </a:xfrm>
+      </p:grpSpPr>
+      <p:sp>
+        <p:nvSpPr>
+          <p:cNvPr id="5" name="Rectangle 4">
+            <a:extLst>
+              <a:ext uri="{FF2B5EF4-FFF2-40B4-BE49-F238E27FC236}">
+                <a16:creationId xmlns:a16="http://schemas.microsoft.com/office/drawing/2014/main" id="{478825CF-4AA3-56CD-160C-198C4FADBFFD}"/>
+              </a:ext>
+            </a:extLst>
+          </p:cNvPr>
+          <p:cNvSpPr/>
+          <p:nvPr/>
+        </p:nvSpPr>
+        <p:spPr>
+          <a:xfrm>
+            <a:off x="810312" y="2412272"/>
+            <a:ext cx="4777688" cy="1240971"/>
+          </a:xfrm>
+          <a:prstGeom prst="rect">
+            <a:avLst/>
+          </a:prstGeom>
+        </p:spPr>
+        <p:style>
+          <a:lnRef idx="2">
+            <a:schemeClr val="accent1">
+              <a:shade val="15000"/>
+            </a:schemeClr>
+          </a:lnRef>
+          <a:fillRef idx="1">
+            <a:schemeClr val="accent1"/>
+          </a:fillRef>
+          <a:effectRef idx="0">
+            <a:schemeClr val="accent1"/>
+          </a:effectRef>
+          <a:fontRef idx="minor">
+            <a:schemeClr val="lt1"/>
+          </a:fontRef>
+        </p:style>
+        <p:txBody>
+          <a:bodyPr rtlCol="0" anchor="ctr"/>
+          <a:lstStyle/>
+          <a:p>
+            <a:pPr algn="ctr"/>
+            <a:r>
+              <a:rPr lang="en-CA" dirty="0"/>
+              <a:t>AABB</a:t>
+            </a:r>
+          </a:p>
+          <a:p>
+            <a:pPr algn="ctr"/>
+            <a:r>
+              <a:rPr lang="en-CA" dirty="0"/>
+              <a:t>“Axis Aligned Bounding Box”</a:t>
+            </a:r>
+          </a:p>
+        </p:txBody>
+      </p:sp>
+      <p:sp>
+        <p:nvSpPr>
+          <p:cNvPr id="2" name="Rectangle 1">
+            <a:extLst>
+              <a:ext uri="{FF2B5EF4-FFF2-40B4-BE49-F238E27FC236}">
+                <a16:creationId xmlns:a16="http://schemas.microsoft.com/office/drawing/2014/main" id="{FA7A9750-5651-425B-DB94-65A470CD080C}"/>
+              </a:ext>
+            </a:extLst>
+          </p:cNvPr>
+          <p:cNvSpPr/>
+          <p:nvPr/>
+        </p:nvSpPr>
+        <p:spPr>
+          <a:xfrm>
+            <a:off x="6096000" y="511013"/>
+            <a:ext cx="4328160" cy="1216187"/>
+          </a:xfrm>
+          <a:prstGeom prst="rect">
+            <a:avLst/>
+          </a:prstGeom>
+        </p:spPr>
+        <p:style>
+          <a:lnRef idx="3">
+            <a:schemeClr val="lt1"/>
+          </a:lnRef>
+          <a:fillRef idx="1">
+            <a:schemeClr val="accent4"/>
+          </a:fillRef>
+          <a:effectRef idx="1">
+            <a:schemeClr val="accent4"/>
+          </a:effectRef>
+          <a:fontRef idx="minor">
+            <a:schemeClr val="lt1"/>
+          </a:fontRef>
+        </p:style>
+        <p:txBody>
+          <a:bodyPr rtlCol="0" anchor="ctr"/>
+          <a:lstStyle/>
+          <a:p>
+            <a:pPr algn="ctr"/>
+            <a:r>
+              <a:rPr lang="en-CA" dirty="0">
+                <a:solidFill>
+                  <a:schemeClr val="tx1"/>
+                </a:solidFill>
+              </a:rPr>
+              <a:t>AABB</a:t>
+            </a:r>
+          </a:p>
+          <a:p>
+            <a:pPr algn="ctr"/>
+            <a:r>
+              <a:rPr lang="en-CA" dirty="0">
+                <a:solidFill>
+                  <a:schemeClr val="tx1"/>
+                </a:solidFill>
+              </a:rPr>
+              <a:t>“Axis Aligned Bounding Box”</a:t>
+            </a:r>
+          </a:p>
+        </p:txBody>
+      </p:sp>
+      <p:sp>
+        <p:nvSpPr>
+          <p:cNvPr id="3" name="TextBox 2">
+            <a:extLst>
+              <a:ext uri="{FF2B5EF4-FFF2-40B4-BE49-F238E27FC236}">
+                <a16:creationId xmlns:a16="http://schemas.microsoft.com/office/drawing/2014/main" id="{7E4E8AE4-CAAE-DDC7-AC2C-31AB18F04991}"/>
+              </a:ext>
+            </a:extLst>
+          </p:cNvPr>
+          <p:cNvSpPr txBox="1"/>
+          <p:nvPr/>
+        </p:nvSpPr>
+        <p:spPr>
+          <a:xfrm>
+            <a:off x="2702560" y="4267816"/>
+            <a:ext cx="8209280" cy="646331"/>
+          </a:xfrm>
+          <a:prstGeom prst="rect">
+            <a:avLst/>
+          </a:prstGeom>
+          <a:noFill/>
+        </p:spPr>
+        <p:txBody>
+          <a:bodyPr wrap="square" rtlCol="0">
+            <a:spAutoFit/>
+          </a:bodyPr>
+          <a:lstStyle/>
+          <a:p>
+            <a:r>
+              <a:rPr lang="en-CA" dirty="0"/>
+              <a:t>If it </a:t>
+            </a:r>
+            <a:r>
+              <a:rPr lang="en-CA" i="1" dirty="0"/>
+              <a:t>doesn’t </a:t>
+            </a:r>
+            <a:r>
+              <a:rPr lang="en-CA" dirty="0"/>
+              <a:t>overlap on a single axis, then it can’t overlap. So, check each axis in turn and “early exit” if it’s false (not colliding)</a:t>
+            </a:r>
+          </a:p>
+        </p:txBody>
+      </p:sp>
+    </p:spTree>
+    <p:extLst>
+      <p:ext uri="{BB962C8B-B14F-4D97-AF65-F5344CB8AC3E}">
+        <p14:creationId xmlns:p14="http://schemas.microsoft.com/office/powerpoint/2010/main" val="3849529401"/>
+      </p:ext>
+    </p:extLst>
+  </p:cSld>
+  <p:clrMapOvr>
+    <a:masterClrMapping/>
+  </p:clrMapOvr>
+</p:sld>
+</file>
+
+<file path=ppt/slides/slide18.xml><?xml version="1.0" encoding="utf-8"?>
+<p:sld xmlns:a="http://schemas.openxmlformats.org/drawingml/2006/main" xmlns:r="http://schemas.openxmlformats.org/officeDocument/2006/relationships" xmlns:p="http://schemas.openxmlformats.org/presentationml/2006/main">
+  <p:cSld>
+    <p:spTree>
+      <p:nvGrpSpPr>
+        <p:cNvPr id="1" name=""/>
+        <p:cNvGrpSpPr/>
+        <p:nvPr/>
+      </p:nvGrpSpPr>
+      <p:grpSpPr>
+        <a:xfrm>
+          <a:off x="0" y="0"/>
+          <a:ext cx="0" cy="0"/>
+          <a:chOff x="0" y="0"/>
+          <a:chExt cx="0" cy="0"/>
+        </a:xfrm>
+      </p:grpSpPr>
+      <p:pic>
+        <p:nvPicPr>
+          <p:cNvPr id="6" name="Picture 5">
+            <a:extLst>
+              <a:ext uri="{FF2B5EF4-FFF2-40B4-BE49-F238E27FC236}">
+                <a16:creationId xmlns:a16="http://schemas.microsoft.com/office/drawing/2014/main" id="{3DD6A8C6-7945-8132-FE32-233AB77C2A42}"/>
+              </a:ext>
+            </a:extLst>
+          </p:cNvPr>
+          <p:cNvPicPr>
+            <a:picLocks noChangeAspect="1"/>
+          </p:cNvPicPr>
+          <p:nvPr/>
+        </p:nvPicPr>
+        <p:blipFill>
+          <a:blip r:embed="rId2"/>
+          <a:stretch>
+            <a:fillRect/>
+          </a:stretch>
+        </p:blipFill>
+        <p:spPr>
+          <a:xfrm>
+            <a:off x="134508" y="728264"/>
+            <a:ext cx="5533668" cy="4951176"/>
+          </a:xfrm>
+          <a:prstGeom prst="rect">
+            <a:avLst/>
+          </a:prstGeom>
+        </p:spPr>
+      </p:pic>
+      <p:sp>
+        <p:nvSpPr>
+          <p:cNvPr id="7" name="TextBox 6">
+            <a:extLst>
+              <a:ext uri="{FF2B5EF4-FFF2-40B4-BE49-F238E27FC236}">
+                <a16:creationId xmlns:a16="http://schemas.microsoft.com/office/drawing/2014/main" id="{6B43B980-44AE-3C39-5FC3-E3B8F56CBA5B}"/>
+              </a:ext>
+            </a:extLst>
+          </p:cNvPr>
+          <p:cNvSpPr txBox="1"/>
+          <p:nvPr/>
+        </p:nvSpPr>
+        <p:spPr>
+          <a:xfrm>
+            <a:off x="5974080" y="426720"/>
+            <a:ext cx="5049520" cy="1569660"/>
+          </a:xfrm>
+          <a:prstGeom prst="rect">
+            <a:avLst/>
+          </a:prstGeom>
+          <a:noFill/>
+        </p:spPr>
+        <p:txBody>
+          <a:bodyPr wrap="square" rtlCol="0">
+            <a:spAutoFit/>
+          </a:bodyPr>
+          <a:lstStyle/>
+          <a:p>
+            <a:r>
+              <a:rPr lang="en-CA" sz="2400" dirty="0"/>
+              <a:t>Walking around (a character)</a:t>
+            </a:r>
+          </a:p>
+          <a:p>
+            <a:pPr marL="285750" indent="-285750">
+              <a:buFontTx/>
+              <a:buChar char="-"/>
+            </a:pPr>
+            <a:r>
+              <a:rPr lang="en-CA" sz="2400" dirty="0"/>
+              <a:t>Sphere – triangle</a:t>
+            </a:r>
+          </a:p>
+          <a:p>
+            <a:pPr marL="285750" indent="-285750">
+              <a:buFontTx/>
+              <a:buChar char="-"/>
+            </a:pPr>
+            <a:r>
+              <a:rPr lang="en-CA" sz="2400" dirty="0"/>
+              <a:t>Capsule – triangle (variation of S-T)</a:t>
+            </a:r>
+          </a:p>
+          <a:p>
+            <a:pPr marL="285750" indent="-285750">
+              <a:buFontTx/>
+              <a:buChar char="-"/>
+            </a:pPr>
+            <a:r>
+              <a:rPr lang="en-CA" sz="2400" dirty="0"/>
+              <a:t>Ray/line - triangle</a:t>
+            </a:r>
+          </a:p>
+        </p:txBody>
+      </p:sp>
+      <p:sp>
+        <p:nvSpPr>
+          <p:cNvPr id="8" name="TextBox 7">
+            <a:extLst>
+              <a:ext uri="{FF2B5EF4-FFF2-40B4-BE49-F238E27FC236}">
+                <a16:creationId xmlns:a16="http://schemas.microsoft.com/office/drawing/2014/main" id="{9D157F17-476A-6815-117C-D4895A6370E1}"/>
+              </a:ext>
+            </a:extLst>
+          </p:cNvPr>
+          <p:cNvSpPr txBox="1"/>
+          <p:nvPr/>
+        </p:nvSpPr>
+        <p:spPr>
+          <a:xfrm>
+            <a:off x="5974080" y="2814320"/>
+            <a:ext cx="5669280" cy="461665"/>
+          </a:xfrm>
+          <a:prstGeom prst="rect">
+            <a:avLst/>
+          </a:prstGeom>
+          <a:noFill/>
+        </p:spPr>
+        <p:txBody>
+          <a:bodyPr wrap="square" rtlCol="0">
+            <a:spAutoFit/>
+          </a:bodyPr>
+          <a:lstStyle/>
+          <a:p>
+            <a:r>
+              <a:rPr lang="en-CA" sz="2400" dirty="0"/>
+              <a:t>What information do we want to get back?</a:t>
+            </a:r>
+          </a:p>
+        </p:txBody>
+      </p:sp>
+    </p:spTree>
+    <p:extLst>
+      <p:ext uri="{BB962C8B-B14F-4D97-AF65-F5344CB8AC3E}">
+        <p14:creationId xmlns:p14="http://schemas.microsoft.com/office/powerpoint/2010/main" val="955794186"/>
+      </p:ext>
+    </p:extLst>
+  </p:cSld>
+  <p:clrMapOvr>
+    <a:masterClrMapping/>
+  </p:clrMapOvr>
+</p:sld>
+</file>
+
+<file path=ppt/slides/slide19.xml><?xml version="1.0" encoding="utf-8"?>
+<p:sld xmlns:a="http://schemas.openxmlformats.org/drawingml/2006/main" xmlns:r="http://schemas.openxmlformats.org/officeDocument/2006/relationships" xmlns:p="http://schemas.openxmlformats.org/presentationml/2006/main">
+  <p:cSld>
+    <p:spTree>
+      <p:nvGrpSpPr>
+        <p:cNvPr id="1" name=""/>
+        <p:cNvGrpSpPr/>
+        <p:nvPr/>
+      </p:nvGrpSpPr>
+      <p:grpSpPr>
+        <a:xfrm>
+          <a:off x="0" y="0"/>
+          <a:ext cx="0" cy="0"/>
+          <a:chOff x="0" y="0"/>
+          <a:chExt cx="0" cy="0"/>
+        </a:xfrm>
+      </p:grpSpPr>
+      <p:sp>
+        <p:nvSpPr>
+          <p:cNvPr id="16" name="Parallelogram 15">
+            <a:extLst>
+              <a:ext uri="{FF2B5EF4-FFF2-40B4-BE49-F238E27FC236}">
+                <a16:creationId xmlns:a16="http://schemas.microsoft.com/office/drawing/2014/main" id="{C687601B-3E9A-774B-C734-AD389620CDC8}"/>
+              </a:ext>
+            </a:extLst>
+          </p:cNvPr>
+          <p:cNvSpPr/>
+          <p:nvPr/>
+        </p:nvSpPr>
+        <p:spPr>
+          <a:xfrm>
+            <a:off x="762001" y="3845560"/>
+            <a:ext cx="4038600" cy="1859280"/>
+          </a:xfrm>
+          <a:prstGeom prst="parallelogram">
+            <a:avLst/>
+          </a:prstGeom>
+        </p:spPr>
+        <p:style>
+          <a:lnRef idx="2">
+            <a:schemeClr val="accent1">
+              <a:shade val="15000"/>
+            </a:schemeClr>
+          </a:lnRef>
+          <a:fillRef idx="1">
+            <a:schemeClr val="accent1"/>
+          </a:fillRef>
+          <a:effectRef idx="0">
+            <a:schemeClr val="accent1"/>
+          </a:effectRef>
+          <a:fontRef idx="minor">
+            <a:schemeClr val="lt1"/>
+          </a:fontRef>
+        </p:style>
+        <p:txBody>
+          <a:bodyPr rtlCol="0" anchor="ctr"/>
+          <a:lstStyle/>
+          <a:p>
+            <a:pPr algn="ctr"/>
+            <a:endParaRPr lang="en-CA"/>
+          </a:p>
+        </p:txBody>
+      </p:sp>
+      <p:sp>
+        <p:nvSpPr>
+          <p:cNvPr id="2" name="Title 1">
+            <a:extLst>
+              <a:ext uri="{FF2B5EF4-FFF2-40B4-BE49-F238E27FC236}">
+                <a16:creationId xmlns:a16="http://schemas.microsoft.com/office/drawing/2014/main" id="{E4FF9B25-CC32-67D1-517D-1A3DAD41A033}"/>
+              </a:ext>
+            </a:extLst>
+          </p:cNvPr>
+          <p:cNvSpPr>
+            <a:spLocks noGrp="1"/>
+          </p:cNvSpPr>
+          <p:nvPr>
+            <p:ph type="title"/>
+          </p:nvPr>
+        </p:nvSpPr>
+        <p:spPr>
+          <a:xfrm>
+            <a:off x="734061" y="141288"/>
+            <a:ext cx="10515600" cy="711835"/>
+          </a:xfrm>
+        </p:spPr>
+        <p:txBody>
+          <a:bodyPr/>
+          <a:lstStyle/>
+          <a:p>
+            <a:r>
+              <a:rPr lang="en-CA" dirty="0"/>
+              <a:t>Barycentric coordinates</a:t>
+            </a:r>
+          </a:p>
+        </p:txBody>
+      </p:sp>
+      <p:grpSp>
+        <p:nvGrpSpPr>
+          <p:cNvPr id="20" name="Group 19">
+            <a:extLst>
+              <a:ext uri="{FF2B5EF4-FFF2-40B4-BE49-F238E27FC236}">
+                <a16:creationId xmlns:a16="http://schemas.microsoft.com/office/drawing/2014/main" id="{E3D01DC8-9EB9-9A54-7197-5EE2F2BAC44B}"/>
+              </a:ext>
+            </a:extLst>
+          </p:cNvPr>
+          <p:cNvGrpSpPr/>
+          <p:nvPr/>
+        </p:nvGrpSpPr>
+        <p:grpSpPr>
+          <a:xfrm>
+            <a:off x="1082041" y="1292860"/>
+            <a:ext cx="3718560" cy="2072640"/>
+            <a:chOff x="4759960" y="1386840"/>
+            <a:chExt cx="3718560" cy="2072640"/>
+          </a:xfrm>
+        </p:grpSpPr>
+        <p:sp>
+          <p:nvSpPr>
+            <p:cNvPr id="6" name="Rectangle 5">
+              <a:extLst>
+                <a:ext uri="{FF2B5EF4-FFF2-40B4-BE49-F238E27FC236}">
+                  <a16:creationId xmlns:a16="http://schemas.microsoft.com/office/drawing/2014/main" id="{B33FAC65-0DBE-B105-7D86-2662CAB7364D}"/>
+                </a:ext>
+              </a:extLst>
+            </p:cNvPr>
+            <p:cNvSpPr/>
+            <p:nvPr/>
+          </p:nvSpPr>
+          <p:spPr>
+            <a:xfrm>
+              <a:off x="4759960" y="1386840"/>
+              <a:ext cx="3718560" cy="2072640"/>
+            </a:xfrm>
+            <a:prstGeom prst="rect">
+              <a:avLst/>
+            </a:prstGeom>
+          </p:spPr>
+          <p:style>
+            <a:lnRef idx="2">
+              <a:schemeClr val="accent1">
+                <a:shade val="15000"/>
+              </a:schemeClr>
+            </a:lnRef>
+            <a:fillRef idx="1">
+              <a:schemeClr val="accent1"/>
+            </a:fillRef>
+            <a:effectRef idx="0">
+              <a:schemeClr val="accent1"/>
+            </a:effectRef>
+            <a:fontRef idx="minor">
+              <a:schemeClr val="lt1"/>
+            </a:fontRef>
+          </p:style>
+          <p:txBody>
+            <a:bodyPr rtlCol="0" anchor="ctr"/>
+            <a:lstStyle/>
+            <a:p>
+              <a:pPr algn="ctr"/>
+              <a:endParaRPr lang="en-CA"/>
+            </a:p>
+          </p:txBody>
+        </p:sp>
+        <p:sp>
+          <p:nvSpPr>
+            <p:cNvPr id="7" name="Oval 6">
+              <a:extLst>
+                <a:ext uri="{FF2B5EF4-FFF2-40B4-BE49-F238E27FC236}">
+                  <a16:creationId xmlns:a16="http://schemas.microsoft.com/office/drawing/2014/main" id="{637DA46D-9299-9432-CCC1-1472F6D538D9}"/>
+                </a:ext>
+              </a:extLst>
+            </p:cNvPr>
+            <p:cNvSpPr/>
+            <p:nvPr/>
+          </p:nvSpPr>
+          <p:spPr>
+            <a:xfrm>
+              <a:off x="7261860" y="2245360"/>
+              <a:ext cx="274320" cy="274320"/>
+            </a:xfrm>
+            <a:prstGeom prst="ellipse">
+              <a:avLst/>
+            </a:prstGeom>
+          </p:spPr>
+          <p:style>
+            <a:lnRef idx="2">
+              <a:schemeClr val="dk1">
+                <a:shade val="15000"/>
+              </a:schemeClr>
+            </a:lnRef>
+            <a:fillRef idx="1">
+              <a:schemeClr val="dk1"/>
+            </a:fillRef>
+            <a:effectRef idx="0">
+              <a:schemeClr val="dk1"/>
+            </a:effectRef>
+            <a:fontRef idx="minor">
+              <a:schemeClr val="lt1"/>
+            </a:fontRef>
+          </p:style>
+          <p:txBody>
+            <a:bodyPr rtlCol="0" anchor="ctr"/>
+            <a:lstStyle/>
+            <a:p>
+              <a:pPr algn="ctr"/>
+              <a:endParaRPr lang="en-CA"/>
+            </a:p>
+          </p:txBody>
+        </p:sp>
+        <p:cxnSp>
+          <p:nvCxnSpPr>
+            <p:cNvPr id="9" name="Straight Arrow Connector 8">
+              <a:extLst>
+                <a:ext uri="{FF2B5EF4-FFF2-40B4-BE49-F238E27FC236}">
+                  <a16:creationId xmlns:a16="http://schemas.microsoft.com/office/drawing/2014/main" id="{0A7450FE-A20E-4942-F6FF-60A423E0F86D}"/>
+                </a:ext>
+              </a:extLst>
+            </p:cNvPr>
+            <p:cNvCxnSpPr>
+              <a:cxnSpLocks/>
+              <a:stCxn id="6" idx="1"/>
+            </p:cNvCxnSpPr>
+            <p:nvPr/>
+          </p:nvCxnSpPr>
+          <p:spPr>
+            <a:xfrm>
+              <a:off x="4759960" y="2423160"/>
+              <a:ext cx="2501900" cy="0"/>
+            </a:xfrm>
+            <a:prstGeom prst="straightConnector1">
+              <a:avLst/>
+            </a:prstGeom>
+            <a:ln w="19050" cap="flat" cmpd="sng" algn="ctr">
+              <a:solidFill>
+                <a:schemeClr val="dk1"/>
+              </a:solidFill>
+              <a:prstDash val="solid"/>
+              <a:round/>
+              <a:headEnd type="none" w="med" len="med"/>
+              <a:tailEnd type="arrow" w="med" len="med"/>
+            </a:ln>
+          </p:spPr>
+          <p:style>
+            <a:lnRef idx="0">
+              <a:scrgbClr r="0" g="0" b="0"/>
+            </a:lnRef>
+            <a:fillRef idx="0">
+              <a:scrgbClr r="0" g="0" b="0"/>
+            </a:fillRef>
+            <a:effectRef idx="0">
+              <a:scrgbClr r="0" g="0" b="0"/>
+            </a:effectRef>
+            <a:fontRef idx="minor">
+              <a:schemeClr val="tx1"/>
+            </a:fontRef>
+          </p:style>
+        </p:cxnSp>
+        <p:cxnSp>
+          <p:nvCxnSpPr>
+            <p:cNvPr id="10" name="Straight Arrow Connector 9">
+              <a:extLst>
+                <a:ext uri="{FF2B5EF4-FFF2-40B4-BE49-F238E27FC236}">
+                  <a16:creationId xmlns:a16="http://schemas.microsoft.com/office/drawing/2014/main" id="{C7559C7C-D58B-9814-1048-A765963D051D}"/>
+                </a:ext>
+              </a:extLst>
+            </p:cNvPr>
+            <p:cNvCxnSpPr>
+              <a:cxnSpLocks/>
+              <a:endCxn id="7" idx="4"/>
+            </p:cNvCxnSpPr>
+            <p:nvPr/>
+          </p:nvCxnSpPr>
+          <p:spPr>
+            <a:xfrm flipV="1">
+              <a:off x="7399020" y="2519680"/>
+              <a:ext cx="0" cy="924560"/>
+            </a:xfrm>
+            <a:prstGeom prst="straightConnector1">
+              <a:avLst/>
+            </a:prstGeom>
+            <a:ln w="19050" cap="flat" cmpd="sng" algn="ctr">
+              <a:solidFill>
+                <a:schemeClr val="dk1"/>
+              </a:solidFill>
+              <a:prstDash val="solid"/>
+              <a:round/>
+              <a:headEnd type="none" w="med" len="med"/>
+              <a:tailEnd type="arrow" w="med" len="med"/>
+            </a:ln>
+          </p:spPr>
+          <p:style>
+            <a:lnRef idx="0">
+              <a:scrgbClr r="0" g="0" b="0"/>
+            </a:lnRef>
+            <a:fillRef idx="0">
+              <a:scrgbClr r="0" g="0" b="0"/>
+            </a:fillRef>
+            <a:effectRef idx="0">
+              <a:scrgbClr r="0" g="0" b="0"/>
+            </a:effectRef>
+            <a:fontRef idx="minor">
+              <a:schemeClr val="tx1"/>
+            </a:fontRef>
+          </p:style>
+        </p:cxnSp>
+      </p:grpSp>
+      <p:sp>
+        <p:nvSpPr>
+          <p:cNvPr id="17" name="Oval 16">
+            <a:extLst>
+              <a:ext uri="{FF2B5EF4-FFF2-40B4-BE49-F238E27FC236}">
+                <a16:creationId xmlns:a16="http://schemas.microsoft.com/office/drawing/2014/main" id="{AD40A6C0-F51A-3425-5926-A946E26752B6}"/>
+              </a:ext>
+            </a:extLst>
+          </p:cNvPr>
+          <p:cNvSpPr/>
+          <p:nvPr/>
+        </p:nvSpPr>
+        <p:spPr>
+          <a:xfrm>
+            <a:off x="3451861" y="4470400"/>
+            <a:ext cx="274320" cy="274320"/>
+          </a:xfrm>
+          <a:prstGeom prst="ellipse">
+            <a:avLst/>
+          </a:prstGeom>
+        </p:spPr>
+        <p:style>
+          <a:lnRef idx="2">
+            <a:schemeClr val="dk1">
+              <a:shade val="15000"/>
+            </a:schemeClr>
+          </a:lnRef>
+          <a:fillRef idx="1">
+            <a:schemeClr val="dk1"/>
+          </a:fillRef>
+          <a:effectRef idx="0">
+            <a:schemeClr val="dk1"/>
+          </a:effectRef>
+          <a:fontRef idx="minor">
+            <a:schemeClr val="lt1"/>
+          </a:fontRef>
+        </p:style>
+        <p:txBody>
+          <a:bodyPr rtlCol="0" anchor="ctr"/>
+          <a:lstStyle/>
+          <a:p>
+            <a:pPr algn="ctr"/>
+            <a:endParaRPr lang="en-CA"/>
+          </a:p>
+        </p:txBody>
+      </p:sp>
+      <p:cxnSp>
+        <p:nvCxnSpPr>
+          <p:cNvPr id="18" name="Straight Arrow Connector 17">
+            <a:extLst>
+              <a:ext uri="{FF2B5EF4-FFF2-40B4-BE49-F238E27FC236}">
+                <a16:creationId xmlns:a16="http://schemas.microsoft.com/office/drawing/2014/main" id="{BDB0F10D-EA05-1502-663E-E4F8CA253368}"/>
+              </a:ext>
+            </a:extLst>
+          </p:cNvPr>
+          <p:cNvCxnSpPr>
+            <a:cxnSpLocks/>
+          </p:cNvCxnSpPr>
+          <p:nvPr/>
+        </p:nvCxnSpPr>
+        <p:spPr>
+          <a:xfrm flipV="1">
+            <a:off x="3281680" y="4744720"/>
+            <a:ext cx="299720" cy="960120"/>
+          </a:xfrm>
+          <a:prstGeom prst="straightConnector1">
+            <a:avLst/>
+          </a:prstGeom>
+          <a:ln w="19050" cap="flat" cmpd="sng" algn="ctr">
+            <a:solidFill>
+              <a:schemeClr val="dk1"/>
+            </a:solidFill>
+            <a:prstDash val="solid"/>
+            <a:round/>
+            <a:headEnd type="none" w="med" len="med"/>
+            <a:tailEnd type="arrow" w="med" len="med"/>
+          </a:ln>
+        </p:spPr>
+        <p:style>
+          <a:lnRef idx="0">
+            <a:scrgbClr r="0" g="0" b="0"/>
+          </a:lnRef>
+          <a:fillRef idx="0">
+            <a:scrgbClr r="0" g="0" b="0"/>
+          </a:fillRef>
+          <a:effectRef idx="0">
+            <a:scrgbClr r="0" g="0" b="0"/>
+          </a:effectRef>
+          <a:fontRef idx="minor">
+            <a:schemeClr val="tx1"/>
+          </a:fontRef>
+        </p:style>
+      </p:cxnSp>
+      <p:cxnSp>
+        <p:nvCxnSpPr>
+          <p:cNvPr id="19" name="Straight Arrow Connector 18">
+            <a:extLst>
+              <a:ext uri="{FF2B5EF4-FFF2-40B4-BE49-F238E27FC236}">
+                <a16:creationId xmlns:a16="http://schemas.microsoft.com/office/drawing/2014/main" id="{948D2395-A749-2BC2-27C5-ECD698DB7A35}"/>
+              </a:ext>
+            </a:extLst>
+          </p:cNvPr>
+          <p:cNvCxnSpPr>
+            <a:cxnSpLocks/>
+            <a:endCxn id="17" idx="2"/>
+          </p:cNvCxnSpPr>
+          <p:nvPr/>
+        </p:nvCxnSpPr>
+        <p:spPr>
+          <a:xfrm>
+            <a:off x="1087121" y="4607560"/>
+            <a:ext cx="2364740" cy="0"/>
+          </a:xfrm>
+          <a:prstGeom prst="straightConnector1">
+            <a:avLst/>
+          </a:prstGeom>
+          <a:ln w="19050" cap="flat" cmpd="sng" algn="ctr">
+            <a:solidFill>
+              <a:schemeClr val="dk1"/>
+            </a:solidFill>
+            <a:prstDash val="solid"/>
+            <a:round/>
+            <a:headEnd type="none" w="med" len="med"/>
+            <a:tailEnd type="arrow" w="med" len="med"/>
+          </a:ln>
+        </p:spPr>
+        <p:style>
+          <a:lnRef idx="0">
+            <a:scrgbClr r="0" g="0" b="0"/>
+          </a:lnRef>
+          <a:fillRef idx="0">
+            <a:scrgbClr r="0" g="0" b="0"/>
+          </a:fillRef>
+          <a:effectRef idx="0">
+            <a:scrgbClr r="0" g="0" b="0"/>
+          </a:effectRef>
+          <a:fontRef idx="minor">
+            <a:schemeClr val="tx1"/>
+          </a:fontRef>
+        </p:style>
+      </p:cxnSp>
+      <p:sp>
+        <p:nvSpPr>
+          <p:cNvPr id="15" name="TextBox 14">
+            <a:extLst>
+              <a:ext uri="{FF2B5EF4-FFF2-40B4-BE49-F238E27FC236}">
+                <a16:creationId xmlns:a16="http://schemas.microsoft.com/office/drawing/2014/main" id="{80B88DE5-521C-BA19-7766-522C1AF4042B}"/>
+              </a:ext>
+            </a:extLst>
+          </p:cNvPr>
+          <p:cNvSpPr txBox="1"/>
+          <p:nvPr/>
+        </p:nvSpPr>
+        <p:spPr>
+          <a:xfrm>
+            <a:off x="5697220" y="1292860"/>
+            <a:ext cx="6243320" cy="1384995"/>
+          </a:xfrm>
+          <a:prstGeom prst="rect">
+            <a:avLst/>
+          </a:prstGeom>
+          <a:noFill/>
+        </p:spPr>
+        <p:txBody>
+          <a:bodyPr wrap="square" rtlCol="0">
+            <a:spAutoFit/>
+          </a:bodyPr>
+          <a:lstStyle/>
+          <a:p>
+            <a:r>
+              <a:rPr lang="en-CA" sz="2800" dirty="0"/>
+              <a:t>80% along the x, 55% along the y</a:t>
+            </a:r>
+          </a:p>
+          <a:p>
+            <a:r>
+              <a:rPr lang="en-CA" sz="2800" dirty="0"/>
+              <a:t>0.8 along x, 0.55 along the y (up)</a:t>
+            </a:r>
+          </a:p>
+          <a:p>
+            <a:r>
+              <a:rPr lang="en-CA" sz="2800" dirty="0"/>
+              <a:t>Coordinate is (0.8, 0.55)</a:t>
+            </a:r>
+          </a:p>
+        </p:txBody>
+      </p:sp>
+      <p:sp>
+        <p:nvSpPr>
+          <p:cNvPr id="23" name="TextBox 22">
+            <a:extLst>
+              <a:ext uri="{FF2B5EF4-FFF2-40B4-BE49-F238E27FC236}">
+                <a16:creationId xmlns:a16="http://schemas.microsoft.com/office/drawing/2014/main" id="{08B33F8A-80AB-435E-1AB5-3BAEADFD9158}"/>
+              </a:ext>
+            </a:extLst>
+          </p:cNvPr>
+          <p:cNvSpPr txBox="1"/>
+          <p:nvPr/>
+        </p:nvSpPr>
+        <p:spPr>
+          <a:xfrm>
+            <a:off x="5488942" y="3915062"/>
+            <a:ext cx="6243320" cy="1384995"/>
+          </a:xfrm>
+          <a:prstGeom prst="rect">
+            <a:avLst/>
+          </a:prstGeom>
+          <a:noFill/>
+        </p:spPr>
+        <p:txBody>
+          <a:bodyPr wrap="square" rtlCol="0">
+            <a:spAutoFit/>
+          </a:bodyPr>
+          <a:lstStyle/>
+          <a:p>
+            <a:r>
+              <a:rPr lang="en-CA" sz="2800" dirty="0"/>
+              <a:t>80% along the x, 55% along the y</a:t>
+            </a:r>
+          </a:p>
+          <a:p>
+            <a:r>
+              <a:rPr lang="en-CA" sz="2800" dirty="0"/>
+              <a:t>0.8 along x, 0.55 along the y (up)</a:t>
+            </a:r>
+          </a:p>
+          <a:p>
+            <a:r>
+              <a:rPr lang="en-CA" sz="2800" dirty="0"/>
+              <a:t>Coordinate is (0.8, 0.55)</a:t>
+            </a:r>
+          </a:p>
+        </p:txBody>
+      </p:sp>
+    </p:spTree>
+    <p:extLst>
+      <p:ext uri="{BB962C8B-B14F-4D97-AF65-F5344CB8AC3E}">
+        <p14:creationId xmlns:p14="http://schemas.microsoft.com/office/powerpoint/2010/main" val="2287528506"/>
+      </p:ext>
+    </p:extLst>
+  </p:cSld>
+  <p:clrMapOvr>
+    <a:masterClrMapping/>
+  </p:clrMapOvr>
+</p:sld>
+</file>
+
 <file path=ppt/slides/slide2.xml><?xml version="1.0" encoding="utf-8"?>
 <p:sld xmlns:a="http://schemas.openxmlformats.org/drawingml/2006/main" xmlns:r="http://schemas.openxmlformats.org/officeDocument/2006/relationships" xmlns:p="http://schemas.openxmlformats.org/presentationml/2006/main">
   <p:cSld>
@@ -7326,6 +8333,2290 @@
     <p:extLst>
       <p:ext uri="{BB962C8B-B14F-4D97-AF65-F5344CB8AC3E}">
         <p14:creationId xmlns:p14="http://schemas.microsoft.com/office/powerpoint/2010/main" val="531687359"/>
+      </p:ext>
+    </p:extLst>
+  </p:cSld>
+  <p:clrMapOvr>
+    <a:masterClrMapping/>
+  </p:clrMapOvr>
+</p:sld>
+</file>
+
+<file path=ppt/slides/slide20.xml><?xml version="1.0" encoding="utf-8"?>
+<p:sld xmlns:a="http://schemas.openxmlformats.org/drawingml/2006/main" xmlns:r="http://schemas.openxmlformats.org/officeDocument/2006/relationships" xmlns:p="http://schemas.openxmlformats.org/presentationml/2006/main">
+  <p:cSld>
+    <p:spTree>
+      <p:nvGrpSpPr>
+        <p:cNvPr id="1" name=""/>
+        <p:cNvGrpSpPr/>
+        <p:nvPr/>
+      </p:nvGrpSpPr>
+      <p:grpSpPr>
+        <a:xfrm>
+          <a:off x="0" y="0"/>
+          <a:ext cx="0" cy="0"/>
+          <a:chOff x="0" y="0"/>
+          <a:chExt cx="0" cy="0"/>
+        </a:xfrm>
+      </p:grpSpPr>
+      <p:sp>
+        <p:nvSpPr>
+          <p:cNvPr id="2" name="Title 1">
+            <a:extLst>
+              <a:ext uri="{FF2B5EF4-FFF2-40B4-BE49-F238E27FC236}">
+                <a16:creationId xmlns:a16="http://schemas.microsoft.com/office/drawing/2014/main" id="{E4FF9B25-CC32-67D1-517D-1A3DAD41A033}"/>
+              </a:ext>
+            </a:extLst>
+          </p:cNvPr>
+          <p:cNvSpPr>
+            <a:spLocks noGrp="1"/>
+          </p:cNvSpPr>
+          <p:nvPr>
+            <p:ph type="title"/>
+          </p:nvPr>
+        </p:nvSpPr>
+        <p:spPr>
+          <a:xfrm>
+            <a:off x="734061" y="141288"/>
+            <a:ext cx="10515600" cy="711835"/>
+          </a:xfrm>
+        </p:spPr>
+        <p:txBody>
+          <a:bodyPr/>
+          <a:lstStyle/>
+          <a:p>
+            <a:r>
+              <a:rPr lang="en-CA" dirty="0"/>
+              <a:t>Barycentric coordinates</a:t>
+            </a:r>
+          </a:p>
+        </p:txBody>
+      </p:sp>
+      <p:grpSp>
+        <p:nvGrpSpPr>
+          <p:cNvPr id="13" name="Group 12">
+            <a:extLst>
+              <a:ext uri="{FF2B5EF4-FFF2-40B4-BE49-F238E27FC236}">
+                <a16:creationId xmlns:a16="http://schemas.microsoft.com/office/drawing/2014/main" id="{41FEE2F7-948C-6F18-654C-D78329994A3F}"/>
+              </a:ext>
+            </a:extLst>
+          </p:cNvPr>
+          <p:cNvGrpSpPr/>
+          <p:nvPr/>
+        </p:nvGrpSpPr>
+        <p:grpSpPr>
+          <a:xfrm>
+            <a:off x="1250951" y="1210794"/>
+            <a:ext cx="4038600" cy="1859280"/>
+            <a:chOff x="5681981" y="1107440"/>
+            <a:chExt cx="4038600" cy="1859280"/>
+          </a:xfrm>
+        </p:grpSpPr>
+        <p:sp>
+          <p:nvSpPr>
+            <p:cNvPr id="16" name="Parallelogram 15">
+              <a:extLst>
+                <a:ext uri="{FF2B5EF4-FFF2-40B4-BE49-F238E27FC236}">
+                  <a16:creationId xmlns:a16="http://schemas.microsoft.com/office/drawing/2014/main" id="{C687601B-3E9A-774B-C734-AD389620CDC8}"/>
+                </a:ext>
+              </a:extLst>
+            </p:cNvPr>
+            <p:cNvSpPr/>
+            <p:nvPr/>
+          </p:nvSpPr>
+          <p:spPr>
+            <a:xfrm>
+              <a:off x="5681981" y="1107440"/>
+              <a:ext cx="4038600" cy="1859280"/>
+            </a:xfrm>
+            <a:prstGeom prst="parallelogram">
+              <a:avLst/>
+            </a:prstGeom>
+          </p:spPr>
+          <p:style>
+            <a:lnRef idx="2">
+              <a:schemeClr val="accent1">
+                <a:shade val="15000"/>
+              </a:schemeClr>
+            </a:lnRef>
+            <a:fillRef idx="1">
+              <a:schemeClr val="accent1"/>
+            </a:fillRef>
+            <a:effectRef idx="0">
+              <a:schemeClr val="accent1"/>
+            </a:effectRef>
+            <a:fontRef idx="minor">
+              <a:schemeClr val="lt1"/>
+            </a:fontRef>
+          </p:style>
+          <p:txBody>
+            <a:bodyPr rtlCol="0" anchor="ctr"/>
+            <a:lstStyle/>
+            <a:p>
+              <a:pPr algn="ctr"/>
+              <a:endParaRPr lang="en-CA"/>
+            </a:p>
+          </p:txBody>
+        </p:sp>
+        <p:sp>
+          <p:nvSpPr>
+            <p:cNvPr id="17" name="Oval 16">
+              <a:extLst>
+                <a:ext uri="{FF2B5EF4-FFF2-40B4-BE49-F238E27FC236}">
+                  <a16:creationId xmlns:a16="http://schemas.microsoft.com/office/drawing/2014/main" id="{AD40A6C0-F51A-3425-5926-A946E26752B6}"/>
+                </a:ext>
+              </a:extLst>
+            </p:cNvPr>
+            <p:cNvSpPr/>
+            <p:nvPr/>
+          </p:nvSpPr>
+          <p:spPr>
+            <a:xfrm>
+              <a:off x="8399781" y="1732280"/>
+              <a:ext cx="274320" cy="274320"/>
+            </a:xfrm>
+            <a:prstGeom prst="ellipse">
+              <a:avLst/>
+            </a:prstGeom>
+          </p:spPr>
+          <p:style>
+            <a:lnRef idx="2">
+              <a:schemeClr val="dk1">
+                <a:shade val="15000"/>
+              </a:schemeClr>
+            </a:lnRef>
+            <a:fillRef idx="1">
+              <a:schemeClr val="dk1"/>
+            </a:fillRef>
+            <a:effectRef idx="0">
+              <a:schemeClr val="dk1"/>
+            </a:effectRef>
+            <a:fontRef idx="minor">
+              <a:schemeClr val="lt1"/>
+            </a:fontRef>
+          </p:style>
+          <p:txBody>
+            <a:bodyPr rtlCol="0" anchor="ctr"/>
+            <a:lstStyle/>
+            <a:p>
+              <a:pPr algn="ctr"/>
+              <a:endParaRPr lang="en-CA"/>
+            </a:p>
+          </p:txBody>
+        </p:sp>
+        <p:cxnSp>
+          <p:nvCxnSpPr>
+            <p:cNvPr id="18" name="Straight Arrow Connector 17">
+              <a:extLst>
+                <a:ext uri="{FF2B5EF4-FFF2-40B4-BE49-F238E27FC236}">
+                  <a16:creationId xmlns:a16="http://schemas.microsoft.com/office/drawing/2014/main" id="{BDB0F10D-EA05-1502-663E-E4F8CA253368}"/>
+                </a:ext>
+              </a:extLst>
+            </p:cNvPr>
+            <p:cNvCxnSpPr>
+              <a:cxnSpLocks/>
+            </p:cNvCxnSpPr>
+            <p:nvPr/>
+          </p:nvCxnSpPr>
+          <p:spPr>
+            <a:xfrm flipV="1">
+              <a:off x="8229600" y="2006600"/>
+              <a:ext cx="299720" cy="960120"/>
+            </a:xfrm>
+            <a:prstGeom prst="straightConnector1">
+              <a:avLst/>
+            </a:prstGeom>
+            <a:ln w="19050" cap="flat" cmpd="sng" algn="ctr">
+              <a:solidFill>
+                <a:schemeClr val="dk1"/>
+              </a:solidFill>
+              <a:prstDash val="solid"/>
+              <a:round/>
+              <a:headEnd type="none" w="med" len="med"/>
+              <a:tailEnd type="arrow" w="med" len="med"/>
+            </a:ln>
+          </p:spPr>
+          <p:style>
+            <a:lnRef idx="0">
+              <a:scrgbClr r="0" g="0" b="0"/>
+            </a:lnRef>
+            <a:fillRef idx="0">
+              <a:scrgbClr r="0" g="0" b="0"/>
+            </a:fillRef>
+            <a:effectRef idx="0">
+              <a:scrgbClr r="0" g="0" b="0"/>
+            </a:effectRef>
+            <a:fontRef idx="minor">
+              <a:schemeClr val="tx1"/>
+            </a:fontRef>
+          </p:style>
+        </p:cxnSp>
+        <p:cxnSp>
+          <p:nvCxnSpPr>
+            <p:cNvPr id="19" name="Straight Arrow Connector 18">
+              <a:extLst>
+                <a:ext uri="{FF2B5EF4-FFF2-40B4-BE49-F238E27FC236}">
+                  <a16:creationId xmlns:a16="http://schemas.microsoft.com/office/drawing/2014/main" id="{948D2395-A749-2BC2-27C5-ECD698DB7A35}"/>
+                </a:ext>
+              </a:extLst>
+            </p:cNvPr>
+            <p:cNvCxnSpPr>
+              <a:cxnSpLocks/>
+              <a:endCxn id="17" idx="2"/>
+            </p:cNvCxnSpPr>
+            <p:nvPr/>
+          </p:nvCxnSpPr>
+          <p:spPr>
+            <a:xfrm>
+              <a:off x="6035041" y="1869440"/>
+              <a:ext cx="2364740" cy="0"/>
+            </a:xfrm>
+            <a:prstGeom prst="straightConnector1">
+              <a:avLst/>
+            </a:prstGeom>
+            <a:ln w="19050" cap="flat" cmpd="sng" algn="ctr">
+              <a:solidFill>
+                <a:schemeClr val="dk1"/>
+              </a:solidFill>
+              <a:prstDash val="solid"/>
+              <a:round/>
+              <a:headEnd type="none" w="med" len="med"/>
+              <a:tailEnd type="arrow" w="med" len="med"/>
+            </a:ln>
+          </p:spPr>
+          <p:style>
+            <a:lnRef idx="0">
+              <a:scrgbClr r="0" g="0" b="0"/>
+            </a:lnRef>
+            <a:fillRef idx="0">
+              <a:scrgbClr r="0" g="0" b="0"/>
+            </a:fillRef>
+            <a:effectRef idx="0">
+              <a:scrgbClr r="0" g="0" b="0"/>
+            </a:effectRef>
+            <a:fontRef idx="minor">
+              <a:schemeClr val="tx1"/>
+            </a:fontRef>
+          </p:style>
+        </p:cxnSp>
+      </p:grpSp>
+      <p:sp>
+        <p:nvSpPr>
+          <p:cNvPr id="23" name="TextBox 22">
+            <a:extLst>
+              <a:ext uri="{FF2B5EF4-FFF2-40B4-BE49-F238E27FC236}">
+                <a16:creationId xmlns:a16="http://schemas.microsoft.com/office/drawing/2014/main" id="{08B33F8A-80AB-435E-1AB5-3BAEADFD9158}"/>
+              </a:ext>
+            </a:extLst>
+          </p:cNvPr>
+          <p:cNvSpPr txBox="1"/>
+          <p:nvPr/>
+        </p:nvSpPr>
+        <p:spPr>
+          <a:xfrm>
+            <a:off x="5488942" y="3915062"/>
+            <a:ext cx="6243320" cy="1384995"/>
+          </a:xfrm>
+          <a:prstGeom prst="rect">
+            <a:avLst/>
+          </a:prstGeom>
+          <a:noFill/>
+        </p:spPr>
+        <p:txBody>
+          <a:bodyPr wrap="square" rtlCol="0">
+            <a:spAutoFit/>
+          </a:bodyPr>
+          <a:lstStyle/>
+          <a:p>
+            <a:r>
+              <a:rPr lang="en-CA" sz="2800" dirty="0"/>
+              <a:t>80% along the x, 55% along the y</a:t>
+            </a:r>
+          </a:p>
+          <a:p>
+            <a:r>
+              <a:rPr lang="en-CA" sz="2800" dirty="0"/>
+              <a:t>0.8 along x, 0.55 along the y (up)</a:t>
+            </a:r>
+          </a:p>
+          <a:p>
+            <a:r>
+              <a:rPr lang="en-CA" sz="2800" dirty="0"/>
+              <a:t>Coordinate is (0.8, 0.55)</a:t>
+            </a:r>
+          </a:p>
+        </p:txBody>
+      </p:sp>
+      <p:grpSp>
+        <p:nvGrpSpPr>
+          <p:cNvPr id="14" name="Group 13">
+            <a:extLst>
+              <a:ext uri="{FF2B5EF4-FFF2-40B4-BE49-F238E27FC236}">
+                <a16:creationId xmlns:a16="http://schemas.microsoft.com/office/drawing/2014/main" id="{EACCF7BB-957D-A3EA-7817-FEDDF959B529}"/>
+              </a:ext>
+            </a:extLst>
+          </p:cNvPr>
+          <p:cNvGrpSpPr/>
+          <p:nvPr/>
+        </p:nvGrpSpPr>
+        <p:grpSpPr>
+          <a:xfrm>
+            <a:off x="734061" y="4033520"/>
+            <a:ext cx="3870960" cy="1534160"/>
+            <a:chOff x="833120" y="1432560"/>
+            <a:chExt cx="3870960" cy="1534160"/>
+          </a:xfrm>
+        </p:grpSpPr>
+        <p:sp>
+          <p:nvSpPr>
+            <p:cNvPr id="3" name="Freeform: Shape 2">
+              <a:extLst>
+                <a:ext uri="{FF2B5EF4-FFF2-40B4-BE49-F238E27FC236}">
+                  <a16:creationId xmlns:a16="http://schemas.microsoft.com/office/drawing/2014/main" id="{74D0225A-1120-E6C0-5925-F05D5A2411F9}"/>
+                </a:ext>
+              </a:extLst>
+            </p:cNvPr>
+            <p:cNvSpPr/>
+            <p:nvPr/>
+          </p:nvSpPr>
+          <p:spPr>
+            <a:xfrm>
+              <a:off x="833120" y="1432560"/>
+              <a:ext cx="3870960" cy="1534160"/>
+            </a:xfrm>
+            <a:custGeom>
+              <a:avLst/>
+              <a:gdLst>
+                <a:gd name="connsiteX0" fmla="*/ 538480 w 3870960"/>
+                <a:gd name="connsiteY0" fmla="*/ 0 h 1534160"/>
+                <a:gd name="connsiteX1" fmla="*/ 0 w 3870960"/>
+                <a:gd name="connsiteY1" fmla="*/ 1351280 h 1534160"/>
+                <a:gd name="connsiteX2" fmla="*/ 3870960 w 3870960"/>
+                <a:gd name="connsiteY2" fmla="*/ 1534160 h 1534160"/>
+                <a:gd name="connsiteX3" fmla="*/ 3769360 w 3870960"/>
+                <a:gd name="connsiteY3" fmla="*/ 660400 h 1534160"/>
+                <a:gd name="connsiteX4" fmla="*/ 538480 w 3870960"/>
+                <a:gd name="connsiteY4" fmla="*/ 0 h 1534160"/>
+              </a:gdLst>
+              <a:ahLst/>
+              <a:cxnLst>
+                <a:cxn ang="0">
+                  <a:pos x="connsiteX0" y="connsiteY0"/>
+                </a:cxn>
+                <a:cxn ang="0">
+                  <a:pos x="connsiteX1" y="connsiteY1"/>
+                </a:cxn>
+                <a:cxn ang="0">
+                  <a:pos x="connsiteX2" y="connsiteY2"/>
+                </a:cxn>
+                <a:cxn ang="0">
+                  <a:pos x="connsiteX3" y="connsiteY3"/>
+                </a:cxn>
+                <a:cxn ang="0">
+                  <a:pos x="connsiteX4" y="connsiteY4"/>
+                </a:cxn>
+              </a:cxnLst>
+              <a:rect l="l" t="t" r="r" b="b"/>
+              <a:pathLst>
+                <a:path w="3870960" h="1534160">
+                  <a:moveTo>
+                    <a:pt x="538480" y="0"/>
+                  </a:moveTo>
+                  <a:lnTo>
+                    <a:pt x="0" y="1351280"/>
+                  </a:lnTo>
+                  <a:lnTo>
+                    <a:pt x="3870960" y="1534160"/>
+                  </a:lnTo>
+                  <a:lnTo>
+                    <a:pt x="3769360" y="660400"/>
+                  </a:lnTo>
+                  <a:lnTo>
+                    <a:pt x="538480" y="0"/>
+                  </a:lnTo>
+                  <a:close/>
+                </a:path>
+              </a:pathLst>
+            </a:custGeom>
+          </p:spPr>
+          <p:style>
+            <a:lnRef idx="2">
+              <a:schemeClr val="accent1">
+                <a:shade val="15000"/>
+              </a:schemeClr>
+            </a:lnRef>
+            <a:fillRef idx="1">
+              <a:schemeClr val="accent1"/>
+            </a:fillRef>
+            <a:effectRef idx="0">
+              <a:schemeClr val="accent1"/>
+            </a:effectRef>
+            <a:fontRef idx="minor">
+              <a:schemeClr val="lt1"/>
+            </a:fontRef>
+          </p:style>
+          <p:txBody>
+            <a:bodyPr rtlCol="0" anchor="ctr"/>
+            <a:lstStyle/>
+            <a:p>
+              <a:pPr algn="ctr"/>
+              <a:endParaRPr lang="en-CA"/>
+            </a:p>
+          </p:txBody>
+        </p:sp>
+        <p:cxnSp>
+          <p:nvCxnSpPr>
+            <p:cNvPr id="4" name="Straight Arrow Connector 3">
+              <a:extLst>
+                <a:ext uri="{FF2B5EF4-FFF2-40B4-BE49-F238E27FC236}">
+                  <a16:creationId xmlns:a16="http://schemas.microsoft.com/office/drawing/2014/main" id="{EC39E357-C552-62F4-99E1-42136F3917DB}"/>
+                </a:ext>
+              </a:extLst>
+            </p:cNvPr>
+            <p:cNvCxnSpPr>
+              <a:cxnSpLocks/>
+            </p:cNvCxnSpPr>
+            <p:nvPr/>
+          </p:nvCxnSpPr>
+          <p:spPr>
+            <a:xfrm>
+              <a:off x="1056641" y="2235200"/>
+              <a:ext cx="1960879" cy="132080"/>
+            </a:xfrm>
+            <a:prstGeom prst="straightConnector1">
+              <a:avLst/>
+            </a:prstGeom>
+            <a:ln w="19050" cap="flat" cmpd="sng" algn="ctr">
+              <a:solidFill>
+                <a:schemeClr val="dk1"/>
+              </a:solidFill>
+              <a:prstDash val="solid"/>
+              <a:round/>
+              <a:headEnd type="none" w="med" len="med"/>
+              <a:tailEnd type="arrow" w="med" len="med"/>
+            </a:ln>
+          </p:spPr>
+          <p:style>
+            <a:lnRef idx="0">
+              <a:scrgbClr r="0" g="0" b="0"/>
+            </a:lnRef>
+            <a:fillRef idx="0">
+              <a:scrgbClr r="0" g="0" b="0"/>
+            </a:fillRef>
+            <a:effectRef idx="0">
+              <a:scrgbClr r="0" g="0" b="0"/>
+            </a:effectRef>
+            <a:fontRef idx="minor">
+              <a:schemeClr val="tx1"/>
+            </a:fontRef>
+          </p:style>
+        </p:cxnSp>
+        <p:sp>
+          <p:nvSpPr>
+            <p:cNvPr id="8" name="Oval 7">
+              <a:extLst>
+                <a:ext uri="{FF2B5EF4-FFF2-40B4-BE49-F238E27FC236}">
+                  <a16:creationId xmlns:a16="http://schemas.microsoft.com/office/drawing/2014/main" id="{6FD75EBF-2152-FBE1-CF38-9EBEC7C04A6C}"/>
+                </a:ext>
+              </a:extLst>
+            </p:cNvPr>
+            <p:cNvSpPr/>
+            <p:nvPr/>
+          </p:nvSpPr>
+          <p:spPr>
+            <a:xfrm>
+              <a:off x="3094990" y="2246932"/>
+              <a:ext cx="274320" cy="274320"/>
+            </a:xfrm>
+            <a:prstGeom prst="ellipse">
+              <a:avLst/>
+            </a:prstGeom>
+          </p:spPr>
+          <p:style>
+            <a:lnRef idx="2">
+              <a:schemeClr val="dk1">
+                <a:shade val="15000"/>
+              </a:schemeClr>
+            </a:lnRef>
+            <a:fillRef idx="1">
+              <a:schemeClr val="dk1"/>
+            </a:fillRef>
+            <a:effectRef idx="0">
+              <a:schemeClr val="dk1"/>
+            </a:effectRef>
+            <a:fontRef idx="minor">
+              <a:schemeClr val="lt1"/>
+            </a:fontRef>
+          </p:style>
+          <p:txBody>
+            <a:bodyPr rtlCol="0" anchor="ctr"/>
+            <a:lstStyle/>
+            <a:p>
+              <a:pPr algn="ctr"/>
+              <a:endParaRPr lang="en-CA"/>
+            </a:p>
+          </p:txBody>
+        </p:sp>
+        <p:cxnSp>
+          <p:nvCxnSpPr>
+            <p:cNvPr id="11" name="Straight Arrow Connector 10">
+              <a:extLst>
+                <a:ext uri="{FF2B5EF4-FFF2-40B4-BE49-F238E27FC236}">
+                  <a16:creationId xmlns:a16="http://schemas.microsoft.com/office/drawing/2014/main" id="{6E43C4B6-802A-5D37-110C-700D044C4AEC}"/>
+                </a:ext>
+              </a:extLst>
+            </p:cNvPr>
+            <p:cNvCxnSpPr>
+              <a:cxnSpLocks/>
+            </p:cNvCxnSpPr>
+            <p:nvPr/>
+          </p:nvCxnSpPr>
+          <p:spPr>
+            <a:xfrm flipV="1">
+              <a:off x="3154681" y="2563464"/>
+              <a:ext cx="77469" cy="321976"/>
+            </a:xfrm>
+            <a:prstGeom prst="straightConnector1">
+              <a:avLst/>
+            </a:prstGeom>
+            <a:ln w="19050" cap="flat" cmpd="sng" algn="ctr">
+              <a:solidFill>
+                <a:schemeClr val="dk1"/>
+              </a:solidFill>
+              <a:prstDash val="solid"/>
+              <a:round/>
+              <a:headEnd type="none" w="med" len="med"/>
+              <a:tailEnd type="arrow" w="med" len="med"/>
+            </a:ln>
+          </p:spPr>
+          <p:style>
+            <a:lnRef idx="0">
+              <a:scrgbClr r="0" g="0" b="0"/>
+            </a:lnRef>
+            <a:fillRef idx="0">
+              <a:scrgbClr r="0" g="0" b="0"/>
+            </a:fillRef>
+            <a:effectRef idx="0">
+              <a:scrgbClr r="0" g="0" b="0"/>
+            </a:effectRef>
+            <a:fontRef idx="minor">
+              <a:schemeClr val="tx1"/>
+            </a:fontRef>
+          </p:style>
+        </p:cxnSp>
+      </p:grpSp>
+      <p:sp>
+        <p:nvSpPr>
+          <p:cNvPr id="21" name="TextBox 20">
+            <a:extLst>
+              <a:ext uri="{FF2B5EF4-FFF2-40B4-BE49-F238E27FC236}">
+                <a16:creationId xmlns:a16="http://schemas.microsoft.com/office/drawing/2014/main" id="{009B044B-14C4-9703-9966-99ED3D812762}"/>
+              </a:ext>
+            </a:extLst>
+          </p:cNvPr>
+          <p:cNvSpPr txBox="1"/>
+          <p:nvPr/>
+        </p:nvSpPr>
+        <p:spPr>
+          <a:xfrm>
+            <a:off x="5642611" y="1447936"/>
+            <a:ext cx="6243320" cy="1384995"/>
+          </a:xfrm>
+          <a:prstGeom prst="rect">
+            <a:avLst/>
+          </a:prstGeom>
+          <a:noFill/>
+        </p:spPr>
+        <p:txBody>
+          <a:bodyPr wrap="square" rtlCol="0">
+            <a:spAutoFit/>
+          </a:bodyPr>
+          <a:lstStyle/>
+          <a:p>
+            <a:r>
+              <a:rPr lang="en-CA" sz="2800" dirty="0"/>
+              <a:t>80% along the x, 55% along the y</a:t>
+            </a:r>
+          </a:p>
+          <a:p>
+            <a:r>
+              <a:rPr lang="en-CA" sz="2800" dirty="0"/>
+              <a:t>0.8 along x, 0.55 along the y (up)</a:t>
+            </a:r>
+          </a:p>
+          <a:p>
+            <a:r>
+              <a:rPr lang="en-CA" sz="2800" dirty="0"/>
+              <a:t>Coordinate is (0.8, 0.55)</a:t>
+            </a:r>
+          </a:p>
+        </p:txBody>
+      </p:sp>
+    </p:spTree>
+    <p:extLst>
+      <p:ext uri="{BB962C8B-B14F-4D97-AF65-F5344CB8AC3E}">
+        <p14:creationId xmlns:p14="http://schemas.microsoft.com/office/powerpoint/2010/main" val="3269296334"/>
+      </p:ext>
+    </p:extLst>
+  </p:cSld>
+  <p:clrMapOvr>
+    <a:masterClrMapping/>
+  </p:clrMapOvr>
+</p:sld>
+</file>
+
+<file path=ppt/slides/slide21.xml><?xml version="1.0" encoding="utf-8"?>
+<p:sld xmlns:a="http://schemas.openxmlformats.org/drawingml/2006/main" xmlns:r="http://schemas.openxmlformats.org/officeDocument/2006/relationships" xmlns:p="http://schemas.openxmlformats.org/presentationml/2006/main">
+  <p:cSld>
+    <p:spTree>
+      <p:nvGrpSpPr>
+        <p:cNvPr id="1" name=""/>
+        <p:cNvGrpSpPr/>
+        <p:nvPr/>
+      </p:nvGrpSpPr>
+      <p:grpSpPr>
+        <a:xfrm>
+          <a:off x="0" y="0"/>
+          <a:ext cx="0" cy="0"/>
+          <a:chOff x="0" y="0"/>
+          <a:chExt cx="0" cy="0"/>
+        </a:xfrm>
+      </p:grpSpPr>
+      <p:sp>
+        <p:nvSpPr>
+          <p:cNvPr id="12" name="Isosceles Triangle 11">
+            <a:extLst>
+              <a:ext uri="{FF2B5EF4-FFF2-40B4-BE49-F238E27FC236}">
+                <a16:creationId xmlns:a16="http://schemas.microsoft.com/office/drawing/2014/main" id="{44907506-CBF7-3FD1-4AC2-E917ABBC2B4E}"/>
+              </a:ext>
+            </a:extLst>
+          </p:cNvPr>
+          <p:cNvSpPr/>
+          <p:nvPr/>
+        </p:nvSpPr>
+        <p:spPr>
+          <a:xfrm>
+            <a:off x="5655310" y="3026726"/>
+            <a:ext cx="5030631" cy="3353754"/>
+          </a:xfrm>
+          <a:prstGeom prst="triangle">
+            <a:avLst>
+              <a:gd name="adj" fmla="val 76255"/>
+            </a:avLst>
+          </a:prstGeom>
+        </p:spPr>
+        <p:style>
+          <a:lnRef idx="2">
+            <a:schemeClr val="accent1">
+              <a:shade val="15000"/>
+            </a:schemeClr>
+          </a:lnRef>
+          <a:fillRef idx="1">
+            <a:schemeClr val="accent1"/>
+          </a:fillRef>
+          <a:effectRef idx="0">
+            <a:schemeClr val="accent1"/>
+          </a:effectRef>
+          <a:fontRef idx="minor">
+            <a:schemeClr val="lt1"/>
+          </a:fontRef>
+        </p:style>
+        <p:txBody>
+          <a:bodyPr rtlCol="0" anchor="ctr"/>
+          <a:lstStyle/>
+          <a:p>
+            <a:pPr algn="ctr"/>
+            <a:endParaRPr lang="en-CA"/>
+          </a:p>
+        </p:txBody>
+      </p:sp>
+      <p:sp>
+        <p:nvSpPr>
+          <p:cNvPr id="2" name="Title 1">
+            <a:extLst>
+              <a:ext uri="{FF2B5EF4-FFF2-40B4-BE49-F238E27FC236}">
+                <a16:creationId xmlns:a16="http://schemas.microsoft.com/office/drawing/2014/main" id="{E4FF9B25-CC32-67D1-517D-1A3DAD41A033}"/>
+              </a:ext>
+            </a:extLst>
+          </p:cNvPr>
+          <p:cNvSpPr>
+            <a:spLocks noGrp="1"/>
+          </p:cNvSpPr>
+          <p:nvPr>
+            <p:ph type="title"/>
+          </p:nvPr>
+        </p:nvSpPr>
+        <p:spPr>
+          <a:xfrm>
+            <a:off x="734061" y="141288"/>
+            <a:ext cx="10515600" cy="711835"/>
+          </a:xfrm>
+        </p:spPr>
+        <p:txBody>
+          <a:bodyPr/>
+          <a:lstStyle/>
+          <a:p>
+            <a:r>
+              <a:rPr lang="en-CA" dirty="0"/>
+              <a:t>Barycentric coordinates</a:t>
+            </a:r>
+          </a:p>
+        </p:txBody>
+      </p:sp>
+      <p:sp>
+        <p:nvSpPr>
+          <p:cNvPr id="21" name="TextBox 20">
+            <a:extLst>
+              <a:ext uri="{FF2B5EF4-FFF2-40B4-BE49-F238E27FC236}">
+                <a16:creationId xmlns:a16="http://schemas.microsoft.com/office/drawing/2014/main" id="{009B044B-14C4-9703-9966-99ED3D812762}"/>
+              </a:ext>
+            </a:extLst>
+          </p:cNvPr>
+          <p:cNvSpPr txBox="1"/>
+          <p:nvPr/>
+        </p:nvSpPr>
+        <p:spPr>
+          <a:xfrm>
+            <a:off x="5642611" y="1447936"/>
+            <a:ext cx="6243320" cy="1384995"/>
+          </a:xfrm>
+          <a:prstGeom prst="rect">
+            <a:avLst/>
+          </a:prstGeom>
+          <a:noFill/>
+        </p:spPr>
+        <p:txBody>
+          <a:bodyPr wrap="square" rtlCol="0">
+            <a:spAutoFit/>
+          </a:bodyPr>
+          <a:lstStyle/>
+          <a:p>
+            <a:r>
+              <a:rPr lang="en-CA" sz="2800" dirty="0"/>
+              <a:t>80% along the x, 55% along the y</a:t>
+            </a:r>
+          </a:p>
+          <a:p>
+            <a:r>
+              <a:rPr lang="en-CA" sz="2800" dirty="0"/>
+              <a:t>0.8 along x, 0.55 along the y (up)</a:t>
+            </a:r>
+          </a:p>
+          <a:p>
+            <a:r>
+              <a:rPr lang="en-CA" sz="2800" dirty="0"/>
+              <a:t>Coordinate is (0.8, 0.55)</a:t>
+            </a:r>
+          </a:p>
+        </p:txBody>
+      </p:sp>
+      <p:sp>
+        <p:nvSpPr>
+          <p:cNvPr id="6" name="Rectangle 5">
+            <a:extLst>
+              <a:ext uri="{FF2B5EF4-FFF2-40B4-BE49-F238E27FC236}">
+                <a16:creationId xmlns:a16="http://schemas.microsoft.com/office/drawing/2014/main" id="{F0096F3A-4950-2EF9-8013-6048EF6E8122}"/>
+              </a:ext>
+            </a:extLst>
+          </p:cNvPr>
+          <p:cNvSpPr/>
+          <p:nvPr/>
+        </p:nvSpPr>
+        <p:spPr>
+          <a:xfrm>
+            <a:off x="1082041" y="1292860"/>
+            <a:ext cx="3718560" cy="2252921"/>
+          </a:xfrm>
+          <a:prstGeom prst="rect">
+            <a:avLst/>
+          </a:prstGeom>
+        </p:spPr>
+        <p:style>
+          <a:lnRef idx="2">
+            <a:schemeClr val="accent1">
+              <a:shade val="15000"/>
+            </a:schemeClr>
+          </a:lnRef>
+          <a:fillRef idx="1">
+            <a:schemeClr val="accent1"/>
+          </a:fillRef>
+          <a:effectRef idx="0">
+            <a:schemeClr val="accent1"/>
+          </a:effectRef>
+          <a:fontRef idx="minor">
+            <a:schemeClr val="lt1"/>
+          </a:fontRef>
+        </p:style>
+        <p:txBody>
+          <a:bodyPr rtlCol="0" anchor="ctr"/>
+          <a:lstStyle/>
+          <a:p>
+            <a:pPr algn="ctr"/>
+            <a:endParaRPr lang="en-CA"/>
+          </a:p>
+        </p:txBody>
+      </p:sp>
+      <p:sp>
+        <p:nvSpPr>
+          <p:cNvPr id="7" name="Oval 6">
+            <a:extLst>
+              <a:ext uri="{FF2B5EF4-FFF2-40B4-BE49-F238E27FC236}">
+                <a16:creationId xmlns:a16="http://schemas.microsoft.com/office/drawing/2014/main" id="{7262DC6F-01AF-61B0-EE40-0CB86EC8CAEE}"/>
+              </a:ext>
+            </a:extLst>
+          </p:cNvPr>
+          <p:cNvSpPr/>
+          <p:nvPr/>
+        </p:nvSpPr>
+        <p:spPr>
+          <a:xfrm>
+            <a:off x="3583941" y="2226055"/>
+            <a:ext cx="274320" cy="298181"/>
+          </a:xfrm>
+          <a:prstGeom prst="ellipse">
+            <a:avLst/>
+          </a:prstGeom>
+        </p:spPr>
+        <p:style>
+          <a:lnRef idx="2">
+            <a:schemeClr val="dk1">
+              <a:shade val="15000"/>
+            </a:schemeClr>
+          </a:lnRef>
+          <a:fillRef idx="1">
+            <a:schemeClr val="dk1"/>
+          </a:fillRef>
+          <a:effectRef idx="0">
+            <a:schemeClr val="dk1"/>
+          </a:effectRef>
+          <a:fontRef idx="minor">
+            <a:schemeClr val="lt1"/>
+          </a:fontRef>
+        </p:style>
+        <p:txBody>
+          <a:bodyPr rtlCol="0" anchor="ctr"/>
+          <a:lstStyle/>
+          <a:p>
+            <a:pPr algn="ctr"/>
+            <a:endParaRPr lang="en-CA"/>
+          </a:p>
+        </p:txBody>
+      </p:sp>
+      <p:cxnSp>
+        <p:nvCxnSpPr>
+          <p:cNvPr id="9" name="Straight Arrow Connector 8">
+            <a:extLst>
+              <a:ext uri="{FF2B5EF4-FFF2-40B4-BE49-F238E27FC236}">
+                <a16:creationId xmlns:a16="http://schemas.microsoft.com/office/drawing/2014/main" id="{4BA1ABEE-0EF7-58B9-096D-E4A4553188E6}"/>
+              </a:ext>
+            </a:extLst>
+          </p:cNvPr>
+          <p:cNvCxnSpPr>
+            <a:cxnSpLocks/>
+            <a:stCxn id="6" idx="1"/>
+          </p:cNvCxnSpPr>
+          <p:nvPr/>
+        </p:nvCxnSpPr>
+        <p:spPr>
+          <a:xfrm>
+            <a:off x="1082041" y="2419321"/>
+            <a:ext cx="2501900" cy="0"/>
+          </a:xfrm>
+          <a:prstGeom prst="straightConnector1">
+            <a:avLst/>
+          </a:prstGeom>
+          <a:ln w="19050" cap="flat" cmpd="sng" algn="ctr">
+            <a:solidFill>
+              <a:schemeClr val="dk1"/>
+            </a:solidFill>
+            <a:prstDash val="solid"/>
+            <a:round/>
+            <a:headEnd type="none" w="med" len="med"/>
+            <a:tailEnd type="arrow" w="med" len="med"/>
+          </a:ln>
+        </p:spPr>
+        <p:style>
+          <a:lnRef idx="0">
+            <a:scrgbClr r="0" g="0" b="0"/>
+          </a:lnRef>
+          <a:fillRef idx="0">
+            <a:scrgbClr r="0" g="0" b="0"/>
+          </a:fillRef>
+          <a:effectRef idx="0">
+            <a:scrgbClr r="0" g="0" b="0"/>
+          </a:effectRef>
+          <a:fontRef idx="minor">
+            <a:schemeClr val="tx1"/>
+          </a:fontRef>
+        </p:style>
+      </p:cxnSp>
+      <p:cxnSp>
+        <p:nvCxnSpPr>
+          <p:cNvPr id="10" name="Straight Arrow Connector 9">
+            <a:extLst>
+              <a:ext uri="{FF2B5EF4-FFF2-40B4-BE49-F238E27FC236}">
+                <a16:creationId xmlns:a16="http://schemas.microsoft.com/office/drawing/2014/main" id="{5716D688-41A7-2F75-2738-5263F6C9E74B}"/>
+              </a:ext>
+            </a:extLst>
+          </p:cNvPr>
+          <p:cNvCxnSpPr>
+            <a:cxnSpLocks/>
+            <a:endCxn id="7" idx="4"/>
+          </p:cNvCxnSpPr>
+          <p:nvPr/>
+        </p:nvCxnSpPr>
+        <p:spPr>
+          <a:xfrm flipV="1">
+            <a:off x="3721101" y="2524236"/>
+            <a:ext cx="0" cy="1004980"/>
+          </a:xfrm>
+          <a:prstGeom prst="straightConnector1">
+            <a:avLst/>
+          </a:prstGeom>
+          <a:ln w="19050" cap="flat" cmpd="sng" algn="ctr">
+            <a:solidFill>
+              <a:schemeClr val="dk1"/>
+            </a:solidFill>
+            <a:prstDash val="solid"/>
+            <a:round/>
+            <a:headEnd type="none" w="med" len="med"/>
+            <a:tailEnd type="arrow" w="med" len="med"/>
+          </a:ln>
+        </p:spPr>
+        <p:style>
+          <a:lnRef idx="0">
+            <a:scrgbClr r="0" g="0" b="0"/>
+          </a:lnRef>
+          <a:fillRef idx="0">
+            <a:scrgbClr r="0" g="0" b="0"/>
+          </a:fillRef>
+          <a:effectRef idx="0">
+            <a:scrgbClr r="0" g="0" b="0"/>
+          </a:effectRef>
+          <a:fontRef idx="minor">
+            <a:schemeClr val="tx1"/>
+          </a:fontRef>
+        </p:style>
+      </p:cxnSp>
+      <p:sp>
+        <p:nvSpPr>
+          <p:cNvPr id="15" name="Oval 14">
+            <a:extLst>
+              <a:ext uri="{FF2B5EF4-FFF2-40B4-BE49-F238E27FC236}">
+                <a16:creationId xmlns:a16="http://schemas.microsoft.com/office/drawing/2014/main" id="{1F02908A-838B-D134-E820-093624584EBA}"/>
+              </a:ext>
+            </a:extLst>
+          </p:cNvPr>
+          <p:cNvSpPr/>
+          <p:nvPr/>
+        </p:nvSpPr>
+        <p:spPr>
+          <a:xfrm>
+            <a:off x="8613142" y="5177787"/>
+            <a:ext cx="274320" cy="298181"/>
+          </a:xfrm>
+          <a:prstGeom prst="ellipse">
+            <a:avLst/>
+          </a:prstGeom>
+        </p:spPr>
+        <p:style>
+          <a:lnRef idx="2">
+            <a:schemeClr val="dk1">
+              <a:shade val="15000"/>
+            </a:schemeClr>
+          </a:lnRef>
+          <a:fillRef idx="1">
+            <a:schemeClr val="dk1"/>
+          </a:fillRef>
+          <a:effectRef idx="0">
+            <a:schemeClr val="dk1"/>
+          </a:effectRef>
+          <a:fontRef idx="minor">
+            <a:schemeClr val="lt1"/>
+          </a:fontRef>
+        </p:style>
+        <p:txBody>
+          <a:bodyPr rtlCol="0" anchor="ctr"/>
+          <a:lstStyle/>
+          <a:p>
+            <a:pPr algn="ctr"/>
+            <a:endParaRPr lang="en-CA"/>
+          </a:p>
+        </p:txBody>
+      </p:sp>
+      <p:cxnSp>
+        <p:nvCxnSpPr>
+          <p:cNvPr id="20" name="Straight Arrow Connector 19">
+            <a:extLst>
+              <a:ext uri="{FF2B5EF4-FFF2-40B4-BE49-F238E27FC236}">
+                <a16:creationId xmlns:a16="http://schemas.microsoft.com/office/drawing/2014/main" id="{3F1647A4-4F1A-E009-F106-998A594300B7}"/>
+              </a:ext>
+            </a:extLst>
+          </p:cNvPr>
+          <p:cNvCxnSpPr>
+            <a:cxnSpLocks/>
+          </p:cNvCxnSpPr>
+          <p:nvPr/>
+        </p:nvCxnSpPr>
+        <p:spPr>
+          <a:xfrm>
+            <a:off x="7821930" y="4470346"/>
+            <a:ext cx="805181" cy="790627"/>
+          </a:xfrm>
+          <a:prstGeom prst="straightConnector1">
+            <a:avLst/>
+          </a:prstGeom>
+          <a:ln w="19050" cap="flat" cmpd="sng" algn="ctr">
+            <a:solidFill>
+              <a:schemeClr val="dk1"/>
+            </a:solidFill>
+            <a:prstDash val="solid"/>
+            <a:round/>
+            <a:headEnd type="none" w="med" len="med"/>
+            <a:tailEnd type="arrow" w="med" len="med"/>
+          </a:ln>
+        </p:spPr>
+        <p:style>
+          <a:lnRef idx="0">
+            <a:scrgbClr r="0" g="0" b="0"/>
+          </a:lnRef>
+          <a:fillRef idx="0">
+            <a:scrgbClr r="0" g="0" b="0"/>
+          </a:fillRef>
+          <a:effectRef idx="0">
+            <a:scrgbClr r="0" g="0" b="0"/>
+          </a:effectRef>
+          <a:fontRef idx="minor">
+            <a:schemeClr val="tx1"/>
+          </a:fontRef>
+        </p:style>
+      </p:cxnSp>
+      <p:cxnSp>
+        <p:nvCxnSpPr>
+          <p:cNvPr id="26" name="Straight Arrow Connector 25">
+            <a:extLst>
+              <a:ext uri="{FF2B5EF4-FFF2-40B4-BE49-F238E27FC236}">
+                <a16:creationId xmlns:a16="http://schemas.microsoft.com/office/drawing/2014/main" id="{409536BA-01CC-5A0F-66DD-B812A5F55F42}"/>
+              </a:ext>
+            </a:extLst>
+          </p:cNvPr>
+          <p:cNvCxnSpPr>
+            <a:cxnSpLocks/>
+            <a:stCxn id="12" idx="5"/>
+          </p:cNvCxnSpPr>
+          <p:nvPr/>
+        </p:nvCxnSpPr>
+        <p:spPr>
+          <a:xfrm flipH="1">
+            <a:off x="8887462" y="4703603"/>
+            <a:ext cx="1201217" cy="623274"/>
+          </a:xfrm>
+          <a:prstGeom prst="straightConnector1">
+            <a:avLst/>
+          </a:prstGeom>
+          <a:ln w="19050" cap="flat" cmpd="sng" algn="ctr">
+            <a:solidFill>
+              <a:schemeClr val="dk1"/>
+            </a:solidFill>
+            <a:prstDash val="solid"/>
+            <a:round/>
+            <a:headEnd type="none" w="med" len="med"/>
+            <a:tailEnd type="arrow" w="med" len="med"/>
+          </a:ln>
+        </p:spPr>
+        <p:style>
+          <a:lnRef idx="0">
+            <a:scrgbClr r="0" g="0" b="0"/>
+          </a:lnRef>
+          <a:fillRef idx="0">
+            <a:scrgbClr r="0" g="0" b="0"/>
+          </a:fillRef>
+          <a:effectRef idx="0">
+            <a:scrgbClr r="0" g="0" b="0"/>
+          </a:effectRef>
+          <a:fontRef idx="minor">
+            <a:schemeClr val="tx1"/>
+          </a:fontRef>
+        </p:style>
+      </p:cxnSp>
+      <p:cxnSp>
+        <p:nvCxnSpPr>
+          <p:cNvPr id="29" name="Straight Arrow Connector 28">
+            <a:extLst>
+              <a:ext uri="{FF2B5EF4-FFF2-40B4-BE49-F238E27FC236}">
+                <a16:creationId xmlns:a16="http://schemas.microsoft.com/office/drawing/2014/main" id="{33A3879B-1103-DD8D-343C-1D035BE7D276}"/>
+              </a:ext>
+            </a:extLst>
+          </p:cNvPr>
+          <p:cNvCxnSpPr>
+            <a:cxnSpLocks/>
+          </p:cNvCxnSpPr>
+          <p:nvPr/>
+        </p:nvCxnSpPr>
+        <p:spPr>
+          <a:xfrm flipV="1">
+            <a:off x="8627111" y="5475968"/>
+            <a:ext cx="123191" cy="904512"/>
+          </a:xfrm>
+          <a:prstGeom prst="straightConnector1">
+            <a:avLst/>
+          </a:prstGeom>
+          <a:ln w="19050" cap="flat" cmpd="sng" algn="ctr">
+            <a:solidFill>
+              <a:schemeClr val="dk1"/>
+            </a:solidFill>
+            <a:prstDash val="solid"/>
+            <a:round/>
+            <a:headEnd type="none" w="med" len="med"/>
+            <a:tailEnd type="arrow" w="med" len="med"/>
+          </a:ln>
+        </p:spPr>
+        <p:style>
+          <a:lnRef idx="0">
+            <a:scrgbClr r="0" g="0" b="0"/>
+          </a:lnRef>
+          <a:fillRef idx="0">
+            <a:scrgbClr r="0" g="0" b="0"/>
+          </a:fillRef>
+          <a:effectRef idx="0">
+            <a:scrgbClr r="0" g="0" b="0"/>
+          </a:effectRef>
+          <a:fontRef idx="minor">
+            <a:schemeClr val="tx1"/>
+          </a:fontRef>
+        </p:style>
+      </p:cxnSp>
+    </p:spTree>
+    <p:extLst>
+      <p:ext uri="{BB962C8B-B14F-4D97-AF65-F5344CB8AC3E}">
+        <p14:creationId xmlns:p14="http://schemas.microsoft.com/office/powerpoint/2010/main" val="4291211092"/>
+      </p:ext>
+    </p:extLst>
+  </p:cSld>
+  <p:clrMapOvr>
+    <a:masterClrMapping/>
+  </p:clrMapOvr>
+</p:sld>
+</file>
+
+<file path=ppt/slides/slide22.xml><?xml version="1.0" encoding="utf-8"?>
+<p:sld xmlns:a="http://schemas.openxmlformats.org/drawingml/2006/main" xmlns:r="http://schemas.openxmlformats.org/officeDocument/2006/relationships" xmlns:p="http://schemas.openxmlformats.org/presentationml/2006/main">
+  <p:cSld>
+    <p:spTree>
+      <p:nvGrpSpPr>
+        <p:cNvPr id="1" name=""/>
+        <p:cNvGrpSpPr/>
+        <p:nvPr/>
+      </p:nvGrpSpPr>
+      <p:grpSpPr>
+        <a:xfrm>
+          <a:off x="0" y="0"/>
+          <a:ext cx="0" cy="0"/>
+          <a:chOff x="0" y="0"/>
+          <a:chExt cx="0" cy="0"/>
+        </a:xfrm>
+      </p:grpSpPr>
+      <p:sp>
+        <p:nvSpPr>
+          <p:cNvPr id="12" name="Isosceles Triangle 11">
+            <a:extLst>
+              <a:ext uri="{FF2B5EF4-FFF2-40B4-BE49-F238E27FC236}">
+                <a16:creationId xmlns:a16="http://schemas.microsoft.com/office/drawing/2014/main" id="{44907506-CBF7-3FD1-4AC2-E917ABBC2B4E}"/>
+              </a:ext>
+            </a:extLst>
+          </p:cNvPr>
+          <p:cNvSpPr/>
+          <p:nvPr/>
+        </p:nvSpPr>
+        <p:spPr>
+          <a:xfrm>
+            <a:off x="5655310" y="3026726"/>
+            <a:ext cx="5030631" cy="3353754"/>
+          </a:xfrm>
+          <a:prstGeom prst="triangle">
+            <a:avLst>
+              <a:gd name="adj" fmla="val 74437"/>
+            </a:avLst>
+          </a:prstGeom>
+        </p:spPr>
+        <p:style>
+          <a:lnRef idx="2">
+            <a:schemeClr val="accent1">
+              <a:shade val="15000"/>
+            </a:schemeClr>
+          </a:lnRef>
+          <a:fillRef idx="1">
+            <a:schemeClr val="accent1"/>
+          </a:fillRef>
+          <a:effectRef idx="0">
+            <a:schemeClr val="accent1"/>
+          </a:effectRef>
+          <a:fontRef idx="minor">
+            <a:schemeClr val="lt1"/>
+          </a:fontRef>
+        </p:style>
+        <p:txBody>
+          <a:bodyPr rtlCol="0" anchor="ctr"/>
+          <a:lstStyle/>
+          <a:p>
+            <a:pPr algn="ctr"/>
+            <a:endParaRPr lang="en-CA"/>
+          </a:p>
+        </p:txBody>
+      </p:sp>
+      <p:sp>
+        <p:nvSpPr>
+          <p:cNvPr id="2" name="Title 1">
+            <a:extLst>
+              <a:ext uri="{FF2B5EF4-FFF2-40B4-BE49-F238E27FC236}">
+                <a16:creationId xmlns:a16="http://schemas.microsoft.com/office/drawing/2014/main" id="{E4FF9B25-CC32-67D1-517D-1A3DAD41A033}"/>
+              </a:ext>
+            </a:extLst>
+          </p:cNvPr>
+          <p:cNvSpPr>
+            <a:spLocks noGrp="1"/>
+          </p:cNvSpPr>
+          <p:nvPr>
+            <p:ph type="title"/>
+          </p:nvPr>
+        </p:nvSpPr>
+        <p:spPr>
+          <a:xfrm>
+            <a:off x="734061" y="141288"/>
+            <a:ext cx="10515600" cy="711835"/>
+          </a:xfrm>
+        </p:spPr>
+        <p:txBody>
+          <a:bodyPr/>
+          <a:lstStyle/>
+          <a:p>
+            <a:r>
+              <a:rPr lang="en-CA" dirty="0"/>
+              <a:t>Barycentric coordinates</a:t>
+            </a:r>
+          </a:p>
+        </p:txBody>
+      </p:sp>
+      <p:sp>
+        <p:nvSpPr>
+          <p:cNvPr id="21" name="TextBox 20">
+            <a:extLst>
+              <a:ext uri="{FF2B5EF4-FFF2-40B4-BE49-F238E27FC236}">
+                <a16:creationId xmlns:a16="http://schemas.microsoft.com/office/drawing/2014/main" id="{009B044B-14C4-9703-9966-99ED3D812762}"/>
+              </a:ext>
+            </a:extLst>
+          </p:cNvPr>
+          <p:cNvSpPr txBox="1"/>
+          <p:nvPr/>
+        </p:nvSpPr>
+        <p:spPr>
+          <a:xfrm>
+            <a:off x="5518150" y="1172869"/>
+            <a:ext cx="6243320" cy="1384995"/>
+          </a:xfrm>
+          <a:prstGeom prst="rect">
+            <a:avLst/>
+          </a:prstGeom>
+          <a:noFill/>
+        </p:spPr>
+        <p:txBody>
+          <a:bodyPr wrap="square" rtlCol="0">
+            <a:spAutoFit/>
+          </a:bodyPr>
+          <a:lstStyle/>
+          <a:p>
+            <a:r>
+              <a:rPr lang="en-CA" sz="2800" dirty="0"/>
+              <a:t>Where is (0,0)?</a:t>
+            </a:r>
+          </a:p>
+          <a:p>
+            <a:r>
+              <a:rPr lang="en-CA" sz="2800" dirty="0">
+                <a:solidFill>
+                  <a:schemeClr val="accent2"/>
+                </a:solidFill>
+              </a:rPr>
+              <a:t>Where is (1,0)?</a:t>
+            </a:r>
+          </a:p>
+          <a:p>
+            <a:r>
+              <a:rPr lang="en-CA" sz="2800" dirty="0">
+                <a:solidFill>
+                  <a:srgbClr val="7030A0"/>
+                </a:solidFill>
+              </a:rPr>
+              <a:t>Where is (0.5, 0.5)?</a:t>
+            </a:r>
+          </a:p>
+        </p:txBody>
+      </p:sp>
+      <p:sp>
+        <p:nvSpPr>
+          <p:cNvPr id="6" name="Rectangle 5">
+            <a:extLst>
+              <a:ext uri="{FF2B5EF4-FFF2-40B4-BE49-F238E27FC236}">
+                <a16:creationId xmlns:a16="http://schemas.microsoft.com/office/drawing/2014/main" id="{F0096F3A-4950-2EF9-8013-6048EF6E8122}"/>
+              </a:ext>
+            </a:extLst>
+          </p:cNvPr>
+          <p:cNvSpPr/>
+          <p:nvPr/>
+        </p:nvSpPr>
+        <p:spPr>
+          <a:xfrm>
+            <a:off x="1082041" y="1292860"/>
+            <a:ext cx="3718560" cy="2252921"/>
+          </a:xfrm>
+          <a:prstGeom prst="rect">
+            <a:avLst/>
+          </a:prstGeom>
+        </p:spPr>
+        <p:style>
+          <a:lnRef idx="2">
+            <a:schemeClr val="accent1">
+              <a:shade val="15000"/>
+            </a:schemeClr>
+          </a:lnRef>
+          <a:fillRef idx="1">
+            <a:schemeClr val="accent1"/>
+          </a:fillRef>
+          <a:effectRef idx="0">
+            <a:schemeClr val="accent1"/>
+          </a:effectRef>
+          <a:fontRef idx="minor">
+            <a:schemeClr val="lt1"/>
+          </a:fontRef>
+        </p:style>
+        <p:txBody>
+          <a:bodyPr rtlCol="0" anchor="ctr"/>
+          <a:lstStyle/>
+          <a:p>
+            <a:pPr algn="ctr"/>
+            <a:endParaRPr lang="en-CA"/>
+          </a:p>
+        </p:txBody>
+      </p:sp>
+      <p:sp>
+        <p:nvSpPr>
+          <p:cNvPr id="7" name="Oval 6">
+            <a:extLst>
+              <a:ext uri="{FF2B5EF4-FFF2-40B4-BE49-F238E27FC236}">
+                <a16:creationId xmlns:a16="http://schemas.microsoft.com/office/drawing/2014/main" id="{7262DC6F-01AF-61B0-EE40-0CB86EC8CAEE}"/>
+              </a:ext>
+            </a:extLst>
+          </p:cNvPr>
+          <p:cNvSpPr/>
+          <p:nvPr/>
+        </p:nvSpPr>
+        <p:spPr>
+          <a:xfrm>
+            <a:off x="944881" y="3429000"/>
+            <a:ext cx="274320" cy="298181"/>
+          </a:xfrm>
+          <a:prstGeom prst="ellipse">
+            <a:avLst/>
+          </a:prstGeom>
+        </p:spPr>
+        <p:style>
+          <a:lnRef idx="2">
+            <a:schemeClr val="dk1">
+              <a:shade val="15000"/>
+            </a:schemeClr>
+          </a:lnRef>
+          <a:fillRef idx="1">
+            <a:schemeClr val="dk1"/>
+          </a:fillRef>
+          <a:effectRef idx="0">
+            <a:schemeClr val="dk1"/>
+          </a:effectRef>
+          <a:fontRef idx="minor">
+            <a:schemeClr val="lt1"/>
+          </a:fontRef>
+        </p:style>
+        <p:txBody>
+          <a:bodyPr rtlCol="0" anchor="ctr"/>
+          <a:lstStyle/>
+          <a:p>
+            <a:pPr algn="ctr"/>
+            <a:endParaRPr lang="en-CA"/>
+          </a:p>
+        </p:txBody>
+      </p:sp>
+      <p:sp>
+        <p:nvSpPr>
+          <p:cNvPr id="15" name="Oval 14">
+            <a:extLst>
+              <a:ext uri="{FF2B5EF4-FFF2-40B4-BE49-F238E27FC236}">
+                <a16:creationId xmlns:a16="http://schemas.microsoft.com/office/drawing/2014/main" id="{1F02908A-838B-D134-E820-093624584EBA}"/>
+              </a:ext>
+            </a:extLst>
+          </p:cNvPr>
+          <p:cNvSpPr/>
+          <p:nvPr/>
+        </p:nvSpPr>
+        <p:spPr>
+          <a:xfrm>
+            <a:off x="5518150" y="6231389"/>
+            <a:ext cx="274320" cy="298181"/>
+          </a:xfrm>
+          <a:prstGeom prst="ellipse">
+            <a:avLst/>
+          </a:prstGeom>
+        </p:spPr>
+        <p:style>
+          <a:lnRef idx="2">
+            <a:schemeClr val="dk1">
+              <a:shade val="15000"/>
+            </a:schemeClr>
+          </a:lnRef>
+          <a:fillRef idx="1">
+            <a:schemeClr val="dk1"/>
+          </a:fillRef>
+          <a:effectRef idx="0">
+            <a:schemeClr val="dk1"/>
+          </a:effectRef>
+          <a:fontRef idx="minor">
+            <a:schemeClr val="lt1"/>
+          </a:fontRef>
+        </p:style>
+        <p:txBody>
+          <a:bodyPr rtlCol="0" anchor="ctr"/>
+          <a:lstStyle/>
+          <a:p>
+            <a:pPr algn="ctr"/>
+            <a:endParaRPr lang="en-CA"/>
+          </a:p>
+        </p:txBody>
+      </p:sp>
+      <p:sp>
+        <p:nvSpPr>
+          <p:cNvPr id="3" name="Oval 2">
+            <a:extLst>
+              <a:ext uri="{FF2B5EF4-FFF2-40B4-BE49-F238E27FC236}">
+                <a16:creationId xmlns:a16="http://schemas.microsoft.com/office/drawing/2014/main" id="{71DCDD16-4E51-5287-8924-F2A8920F8A90}"/>
+              </a:ext>
+            </a:extLst>
+          </p:cNvPr>
+          <p:cNvSpPr/>
+          <p:nvPr/>
+        </p:nvSpPr>
+        <p:spPr>
+          <a:xfrm>
+            <a:off x="4663441" y="3396690"/>
+            <a:ext cx="274320" cy="298181"/>
+          </a:xfrm>
+          <a:prstGeom prst="ellipse">
+            <a:avLst/>
+          </a:prstGeom>
+        </p:spPr>
+        <p:style>
+          <a:lnRef idx="3">
+            <a:schemeClr val="lt1"/>
+          </a:lnRef>
+          <a:fillRef idx="1">
+            <a:schemeClr val="accent2"/>
+          </a:fillRef>
+          <a:effectRef idx="1">
+            <a:schemeClr val="accent2"/>
+          </a:effectRef>
+          <a:fontRef idx="minor">
+            <a:schemeClr val="lt1"/>
+          </a:fontRef>
+        </p:style>
+        <p:txBody>
+          <a:bodyPr rtlCol="0" anchor="ctr"/>
+          <a:lstStyle/>
+          <a:p>
+            <a:pPr algn="ctr"/>
+            <a:endParaRPr lang="en-CA"/>
+          </a:p>
+        </p:txBody>
+      </p:sp>
+      <p:sp>
+        <p:nvSpPr>
+          <p:cNvPr id="4" name="TextBox 3">
+            <a:extLst>
+              <a:ext uri="{FF2B5EF4-FFF2-40B4-BE49-F238E27FC236}">
+                <a16:creationId xmlns:a16="http://schemas.microsoft.com/office/drawing/2014/main" id="{71CCD3B7-D6E2-362F-773C-CBEDE93DC735}"/>
+              </a:ext>
+            </a:extLst>
+          </p:cNvPr>
+          <p:cNvSpPr txBox="1"/>
+          <p:nvPr/>
+        </p:nvSpPr>
+        <p:spPr>
+          <a:xfrm>
+            <a:off x="190500" y="4683784"/>
+            <a:ext cx="3792220" cy="1384995"/>
+          </a:xfrm>
+          <a:prstGeom prst="rect">
+            <a:avLst/>
+          </a:prstGeom>
+          <a:noFill/>
+        </p:spPr>
+        <p:txBody>
+          <a:bodyPr wrap="square" rtlCol="0">
+            <a:spAutoFit/>
+          </a:bodyPr>
+          <a:lstStyle/>
+          <a:p>
+            <a:r>
+              <a:rPr lang="en-CA" sz="2800" dirty="0"/>
+              <a:t>Where is (0,0,1)?</a:t>
+            </a:r>
+          </a:p>
+          <a:p>
+            <a:r>
+              <a:rPr lang="en-CA" sz="2800" dirty="0">
+                <a:solidFill>
+                  <a:schemeClr val="accent2"/>
+                </a:solidFill>
+              </a:rPr>
+              <a:t>Where is (0,1,0)?</a:t>
+            </a:r>
+          </a:p>
+          <a:p>
+            <a:r>
+              <a:rPr lang="en-CA" sz="2800" dirty="0">
+                <a:solidFill>
+                  <a:srgbClr val="7030A0"/>
+                </a:solidFill>
+              </a:rPr>
+              <a:t>Where is (0.5, 0.5, 0.5)?</a:t>
+            </a:r>
+          </a:p>
+        </p:txBody>
+      </p:sp>
+      <p:sp>
+        <p:nvSpPr>
+          <p:cNvPr id="5" name="Oval 4">
+            <a:extLst>
+              <a:ext uri="{FF2B5EF4-FFF2-40B4-BE49-F238E27FC236}">
+                <a16:creationId xmlns:a16="http://schemas.microsoft.com/office/drawing/2014/main" id="{1AEF0E80-526C-5A9F-BDE9-E7207D51A206}"/>
+              </a:ext>
+            </a:extLst>
+          </p:cNvPr>
+          <p:cNvSpPr/>
+          <p:nvPr/>
+        </p:nvSpPr>
+        <p:spPr>
+          <a:xfrm>
+            <a:off x="9367521" y="2877635"/>
+            <a:ext cx="274320" cy="298181"/>
+          </a:xfrm>
+          <a:prstGeom prst="ellipse">
+            <a:avLst/>
+          </a:prstGeom>
+        </p:spPr>
+        <p:style>
+          <a:lnRef idx="3">
+            <a:schemeClr val="lt1"/>
+          </a:lnRef>
+          <a:fillRef idx="1">
+            <a:schemeClr val="accent2"/>
+          </a:fillRef>
+          <a:effectRef idx="1">
+            <a:schemeClr val="accent2"/>
+          </a:effectRef>
+          <a:fontRef idx="minor">
+            <a:schemeClr val="lt1"/>
+          </a:fontRef>
+        </p:style>
+        <p:txBody>
+          <a:bodyPr rtlCol="0" anchor="ctr"/>
+          <a:lstStyle/>
+          <a:p>
+            <a:pPr algn="ctr"/>
+            <a:endParaRPr lang="en-CA"/>
+          </a:p>
+        </p:txBody>
+      </p:sp>
+      <p:sp>
+        <p:nvSpPr>
+          <p:cNvPr id="8" name="Oval 7">
+            <a:extLst>
+              <a:ext uri="{FF2B5EF4-FFF2-40B4-BE49-F238E27FC236}">
+                <a16:creationId xmlns:a16="http://schemas.microsoft.com/office/drawing/2014/main" id="{D3E04E98-086C-8F2B-2D2E-BBEBF329486A}"/>
+              </a:ext>
+            </a:extLst>
+          </p:cNvPr>
+          <p:cNvSpPr/>
+          <p:nvPr/>
+        </p:nvSpPr>
+        <p:spPr>
+          <a:xfrm>
+            <a:off x="2804161" y="2249463"/>
+            <a:ext cx="274320" cy="298181"/>
+          </a:xfrm>
+          <a:prstGeom prst="ellipse">
+            <a:avLst/>
+          </a:prstGeom>
+          <a:solidFill>
+            <a:srgbClr val="7030A0"/>
+          </a:solidFill>
+        </p:spPr>
+        <p:style>
+          <a:lnRef idx="3">
+            <a:schemeClr val="lt1"/>
+          </a:lnRef>
+          <a:fillRef idx="1">
+            <a:schemeClr val="accent2"/>
+          </a:fillRef>
+          <a:effectRef idx="1">
+            <a:schemeClr val="accent2"/>
+          </a:effectRef>
+          <a:fontRef idx="minor">
+            <a:schemeClr val="lt1"/>
+          </a:fontRef>
+        </p:style>
+        <p:txBody>
+          <a:bodyPr rtlCol="0" anchor="ctr"/>
+          <a:lstStyle/>
+          <a:p>
+            <a:pPr algn="ctr"/>
+            <a:endParaRPr lang="en-CA"/>
+          </a:p>
+        </p:txBody>
+      </p:sp>
+      <p:sp>
+        <p:nvSpPr>
+          <p:cNvPr id="11" name="Oval 10">
+            <a:extLst>
+              <a:ext uri="{FF2B5EF4-FFF2-40B4-BE49-F238E27FC236}">
+                <a16:creationId xmlns:a16="http://schemas.microsoft.com/office/drawing/2014/main" id="{6FB495D0-697B-8D1F-FEDF-DF3E0EE27960}"/>
+              </a:ext>
+            </a:extLst>
+          </p:cNvPr>
+          <p:cNvSpPr/>
+          <p:nvPr/>
+        </p:nvSpPr>
+        <p:spPr>
+          <a:xfrm>
+            <a:off x="8418829" y="5227190"/>
+            <a:ext cx="274320" cy="298181"/>
+          </a:xfrm>
+          <a:prstGeom prst="ellipse">
+            <a:avLst/>
+          </a:prstGeom>
+          <a:solidFill>
+            <a:srgbClr val="7030A0"/>
+          </a:solidFill>
+        </p:spPr>
+        <p:style>
+          <a:lnRef idx="3">
+            <a:schemeClr val="lt1"/>
+          </a:lnRef>
+          <a:fillRef idx="1">
+            <a:schemeClr val="accent2"/>
+          </a:fillRef>
+          <a:effectRef idx="1">
+            <a:schemeClr val="accent2"/>
+          </a:effectRef>
+          <a:fontRef idx="minor">
+            <a:schemeClr val="lt1"/>
+          </a:fontRef>
+        </p:style>
+        <p:txBody>
+          <a:bodyPr rtlCol="0" anchor="ctr"/>
+          <a:lstStyle/>
+          <a:p>
+            <a:pPr algn="ctr"/>
+            <a:endParaRPr lang="en-CA"/>
+          </a:p>
+        </p:txBody>
+      </p:sp>
+    </p:spTree>
+    <p:extLst>
+      <p:ext uri="{BB962C8B-B14F-4D97-AF65-F5344CB8AC3E}">
+        <p14:creationId xmlns:p14="http://schemas.microsoft.com/office/powerpoint/2010/main" val="4133226077"/>
+      </p:ext>
+    </p:extLst>
+  </p:cSld>
+  <p:clrMapOvr>
+    <a:masterClrMapping/>
+  </p:clrMapOvr>
+</p:sld>
+</file>
+
+<file path=ppt/slides/slide23.xml><?xml version="1.0" encoding="utf-8"?>
+<p:sld xmlns:a="http://schemas.openxmlformats.org/drawingml/2006/main" xmlns:r="http://schemas.openxmlformats.org/officeDocument/2006/relationships" xmlns:p="http://schemas.openxmlformats.org/presentationml/2006/main">
+  <p:cSld>
+    <p:spTree>
+      <p:nvGrpSpPr>
+        <p:cNvPr id="1" name=""/>
+        <p:cNvGrpSpPr/>
+        <p:nvPr/>
+      </p:nvGrpSpPr>
+      <p:grpSpPr>
+        <a:xfrm>
+          <a:off x="0" y="0"/>
+          <a:ext cx="0" cy="0"/>
+          <a:chOff x="0" y="0"/>
+          <a:chExt cx="0" cy="0"/>
+        </a:xfrm>
+      </p:grpSpPr>
+      <p:sp>
+        <p:nvSpPr>
+          <p:cNvPr id="2" name="Title 1">
+            <a:extLst>
+              <a:ext uri="{FF2B5EF4-FFF2-40B4-BE49-F238E27FC236}">
+                <a16:creationId xmlns:a16="http://schemas.microsoft.com/office/drawing/2014/main" id="{BA850BA4-3DB5-55C8-D60D-4D1A5ECB7476}"/>
+              </a:ext>
+            </a:extLst>
+          </p:cNvPr>
+          <p:cNvSpPr>
+            <a:spLocks noGrp="1"/>
+          </p:cNvSpPr>
+          <p:nvPr>
+            <p:ph type="title"/>
+          </p:nvPr>
+        </p:nvSpPr>
+        <p:spPr/>
+        <p:txBody>
+          <a:bodyPr/>
+          <a:lstStyle/>
+          <a:p>
+            <a:r>
+              <a:rPr lang="en-CA" dirty="0"/>
+              <a:t>CRC – Physics, </a:t>
+            </a:r>
+            <a:r>
+              <a:rPr lang="en-CA" dirty="0" err="1"/>
+              <a:t>MeshManager</a:t>
+            </a:r>
+            <a:r>
+              <a:rPr lang="en-CA" dirty="0"/>
+              <a:t>, etc.</a:t>
+            </a:r>
+          </a:p>
+        </p:txBody>
+      </p:sp>
+      <p:sp>
+        <p:nvSpPr>
+          <p:cNvPr id="4" name="Rectangle: Rounded Corners 3">
+            <a:extLst>
+              <a:ext uri="{FF2B5EF4-FFF2-40B4-BE49-F238E27FC236}">
+                <a16:creationId xmlns:a16="http://schemas.microsoft.com/office/drawing/2014/main" id="{4FDD2BA3-4F45-F346-435F-C59FB3C82268}"/>
+              </a:ext>
+            </a:extLst>
+          </p:cNvPr>
+          <p:cNvSpPr/>
+          <p:nvPr/>
+        </p:nvSpPr>
+        <p:spPr>
+          <a:xfrm>
+            <a:off x="924560" y="2032000"/>
+            <a:ext cx="2164080" cy="1625600"/>
+          </a:xfrm>
+          <a:prstGeom prst="roundRect">
+            <a:avLst/>
+          </a:prstGeom>
+        </p:spPr>
+        <p:style>
+          <a:lnRef idx="2">
+            <a:schemeClr val="accent1">
+              <a:shade val="15000"/>
+            </a:schemeClr>
+          </a:lnRef>
+          <a:fillRef idx="1">
+            <a:schemeClr val="accent1"/>
+          </a:fillRef>
+          <a:effectRef idx="0">
+            <a:schemeClr val="accent1"/>
+          </a:effectRef>
+          <a:fontRef idx="minor">
+            <a:schemeClr val="lt1"/>
+          </a:fontRef>
+        </p:style>
+        <p:txBody>
+          <a:bodyPr rtlCol="0" anchor="ctr"/>
+          <a:lstStyle/>
+          <a:p>
+            <a:pPr algn="ctr"/>
+            <a:r>
+              <a:rPr lang="en-CA" sz="2400" dirty="0" err="1"/>
+              <a:t>cPhsyics</a:t>
+            </a:r>
+            <a:endParaRPr lang="en-CA" sz="2400" dirty="0"/>
+          </a:p>
+        </p:txBody>
+      </p:sp>
+      <p:sp>
+        <p:nvSpPr>
+          <p:cNvPr id="5" name="Rectangle: Rounded Corners 4">
+            <a:extLst>
+              <a:ext uri="{FF2B5EF4-FFF2-40B4-BE49-F238E27FC236}">
+                <a16:creationId xmlns:a16="http://schemas.microsoft.com/office/drawing/2014/main" id="{6389EA17-391F-ED36-1DD1-C626ED5A430F}"/>
+              </a:ext>
+            </a:extLst>
+          </p:cNvPr>
+          <p:cNvSpPr/>
+          <p:nvPr/>
+        </p:nvSpPr>
+        <p:spPr>
+          <a:xfrm>
+            <a:off x="7579360" y="2047240"/>
+            <a:ext cx="2164080" cy="1625600"/>
+          </a:xfrm>
+          <a:prstGeom prst="roundRect">
+            <a:avLst/>
+          </a:prstGeom>
+        </p:spPr>
+        <p:style>
+          <a:lnRef idx="2">
+            <a:schemeClr val="accent1">
+              <a:shade val="15000"/>
+            </a:schemeClr>
+          </a:lnRef>
+          <a:fillRef idx="1">
+            <a:schemeClr val="accent1"/>
+          </a:fillRef>
+          <a:effectRef idx="0">
+            <a:schemeClr val="accent1"/>
+          </a:effectRef>
+          <a:fontRef idx="minor">
+            <a:schemeClr val="lt1"/>
+          </a:fontRef>
+        </p:style>
+        <p:txBody>
+          <a:bodyPr rtlCol="0" anchor="ctr"/>
+          <a:lstStyle/>
+          <a:p>
+            <a:pPr algn="ctr"/>
+            <a:r>
+              <a:rPr lang="en-CA" sz="2400" dirty="0" err="1"/>
+              <a:t>cVAOManager</a:t>
+            </a:r>
+            <a:endParaRPr lang="en-CA" sz="2400" dirty="0"/>
+          </a:p>
+        </p:txBody>
+      </p:sp>
+      <p:sp>
+        <p:nvSpPr>
+          <p:cNvPr id="6" name="Arrow: Right 5">
+            <a:extLst>
+              <a:ext uri="{FF2B5EF4-FFF2-40B4-BE49-F238E27FC236}">
+                <a16:creationId xmlns:a16="http://schemas.microsoft.com/office/drawing/2014/main" id="{2A85F630-A20F-0C76-B245-8ABEC77A4A33}"/>
+              </a:ext>
+            </a:extLst>
+          </p:cNvPr>
+          <p:cNvSpPr/>
+          <p:nvPr/>
+        </p:nvSpPr>
+        <p:spPr>
+          <a:xfrm>
+            <a:off x="3373120" y="2446020"/>
+            <a:ext cx="3810000" cy="797560"/>
+          </a:xfrm>
+          <a:prstGeom prst="rightArrow">
+            <a:avLst/>
+          </a:prstGeom>
+        </p:spPr>
+        <p:style>
+          <a:lnRef idx="2">
+            <a:schemeClr val="accent1">
+              <a:shade val="15000"/>
+            </a:schemeClr>
+          </a:lnRef>
+          <a:fillRef idx="1">
+            <a:schemeClr val="accent1"/>
+          </a:fillRef>
+          <a:effectRef idx="0">
+            <a:schemeClr val="accent1"/>
+          </a:effectRef>
+          <a:fontRef idx="minor">
+            <a:schemeClr val="lt1"/>
+          </a:fontRef>
+        </p:style>
+        <p:txBody>
+          <a:bodyPr rtlCol="0" anchor="ctr"/>
+          <a:lstStyle/>
+          <a:p>
+            <a:pPr algn="ctr"/>
+            <a:r>
+              <a:rPr lang="en-CA" sz="2400" dirty="0"/>
+              <a:t>Depends on/include</a:t>
+            </a:r>
+          </a:p>
+        </p:txBody>
+      </p:sp>
+    </p:spTree>
+    <p:extLst>
+      <p:ext uri="{BB962C8B-B14F-4D97-AF65-F5344CB8AC3E}">
+        <p14:creationId xmlns:p14="http://schemas.microsoft.com/office/powerpoint/2010/main" val="3396867120"/>
+      </p:ext>
+    </p:extLst>
+  </p:cSld>
+  <p:clrMapOvr>
+    <a:masterClrMapping/>
+  </p:clrMapOvr>
+</p:sld>
+</file>
+
+<file path=ppt/slides/slide24.xml><?xml version="1.0" encoding="utf-8"?>
+<p:sld xmlns:a="http://schemas.openxmlformats.org/drawingml/2006/main" xmlns:r="http://schemas.openxmlformats.org/officeDocument/2006/relationships" xmlns:p="http://schemas.openxmlformats.org/presentationml/2006/main">
+  <p:cSld>
+    <p:spTree>
+      <p:nvGrpSpPr>
+        <p:cNvPr id="1" name=""/>
+        <p:cNvGrpSpPr/>
+        <p:nvPr/>
+      </p:nvGrpSpPr>
+      <p:grpSpPr>
+        <a:xfrm>
+          <a:off x="0" y="0"/>
+          <a:ext cx="0" cy="0"/>
+          <a:chOff x="0" y="0"/>
+          <a:chExt cx="0" cy="0"/>
+        </a:xfrm>
+      </p:grpSpPr>
+      <p:sp>
+        <p:nvSpPr>
+          <p:cNvPr id="12" name="Isosceles Triangle 11">
+            <a:extLst>
+              <a:ext uri="{FF2B5EF4-FFF2-40B4-BE49-F238E27FC236}">
+                <a16:creationId xmlns:a16="http://schemas.microsoft.com/office/drawing/2014/main" id="{44907506-CBF7-3FD1-4AC2-E917ABBC2B4E}"/>
+              </a:ext>
+            </a:extLst>
+          </p:cNvPr>
+          <p:cNvSpPr/>
+          <p:nvPr/>
+        </p:nvSpPr>
+        <p:spPr>
+          <a:xfrm>
+            <a:off x="3115310" y="1909126"/>
+            <a:ext cx="5030631" cy="3353754"/>
+          </a:xfrm>
+          <a:prstGeom prst="triangle">
+            <a:avLst>
+              <a:gd name="adj" fmla="val 74437"/>
+            </a:avLst>
+          </a:prstGeom>
+        </p:spPr>
+        <p:style>
+          <a:lnRef idx="2">
+            <a:schemeClr val="accent1">
+              <a:shade val="15000"/>
+            </a:schemeClr>
+          </a:lnRef>
+          <a:fillRef idx="1">
+            <a:schemeClr val="accent1"/>
+          </a:fillRef>
+          <a:effectRef idx="0">
+            <a:schemeClr val="accent1"/>
+          </a:effectRef>
+          <a:fontRef idx="minor">
+            <a:schemeClr val="lt1"/>
+          </a:fontRef>
+        </p:style>
+        <p:txBody>
+          <a:bodyPr rtlCol="0" anchor="ctr"/>
+          <a:lstStyle/>
+          <a:p>
+            <a:pPr algn="ctr"/>
+            <a:endParaRPr lang="en-CA"/>
+          </a:p>
+        </p:txBody>
+      </p:sp>
+      <p:sp>
+        <p:nvSpPr>
+          <p:cNvPr id="5" name="Oval 4">
+            <a:extLst>
+              <a:ext uri="{FF2B5EF4-FFF2-40B4-BE49-F238E27FC236}">
+                <a16:creationId xmlns:a16="http://schemas.microsoft.com/office/drawing/2014/main" id="{1AEF0E80-526C-5A9F-BDE9-E7207D51A206}"/>
+              </a:ext>
+            </a:extLst>
+          </p:cNvPr>
+          <p:cNvSpPr/>
+          <p:nvPr/>
+        </p:nvSpPr>
+        <p:spPr>
+          <a:xfrm>
+            <a:off x="8793480" y="1610945"/>
+            <a:ext cx="274320" cy="298181"/>
+          </a:xfrm>
+          <a:prstGeom prst="ellipse">
+            <a:avLst/>
+          </a:prstGeom>
+        </p:spPr>
+        <p:style>
+          <a:lnRef idx="3">
+            <a:schemeClr val="lt1"/>
+          </a:lnRef>
+          <a:fillRef idx="1">
+            <a:schemeClr val="accent2"/>
+          </a:fillRef>
+          <a:effectRef idx="1">
+            <a:schemeClr val="accent2"/>
+          </a:effectRef>
+          <a:fontRef idx="minor">
+            <a:schemeClr val="lt1"/>
+          </a:fontRef>
+        </p:style>
+        <p:txBody>
+          <a:bodyPr rtlCol="0" anchor="ctr"/>
+          <a:lstStyle/>
+          <a:p>
+            <a:pPr algn="ctr"/>
+            <a:endParaRPr lang="en-CA"/>
+          </a:p>
+        </p:txBody>
+      </p:sp>
+      <p:cxnSp>
+        <p:nvCxnSpPr>
+          <p:cNvPr id="14" name="Straight Arrow Connector 13">
+            <a:extLst>
+              <a:ext uri="{FF2B5EF4-FFF2-40B4-BE49-F238E27FC236}">
+                <a16:creationId xmlns:a16="http://schemas.microsoft.com/office/drawing/2014/main" id="{E0AC17AE-DE9B-734A-EB54-3AC86F149510}"/>
+              </a:ext>
+            </a:extLst>
+          </p:cNvPr>
+          <p:cNvCxnSpPr/>
+          <p:nvPr/>
+        </p:nvCxnSpPr>
+        <p:spPr>
+          <a:xfrm flipV="1">
+            <a:off x="7142481" y="1760035"/>
+            <a:ext cx="1696720" cy="711200"/>
+          </a:xfrm>
+          <a:prstGeom prst="straightConnector1">
+            <a:avLst/>
+          </a:prstGeom>
+          <a:ln>
+            <a:tailEnd type="triangle"/>
+          </a:ln>
+        </p:spPr>
+        <p:style>
+          <a:lnRef idx="1">
+            <a:schemeClr val="accent1"/>
+          </a:lnRef>
+          <a:fillRef idx="0">
+            <a:schemeClr val="accent1"/>
+          </a:fillRef>
+          <a:effectRef idx="0">
+            <a:schemeClr val="accent1"/>
+          </a:effectRef>
+          <a:fontRef idx="minor">
+            <a:schemeClr val="tx1"/>
+          </a:fontRef>
+        </p:style>
+      </p:cxnSp>
+      <p:sp>
+        <p:nvSpPr>
+          <p:cNvPr id="16" name="Oval 15">
+            <a:extLst>
+              <a:ext uri="{FF2B5EF4-FFF2-40B4-BE49-F238E27FC236}">
+                <a16:creationId xmlns:a16="http://schemas.microsoft.com/office/drawing/2014/main" id="{7E79AAD2-6671-26D4-84D8-C5D7ED2E7AE3}"/>
+              </a:ext>
+            </a:extLst>
+          </p:cNvPr>
+          <p:cNvSpPr/>
+          <p:nvPr/>
+        </p:nvSpPr>
+        <p:spPr>
+          <a:xfrm>
+            <a:off x="5999971" y="3811401"/>
+            <a:ext cx="274320" cy="298181"/>
+          </a:xfrm>
+          <a:prstGeom prst="ellipse">
+            <a:avLst/>
+          </a:prstGeom>
+        </p:spPr>
+        <p:style>
+          <a:lnRef idx="3">
+            <a:schemeClr val="lt1"/>
+          </a:lnRef>
+          <a:fillRef idx="1">
+            <a:schemeClr val="accent2"/>
+          </a:fillRef>
+          <a:effectRef idx="1">
+            <a:schemeClr val="accent2"/>
+          </a:effectRef>
+          <a:fontRef idx="minor">
+            <a:schemeClr val="lt1"/>
+          </a:fontRef>
+        </p:style>
+        <p:txBody>
+          <a:bodyPr rtlCol="0" anchor="ctr"/>
+          <a:lstStyle/>
+          <a:p>
+            <a:pPr algn="ctr"/>
+            <a:endParaRPr lang="en-CA"/>
+          </a:p>
+        </p:txBody>
+      </p:sp>
+      <p:cxnSp>
+        <p:nvCxnSpPr>
+          <p:cNvPr id="19" name="Straight Arrow Connector 18">
+            <a:extLst>
+              <a:ext uri="{FF2B5EF4-FFF2-40B4-BE49-F238E27FC236}">
+                <a16:creationId xmlns:a16="http://schemas.microsoft.com/office/drawing/2014/main" id="{76721F95-7CCF-870E-BCB4-96EA5AD7E534}"/>
+              </a:ext>
+            </a:extLst>
+          </p:cNvPr>
+          <p:cNvCxnSpPr>
+            <a:cxnSpLocks/>
+          </p:cNvCxnSpPr>
+          <p:nvPr/>
+        </p:nvCxnSpPr>
+        <p:spPr>
+          <a:xfrm flipV="1">
+            <a:off x="6868161" y="549117"/>
+            <a:ext cx="3677919" cy="1401603"/>
+          </a:xfrm>
+          <a:prstGeom prst="straightConnector1">
+            <a:avLst/>
+          </a:prstGeom>
+          <a:ln>
+            <a:tailEnd type="triangle"/>
+          </a:ln>
+        </p:spPr>
+        <p:style>
+          <a:lnRef idx="1">
+            <a:schemeClr val="accent1"/>
+          </a:lnRef>
+          <a:fillRef idx="0">
+            <a:schemeClr val="accent1"/>
+          </a:fillRef>
+          <a:effectRef idx="0">
+            <a:schemeClr val="accent1"/>
+          </a:effectRef>
+          <a:fontRef idx="minor">
+            <a:schemeClr val="tx1"/>
+          </a:fontRef>
+        </p:style>
+      </p:cxnSp>
+      <p:cxnSp>
+        <p:nvCxnSpPr>
+          <p:cNvPr id="22" name="Straight Arrow Connector 21">
+            <a:extLst>
+              <a:ext uri="{FF2B5EF4-FFF2-40B4-BE49-F238E27FC236}">
+                <a16:creationId xmlns:a16="http://schemas.microsoft.com/office/drawing/2014/main" id="{8FE4B600-509C-3D24-B75B-F5E9D8C83877}"/>
+              </a:ext>
+            </a:extLst>
+          </p:cNvPr>
+          <p:cNvCxnSpPr>
+            <a:cxnSpLocks/>
+          </p:cNvCxnSpPr>
+          <p:nvPr/>
+        </p:nvCxnSpPr>
+        <p:spPr>
+          <a:xfrm flipV="1">
+            <a:off x="8239761" y="3861277"/>
+            <a:ext cx="3677919" cy="1401603"/>
+          </a:xfrm>
+          <a:prstGeom prst="straightConnector1">
+            <a:avLst/>
+          </a:prstGeom>
+          <a:ln>
+            <a:tailEnd type="triangle"/>
+          </a:ln>
+        </p:spPr>
+        <p:style>
+          <a:lnRef idx="1">
+            <a:schemeClr val="accent1"/>
+          </a:lnRef>
+          <a:fillRef idx="0">
+            <a:schemeClr val="accent1"/>
+          </a:fillRef>
+          <a:effectRef idx="0">
+            <a:schemeClr val="accent1"/>
+          </a:effectRef>
+          <a:fontRef idx="minor">
+            <a:schemeClr val="tx1"/>
+          </a:fontRef>
+        </p:style>
+      </p:cxnSp>
+      <p:cxnSp>
+        <p:nvCxnSpPr>
+          <p:cNvPr id="23" name="Straight Arrow Connector 22">
+            <a:extLst>
+              <a:ext uri="{FF2B5EF4-FFF2-40B4-BE49-F238E27FC236}">
+                <a16:creationId xmlns:a16="http://schemas.microsoft.com/office/drawing/2014/main" id="{44806C28-29A2-037E-F1BD-83A48E0A8BED}"/>
+              </a:ext>
+            </a:extLst>
+          </p:cNvPr>
+          <p:cNvCxnSpPr>
+            <a:cxnSpLocks/>
+            <a:stCxn id="12" idx="2"/>
+          </p:cNvCxnSpPr>
+          <p:nvPr/>
+        </p:nvCxnSpPr>
+        <p:spPr>
+          <a:xfrm flipH="1" flipV="1">
+            <a:off x="1087120" y="2733040"/>
+            <a:ext cx="2028190" cy="2529840"/>
+          </a:xfrm>
+          <a:prstGeom prst="straightConnector1">
+            <a:avLst/>
+          </a:prstGeom>
+          <a:ln>
+            <a:tailEnd type="triangle"/>
+          </a:ln>
+        </p:spPr>
+        <p:style>
+          <a:lnRef idx="1">
+            <a:schemeClr val="accent1"/>
+          </a:lnRef>
+          <a:fillRef idx="0">
+            <a:schemeClr val="accent1"/>
+          </a:fillRef>
+          <a:effectRef idx="0">
+            <a:schemeClr val="accent1"/>
+          </a:effectRef>
+          <a:fontRef idx="minor">
+            <a:schemeClr val="tx1"/>
+          </a:fontRef>
+        </p:style>
+      </p:cxnSp>
+      <p:cxnSp>
+        <p:nvCxnSpPr>
+          <p:cNvPr id="24" name="Straight Arrow Connector 23">
+            <a:extLst>
+              <a:ext uri="{FF2B5EF4-FFF2-40B4-BE49-F238E27FC236}">
+                <a16:creationId xmlns:a16="http://schemas.microsoft.com/office/drawing/2014/main" id="{91501D66-B518-2CD1-CFCA-19F053D8C1A3}"/>
+              </a:ext>
+            </a:extLst>
+          </p:cNvPr>
+          <p:cNvCxnSpPr>
+            <a:cxnSpLocks/>
+            <a:stCxn id="12" idx="0"/>
+          </p:cNvCxnSpPr>
+          <p:nvPr/>
+        </p:nvCxnSpPr>
+        <p:spPr>
+          <a:xfrm flipH="1" flipV="1">
+            <a:off x="5414301" y="-142240"/>
+            <a:ext cx="1445660" cy="2051366"/>
+          </a:xfrm>
+          <a:prstGeom prst="straightConnector1">
+            <a:avLst/>
+          </a:prstGeom>
+          <a:ln>
+            <a:tailEnd type="triangle"/>
+          </a:ln>
+        </p:spPr>
+        <p:style>
+          <a:lnRef idx="1">
+            <a:schemeClr val="accent1"/>
+          </a:lnRef>
+          <a:fillRef idx="0">
+            <a:schemeClr val="accent1"/>
+          </a:fillRef>
+          <a:effectRef idx="0">
+            <a:schemeClr val="accent1"/>
+          </a:effectRef>
+          <a:fontRef idx="minor">
+            <a:schemeClr val="tx1"/>
+          </a:fontRef>
+        </p:style>
+      </p:cxnSp>
+    </p:spTree>
+    <p:extLst>
+      <p:ext uri="{BB962C8B-B14F-4D97-AF65-F5344CB8AC3E}">
+        <p14:creationId xmlns:p14="http://schemas.microsoft.com/office/powerpoint/2010/main" val="554742553"/>
       </p:ext>
     </p:extLst>
   </p:cSld>
@@ -8811,8 +12102,8 @@
         </p:nvSpPr>
         <p:spPr>
           <a:xfrm>
-            <a:off x="2466392" y="2808512"/>
-            <a:ext cx="7259216" cy="1240971"/>
+            <a:off x="2334312" y="3032032"/>
+            <a:ext cx="5133288" cy="1240971"/>
           </a:xfrm>
           <a:prstGeom prst="rect">
             <a:avLst/>
@@ -8867,7 +12158,7 @@
         </p:nvGrpSpPr>
         <p:grpSpPr>
           <a:xfrm>
-            <a:off x="6680716" y="261255"/>
+            <a:off x="7599680" y="312055"/>
             <a:ext cx="2323322" cy="2323322"/>
             <a:chOff x="1436914" y="485193"/>
             <a:chExt cx="2323322" cy="2323322"/>

</xml_diff>